<commit_message>
partial update to reflect WG feedback
</commit_message>
<xml_diff>
--- a/pics.pptx
+++ b/pics.pptx
@@ -6,6 +6,9 @@
   </p:sldMasterIdLst>
   <p:sldIdLst>
     <p:sldId id="256" r:id="rId2"/>
+    <p:sldId id="257" r:id="rId3"/>
+    <p:sldId id="259" r:id="rId4"/>
+    <p:sldId id="258" r:id="rId5"/>
   </p:sldIdLst>
   <p:sldSz cx="12192000" cy="6858000"/>
   <p:notesSz cx="6858000" cy="9144000"/>
@@ -261,7 +264,7 @@
           <a:p>
             <a:fld id="{AB152B3D-A1C5-AF4C-B483-6B4B52E57E57}" type="datetimeFigureOut">
               <a:rPr lang="en-GB" smtClean="0"/>
-              <a:t>04/11/2019</a:t>
+              <a:t>29/06/2020</a:t>
             </a:fld>
             <a:endParaRPr lang="en-GB"/>
           </a:p>
@@ -461,7 +464,7 @@
           <a:p>
             <a:fld id="{AB152B3D-A1C5-AF4C-B483-6B4B52E57E57}" type="datetimeFigureOut">
               <a:rPr lang="en-GB" smtClean="0"/>
-              <a:t>04/11/2019</a:t>
+              <a:t>29/06/2020</a:t>
             </a:fld>
             <a:endParaRPr lang="en-GB"/>
           </a:p>
@@ -671,7 +674,7 @@
           <a:p>
             <a:fld id="{AB152B3D-A1C5-AF4C-B483-6B4B52E57E57}" type="datetimeFigureOut">
               <a:rPr lang="en-GB" smtClean="0"/>
-              <a:t>04/11/2019</a:t>
+              <a:t>29/06/2020</a:t>
             </a:fld>
             <a:endParaRPr lang="en-GB"/>
           </a:p>
@@ -871,7 +874,7 @@
           <a:p>
             <a:fld id="{AB152B3D-A1C5-AF4C-B483-6B4B52E57E57}" type="datetimeFigureOut">
               <a:rPr lang="en-GB" smtClean="0"/>
-              <a:t>04/11/2019</a:t>
+              <a:t>29/06/2020</a:t>
             </a:fld>
             <a:endParaRPr lang="en-GB"/>
           </a:p>
@@ -1147,7 +1150,7 @@
           <a:p>
             <a:fld id="{AB152B3D-A1C5-AF4C-B483-6B4B52E57E57}" type="datetimeFigureOut">
               <a:rPr lang="en-GB" smtClean="0"/>
-              <a:t>04/11/2019</a:t>
+              <a:t>29/06/2020</a:t>
             </a:fld>
             <a:endParaRPr lang="en-GB"/>
           </a:p>
@@ -1415,7 +1418,7 @@
           <a:p>
             <a:fld id="{AB152B3D-A1C5-AF4C-B483-6B4B52E57E57}" type="datetimeFigureOut">
               <a:rPr lang="en-GB" smtClean="0"/>
-              <a:t>04/11/2019</a:t>
+              <a:t>29/06/2020</a:t>
             </a:fld>
             <a:endParaRPr lang="en-GB"/>
           </a:p>
@@ -1830,7 +1833,7 @@
           <a:p>
             <a:fld id="{AB152B3D-A1C5-AF4C-B483-6B4B52E57E57}" type="datetimeFigureOut">
               <a:rPr lang="en-GB" smtClean="0"/>
-              <a:t>04/11/2019</a:t>
+              <a:t>29/06/2020</a:t>
             </a:fld>
             <a:endParaRPr lang="en-GB"/>
           </a:p>
@@ -1972,7 +1975,7 @@
           <a:p>
             <a:fld id="{AB152B3D-A1C5-AF4C-B483-6B4B52E57E57}" type="datetimeFigureOut">
               <a:rPr lang="en-GB" smtClean="0"/>
-              <a:t>04/11/2019</a:t>
+              <a:t>29/06/2020</a:t>
             </a:fld>
             <a:endParaRPr lang="en-GB"/>
           </a:p>
@@ -2085,7 +2088,7 @@
           <a:p>
             <a:fld id="{AB152B3D-A1C5-AF4C-B483-6B4B52E57E57}" type="datetimeFigureOut">
               <a:rPr lang="en-GB" smtClean="0"/>
-              <a:t>04/11/2019</a:t>
+              <a:t>29/06/2020</a:t>
             </a:fld>
             <a:endParaRPr lang="en-GB"/>
           </a:p>
@@ -2398,7 +2401,7 @@
           <a:p>
             <a:fld id="{AB152B3D-A1C5-AF4C-B483-6B4B52E57E57}" type="datetimeFigureOut">
               <a:rPr lang="en-GB" smtClean="0"/>
-              <a:t>04/11/2019</a:t>
+              <a:t>29/06/2020</a:t>
             </a:fld>
             <a:endParaRPr lang="en-GB"/>
           </a:p>
@@ -2687,7 +2690,7 @@
           <a:p>
             <a:fld id="{AB152B3D-A1C5-AF4C-B483-6B4B52E57E57}" type="datetimeFigureOut">
               <a:rPr lang="en-GB" smtClean="0"/>
-              <a:t>04/11/2019</a:t>
+              <a:t>29/06/2020</a:t>
             </a:fld>
             <a:endParaRPr lang="en-GB"/>
           </a:p>
@@ -2930,7 +2933,7 @@
           <a:p>
             <a:fld id="{AB152B3D-A1C5-AF4C-B483-6B4B52E57E57}" type="datetimeFigureOut">
               <a:rPr lang="en-GB" smtClean="0"/>
-              <a:t>04/11/2019</a:t>
+              <a:t>29/06/2020</a:t>
             </a:fld>
             <a:endParaRPr lang="en-GB"/>
           </a:p>
@@ -4557,8 +4560,8 @@
         </p:nvSpPr>
         <p:spPr>
           <a:xfrm>
-            <a:off x="3510063" y="4219174"/>
-            <a:ext cx="766941" cy="646331"/>
+            <a:off x="3499195" y="4219174"/>
+            <a:ext cx="788677" cy="646331"/>
           </a:xfrm>
           <a:prstGeom prst="rect">
             <a:avLst/>
@@ -4574,7 +4577,7 @@
             <a:pPr algn="ctr"/>
             <a:r>
               <a:rPr lang="en-GB" dirty="0"/>
-              <a:t>travel </a:t>
+              <a:t>traffic </a:t>
             </a:r>
           </a:p>
           <a:p>
@@ -4600,8 +4603,8 @@
         </p:nvSpPr>
         <p:spPr>
           <a:xfrm>
-            <a:off x="4881662" y="4219173"/>
-            <a:ext cx="766941" cy="646331"/>
+            <a:off x="4870794" y="4219173"/>
+            <a:ext cx="788677" cy="646331"/>
           </a:xfrm>
           <a:prstGeom prst="rect">
             <a:avLst/>
@@ -4617,7 +4620,7 @@
             <a:pPr algn="ctr"/>
             <a:r>
               <a:rPr lang="en-GB" dirty="0"/>
-              <a:t>travel </a:t>
+              <a:t>traffic </a:t>
             </a:r>
           </a:p>
           <a:p>
@@ -4643,8 +4646,8 @@
         </p:nvSpPr>
         <p:spPr>
           <a:xfrm>
-            <a:off x="10185186" y="4215009"/>
-            <a:ext cx="766941" cy="646331"/>
+            <a:off x="10174318" y="4215009"/>
+            <a:ext cx="788677" cy="646331"/>
           </a:xfrm>
           <a:prstGeom prst="rect">
             <a:avLst/>
@@ -4660,7 +4663,7 @@
             <a:pPr algn="ctr"/>
             <a:r>
               <a:rPr lang="en-GB" dirty="0"/>
-              <a:t>travel </a:t>
+              <a:t>traffic </a:t>
             </a:r>
           </a:p>
           <a:p>
@@ -4686,8 +4689,8 @@
         </p:nvSpPr>
         <p:spPr>
           <a:xfrm>
-            <a:off x="8813587" y="4215009"/>
-            <a:ext cx="766941" cy="646331"/>
+            <a:off x="8802719" y="4215009"/>
+            <a:ext cx="788677" cy="646331"/>
           </a:xfrm>
           <a:prstGeom prst="rect">
             <a:avLst/>
@@ -4703,7 +4706,7 @@
             <a:pPr algn="ctr"/>
             <a:r>
               <a:rPr lang="en-GB" dirty="0"/>
-              <a:t>travel </a:t>
+              <a:t>traffic </a:t>
             </a:r>
           </a:p>
           <a:p>
@@ -4729,8 +4732,8 @@
         </p:nvSpPr>
         <p:spPr>
           <a:xfrm>
-            <a:off x="6372692" y="4215009"/>
-            <a:ext cx="1900265" cy="923330"/>
+            <a:off x="6361825" y="4215009"/>
+            <a:ext cx="1922001" cy="923330"/>
           </a:xfrm>
           <a:prstGeom prst="rect">
             <a:avLst/>
@@ -4760,7 +4763,7 @@
             <a:pPr algn="ctr"/>
             <a:r>
               <a:rPr lang="en-GB" dirty="0"/>
-              <a:t>(also a travel lane)</a:t>
+              <a:t>(also a traffic lane)</a:t>
             </a:r>
           </a:p>
         </p:txBody>
@@ -5154,8 +5157,8 @@
         </p:nvSpPr>
         <p:spPr>
           <a:xfrm>
-            <a:off x="5991688" y="1"/>
-            <a:ext cx="1112291" cy="369332"/>
+            <a:off x="5236094" y="12728"/>
+            <a:ext cx="1731051" cy="369332"/>
           </a:xfrm>
           <a:prstGeom prst="rect">
             <a:avLst/>
@@ -5171,7 +5174,7 @@
             <a:pPr algn="ctr"/>
             <a:r>
               <a:rPr lang="en-GB" dirty="0"/>
-              <a:t>easement</a:t>
+              <a:t>road reservation</a:t>
             </a:r>
           </a:p>
         </p:txBody>
@@ -5191,7 +5194,7 @@
         <p:spPr>
           <a:xfrm>
             <a:off x="7251997" y="571812"/>
-            <a:ext cx="1772473" cy="369332"/>
+            <a:ext cx="2199833" cy="369332"/>
           </a:xfrm>
           <a:prstGeom prst="rect">
             <a:avLst/>
@@ -5206,7 +5209,7 @@
           <a:p>
             <a:r>
               <a:rPr lang="en-GB" dirty="0"/>
-              <a:t>roadway (jointly)</a:t>
+              <a:t>driving space (jointly)</a:t>
             </a:r>
           </a:p>
         </p:txBody>
@@ -5229,8 +5232,8 @@
         </p:nvCxnSpPr>
         <p:spPr>
           <a:xfrm rot="5400000" flipH="1" flipV="1">
-            <a:off x="5955342" y="-667213"/>
-            <a:ext cx="574535" cy="3791250"/>
+            <a:off x="6174558" y="-589166"/>
+            <a:ext cx="647046" cy="3707666"/>
           </a:xfrm>
           <a:prstGeom prst="curvedConnector3">
             <a:avLst>
@@ -5271,8 +5274,8 @@
         </p:nvCxnSpPr>
         <p:spPr>
           <a:xfrm rot="16200000" flipV="1">
-            <a:off x="8834956" y="244422"/>
-            <a:ext cx="578676" cy="1972120"/>
+            <a:off x="8941796" y="351262"/>
+            <a:ext cx="578676" cy="1758440"/>
           </a:xfrm>
           <a:prstGeom prst="curvedConnector3">
             <a:avLst>
@@ -5313,8 +5316,8 @@
         </p:nvCxnSpPr>
         <p:spPr>
           <a:xfrm rot="5400000" flipH="1" flipV="1">
-            <a:off x="7473708" y="855294"/>
-            <a:ext cx="578676" cy="750376"/>
+            <a:off x="7580548" y="748454"/>
+            <a:ext cx="578676" cy="964056"/>
           </a:xfrm>
           <a:prstGeom prst="curvedConnector3">
             <a:avLst>
@@ -5351,8 +5354,8 @@
         </p:nvSpPr>
         <p:spPr>
           <a:xfrm rot="16200000">
-            <a:off x="4153826" y="447256"/>
-            <a:ext cx="386317" cy="3192911"/>
+            <a:off x="4380641" y="674070"/>
+            <a:ext cx="386317" cy="2739281"/>
           </a:xfrm>
           <a:prstGeom prst="rightBrace">
             <a:avLst/>
@@ -5395,7 +5398,7 @@
         </p:nvSpPr>
         <p:spPr>
           <a:xfrm>
-            <a:off x="3692317" y="1515679"/>
+            <a:off x="3989581" y="1588190"/>
             <a:ext cx="1309333" cy="369332"/>
           </a:xfrm>
           <a:prstGeom prst="rect">
@@ -5696,7 +5699,7 @@
         </p:nvSpPr>
         <p:spPr>
           <a:xfrm>
-            <a:off x="1335726" y="5613114"/>
+            <a:off x="882789" y="5929653"/>
             <a:ext cx="995273" cy="369332"/>
           </a:xfrm>
           <a:prstGeom prst="rect">
@@ -5732,7 +5735,7 @@
         </p:nvSpPr>
         <p:spPr>
           <a:xfrm rot="5400000">
-            <a:off x="1190151" y="4078991"/>
+            <a:off x="1174057" y="4154932"/>
             <a:ext cx="386317" cy="2734431"/>
           </a:xfrm>
           <a:prstGeom prst="rightBrace">
@@ -5812,8 +5815,8 @@
         </p:nvSpPr>
         <p:spPr>
           <a:xfrm rot="16200000">
-            <a:off x="1911797" y="4394306"/>
-            <a:ext cx="1210588" cy="369332"/>
+            <a:off x="2399763" y="6005777"/>
+            <a:ext cx="701539" cy="369332"/>
           </a:xfrm>
           <a:prstGeom prst="rect">
             <a:avLst/>
@@ -5829,7 +5832,7 @@
             <a:pPr algn="ctr"/>
             <a:r>
               <a:rPr lang="en-GB" dirty="0"/>
-              <a:t>buffer lane</a:t>
+              <a:t>verge</a:t>
             </a:r>
           </a:p>
         </p:txBody>
@@ -6136,6 +6139,11 @@
               <a:rPr lang="en-GB" dirty="0"/>
               <a:t>cycle lane</a:t>
             </a:r>
+            <a:endParaRPr lang="en-GB" dirty="0">
+              <a:highlight>
+                <a:srgbClr val="FFFF00"/>
+              </a:highlight>
+            </a:endParaRPr>
           </a:p>
         </p:txBody>
       </p:sp>
@@ -6225,8 +6233,8 @@
         </p:nvSpPr>
         <p:spPr>
           <a:xfrm rot="16200000">
-            <a:off x="1185304" y="676497"/>
-            <a:ext cx="386317" cy="2734428"/>
+            <a:off x="1414546" y="447255"/>
+            <a:ext cx="386317" cy="3192912"/>
           </a:xfrm>
           <a:prstGeom prst="rightBrace">
             <a:avLst/>
@@ -6269,8 +6277,8 @@
         </p:nvSpPr>
         <p:spPr>
           <a:xfrm>
-            <a:off x="877129" y="1510832"/>
-            <a:ext cx="995273" cy="369332"/>
+            <a:off x="822475" y="1264667"/>
+            <a:ext cx="1588192" cy="646331"/>
           </a:xfrm>
           <a:prstGeom prst="rect">
             <a:avLst/>
@@ -6287,6 +6295,530 @@
             <a:r>
               <a:rPr lang="en-GB" dirty="0"/>
               <a:t>roadside</a:t>
+            </a:r>
+          </a:p>
+          <a:p>
+            <a:pPr algn="ctr"/>
+            <a:r>
+              <a:rPr lang="en-GB" dirty="0"/>
+              <a:t>boundary zone</a:t>
+            </a:r>
+          </a:p>
+        </p:txBody>
+      </p:sp>
+      <p:sp>
+        <p:nvSpPr>
+          <p:cNvPr id="94" name="Line Callout 1 (Accent Bar) 93">
+            <a:extLst>
+              <a:ext uri="{FF2B5EF4-FFF2-40B4-BE49-F238E27FC236}">
+                <a16:creationId xmlns:a16="http://schemas.microsoft.com/office/drawing/2014/main" id="{A8A783FF-1A6E-C747-8DC2-ECC475C354D6}"/>
+              </a:ext>
+            </a:extLst>
+          </p:cNvPr>
+          <p:cNvSpPr/>
+          <p:nvPr/>
+        </p:nvSpPr>
+        <p:spPr>
+          <a:xfrm>
+            <a:off x="11665300" y="3438643"/>
+            <a:ext cx="714375" cy="183805"/>
+          </a:xfrm>
+          <a:prstGeom prst="accentCallout1">
+            <a:avLst>
+              <a:gd name="adj1" fmla="val 18750"/>
+              <a:gd name="adj2" fmla="val -8333"/>
+              <a:gd name="adj3" fmla="val 143593"/>
+              <a:gd name="adj4" fmla="val -37444"/>
+            </a:avLst>
+          </a:prstGeom>
+          <a:noFill/>
+          <a:ln>
+            <a:tailEnd type="stealth" w="med" len="lg"/>
+          </a:ln>
+        </p:spPr>
+        <p:style>
+          <a:lnRef idx="2">
+            <a:schemeClr val="accent1">
+              <a:shade val="50000"/>
+            </a:schemeClr>
+          </a:lnRef>
+          <a:fillRef idx="1">
+            <a:schemeClr val="accent1"/>
+          </a:fillRef>
+          <a:effectRef idx="0">
+            <a:schemeClr val="accent1"/>
+          </a:effectRef>
+          <a:fontRef idx="minor">
+            <a:schemeClr val="lt1"/>
+          </a:fontRef>
+        </p:style>
+        <p:txBody>
+          <a:bodyPr lIns="0" rtlCol="0" anchor="ctr"/>
+          <a:lstStyle/>
+          <a:p>
+            <a:r>
+              <a:rPr lang="en-GB" sz="1200" dirty="0">
+                <a:solidFill>
+                  <a:schemeClr val="tx1"/>
+                </a:solidFill>
+                <a:highlight>
+                  <a:srgbClr val="FFFF00"/>
+                </a:highlight>
+              </a:rPr>
+              <a:t>paved</a:t>
+            </a:r>
+          </a:p>
+        </p:txBody>
+      </p:sp>
+      <p:sp>
+        <p:nvSpPr>
+          <p:cNvPr id="95" name="Line Callout 1 (Accent Bar) 94">
+            <a:extLst>
+              <a:ext uri="{FF2B5EF4-FFF2-40B4-BE49-F238E27FC236}">
+                <a16:creationId xmlns:a16="http://schemas.microsoft.com/office/drawing/2014/main" id="{27ECC754-265A-F346-AC98-C1E030584FF6}"/>
+              </a:ext>
+            </a:extLst>
+          </p:cNvPr>
+          <p:cNvSpPr/>
+          <p:nvPr/>
+        </p:nvSpPr>
+        <p:spPr>
+          <a:xfrm>
+            <a:off x="2366566" y="3379192"/>
+            <a:ext cx="629547" cy="183805"/>
+          </a:xfrm>
+          <a:prstGeom prst="accentCallout1">
+            <a:avLst>
+              <a:gd name="adj1" fmla="val 33490"/>
+              <a:gd name="adj2" fmla="val 91727"/>
+              <a:gd name="adj3" fmla="val 165703"/>
+              <a:gd name="adj4" fmla="val 116410"/>
+            </a:avLst>
+          </a:prstGeom>
+          <a:noFill/>
+          <a:ln>
+            <a:tailEnd type="stealth" w="med" len="lg"/>
+          </a:ln>
+        </p:spPr>
+        <p:style>
+          <a:lnRef idx="2">
+            <a:schemeClr val="accent1">
+              <a:shade val="50000"/>
+            </a:schemeClr>
+          </a:lnRef>
+          <a:fillRef idx="1">
+            <a:schemeClr val="accent1"/>
+          </a:fillRef>
+          <a:effectRef idx="0">
+            <a:schemeClr val="accent1"/>
+          </a:effectRef>
+          <a:fontRef idx="minor">
+            <a:schemeClr val="lt1"/>
+          </a:fontRef>
+        </p:style>
+        <p:txBody>
+          <a:bodyPr lIns="0" rtlCol="0" anchor="ctr"/>
+          <a:lstStyle/>
+          <a:p>
+            <a:r>
+              <a:rPr lang="en-GB" sz="1200" dirty="0">
+                <a:solidFill>
+                  <a:schemeClr val="tx1"/>
+                </a:solidFill>
+                <a:highlight>
+                  <a:srgbClr val="FFFF00"/>
+                </a:highlight>
+              </a:rPr>
+              <a:t>unpaved</a:t>
+            </a:r>
+          </a:p>
+        </p:txBody>
+      </p:sp>
+      <p:pic>
+        <p:nvPicPr>
+          <p:cNvPr id="96" name="Picture 95">
+            <a:extLst>
+              <a:ext uri="{FF2B5EF4-FFF2-40B4-BE49-F238E27FC236}">
+                <a16:creationId xmlns:a16="http://schemas.microsoft.com/office/drawing/2014/main" id="{8C54F2CC-7B63-FD44-8AC7-CD98C4C7A690}"/>
+              </a:ext>
+            </a:extLst>
+          </p:cNvPr>
+          <p:cNvPicPr>
+            <a:picLocks noChangeAspect="1"/>
+          </p:cNvPicPr>
+          <p:nvPr/>
+        </p:nvPicPr>
+        <p:blipFill>
+          <a:blip r:embed="rId9"/>
+          <a:stretch>
+            <a:fillRect/>
+          </a:stretch>
+        </p:blipFill>
+        <p:spPr>
+          <a:xfrm>
+            <a:off x="11291591" y="2337123"/>
+            <a:ext cx="379915" cy="1063762"/>
+          </a:xfrm>
+          <a:prstGeom prst="rect">
+            <a:avLst/>
+          </a:prstGeom>
+          <a:solidFill>
+            <a:srgbClr val="FFFF00"/>
+          </a:solidFill>
+        </p:spPr>
+      </p:pic>
+      <p:sp>
+        <p:nvSpPr>
+          <p:cNvPr id="8" name="TextBox 7">
+            <a:extLst>
+              <a:ext uri="{FF2B5EF4-FFF2-40B4-BE49-F238E27FC236}">
+                <a16:creationId xmlns:a16="http://schemas.microsoft.com/office/drawing/2014/main" id="{CB04589E-646C-2D48-95B9-594661C970B4}"/>
+              </a:ext>
+            </a:extLst>
+          </p:cNvPr>
+          <p:cNvSpPr txBox="1"/>
+          <p:nvPr/>
+        </p:nvSpPr>
+        <p:spPr>
+          <a:xfrm>
+            <a:off x="11386457" y="1889152"/>
+            <a:ext cx="292068" cy="369332"/>
+          </a:xfrm>
+          <a:prstGeom prst="rect">
+            <a:avLst/>
+          </a:prstGeom>
+          <a:noFill/>
+        </p:spPr>
+        <p:txBody>
+          <a:bodyPr wrap="none" rtlCol="0">
+            <a:spAutoFit/>
+          </a:bodyPr>
+          <a:lstStyle/>
+          <a:p>
+            <a:r>
+              <a:rPr lang="en-GB" dirty="0"/>
+              <a:t>?</a:t>
+            </a:r>
+          </a:p>
+        </p:txBody>
+      </p:sp>
+      <p:sp>
+        <p:nvSpPr>
+          <p:cNvPr id="12" name="TextBox 11">
+            <a:extLst>
+              <a:ext uri="{FF2B5EF4-FFF2-40B4-BE49-F238E27FC236}">
+                <a16:creationId xmlns:a16="http://schemas.microsoft.com/office/drawing/2014/main" id="{9804EA8B-7465-F54D-9021-C74E26D03186}"/>
+              </a:ext>
+            </a:extLst>
+          </p:cNvPr>
+          <p:cNvSpPr txBox="1"/>
+          <p:nvPr/>
+        </p:nvSpPr>
+        <p:spPr>
+          <a:xfrm>
+            <a:off x="9420234" y="543139"/>
+            <a:ext cx="2602253" cy="954107"/>
+          </a:xfrm>
+          <a:prstGeom prst="rect">
+            <a:avLst/>
+          </a:prstGeom>
+          <a:noFill/>
+        </p:spPr>
+        <p:txBody>
+          <a:bodyPr wrap="square" rtlCol="0">
+            <a:spAutoFit/>
+          </a:bodyPr>
+          <a:lstStyle/>
+          <a:p>
+            <a:r>
+              <a:rPr lang="en-GB" sz="1400" dirty="0"/>
+              <a:t>Driving space always includes hard shoulder &amp; hard strips </a:t>
+            </a:r>
+            <a:r>
+              <a:rPr lang="en-GB" sz="1400" dirty="0">
+                <a:highlight>
+                  <a:srgbClr val="FFFF00"/>
+                </a:highlight>
+              </a:rPr>
+              <a:t>travelled way only includes hard shoulder/strips if they are in use</a:t>
+            </a:r>
+          </a:p>
+        </p:txBody>
+      </p:sp>
+      <p:sp>
+        <p:nvSpPr>
+          <p:cNvPr id="13" name="TextBox 12">
+            <a:extLst>
+              <a:ext uri="{FF2B5EF4-FFF2-40B4-BE49-F238E27FC236}">
+                <a16:creationId xmlns:a16="http://schemas.microsoft.com/office/drawing/2014/main" id="{EB932EF6-624E-EB43-B3FB-A75AE0BC5754}"/>
+              </a:ext>
+            </a:extLst>
+          </p:cNvPr>
+          <p:cNvSpPr txBox="1"/>
+          <p:nvPr/>
+        </p:nvSpPr>
+        <p:spPr>
+          <a:xfrm>
+            <a:off x="6256565" y="812590"/>
+            <a:ext cx="1451103" cy="369332"/>
+          </a:xfrm>
+          <a:prstGeom prst="rect">
+            <a:avLst/>
+          </a:prstGeom>
+          <a:noFill/>
+        </p:spPr>
+        <p:txBody>
+          <a:bodyPr wrap="none" rtlCol="0">
+            <a:spAutoFit/>
+          </a:bodyPr>
+          <a:lstStyle/>
+          <a:p>
+            <a:r>
+              <a:rPr lang="en-GB" dirty="0">
+                <a:highlight>
+                  <a:srgbClr val="FFFF00"/>
+                </a:highlight>
+              </a:rPr>
+              <a:t>Travelled way</a:t>
+            </a:r>
+          </a:p>
+        </p:txBody>
+      </p:sp>
+      <p:sp>
+        <p:nvSpPr>
+          <p:cNvPr id="98" name="Right Brace 97">
+            <a:extLst>
+              <a:ext uri="{FF2B5EF4-FFF2-40B4-BE49-F238E27FC236}">
+                <a16:creationId xmlns:a16="http://schemas.microsoft.com/office/drawing/2014/main" id="{BFBE47A4-6F1C-354E-9972-E314DFF352EF}"/>
+              </a:ext>
+            </a:extLst>
+          </p:cNvPr>
+          <p:cNvSpPr/>
+          <p:nvPr/>
+        </p:nvSpPr>
+        <p:spPr>
+          <a:xfrm rot="5400000">
+            <a:off x="1637322" y="4963863"/>
+            <a:ext cx="386317" cy="906881"/>
+          </a:xfrm>
+          <a:prstGeom prst="rightBrace">
+            <a:avLst/>
+          </a:prstGeom>
+        </p:spPr>
+        <p:style>
+          <a:lnRef idx="1">
+            <a:schemeClr val="accent1"/>
+          </a:lnRef>
+          <a:fillRef idx="0">
+            <a:schemeClr val="accent1"/>
+          </a:fillRef>
+          <a:effectRef idx="0">
+            <a:schemeClr val="accent1"/>
+          </a:effectRef>
+          <a:fontRef idx="minor">
+            <a:schemeClr val="tx1"/>
+          </a:fontRef>
+        </p:style>
+        <p:txBody>
+          <a:bodyPr rtlCol="0" anchor="ctr"/>
+          <a:lstStyle/>
+          <a:p>
+            <a:pPr algn="ctr"/>
+            <a:endParaRPr lang="en-GB"/>
+          </a:p>
+        </p:txBody>
+      </p:sp>
+      <p:sp>
+        <p:nvSpPr>
+          <p:cNvPr id="16" name="TextBox 15">
+            <a:extLst>
+              <a:ext uri="{FF2B5EF4-FFF2-40B4-BE49-F238E27FC236}">
+                <a16:creationId xmlns:a16="http://schemas.microsoft.com/office/drawing/2014/main" id="{C10FD042-9395-0240-BEBE-AC0C4915C319}"/>
+              </a:ext>
+            </a:extLst>
+          </p:cNvPr>
+          <p:cNvSpPr txBox="1"/>
+          <p:nvPr/>
+        </p:nvSpPr>
+        <p:spPr>
+          <a:xfrm>
+            <a:off x="1257327" y="5601792"/>
+            <a:ext cx="1193275" cy="369332"/>
+          </a:xfrm>
+          <a:prstGeom prst="rect">
+            <a:avLst/>
+          </a:prstGeom>
+          <a:noFill/>
+        </p:spPr>
+        <p:txBody>
+          <a:bodyPr wrap="none" rtlCol="0">
+            <a:spAutoFit/>
+          </a:bodyPr>
+          <a:lstStyle/>
+          <a:p>
+            <a:r>
+              <a:rPr lang="en-GB" dirty="0">
+                <a:highlight>
+                  <a:srgbClr val="FFFF00"/>
+                </a:highlight>
+              </a:rPr>
+              <a:t>Cycle track</a:t>
+            </a:r>
+          </a:p>
+        </p:txBody>
+      </p:sp>
+      <p:sp>
+        <p:nvSpPr>
+          <p:cNvPr id="17" name="TextBox 16">
+            <a:extLst>
+              <a:ext uri="{FF2B5EF4-FFF2-40B4-BE49-F238E27FC236}">
+                <a16:creationId xmlns:a16="http://schemas.microsoft.com/office/drawing/2014/main" id="{900B3C8D-8E3A-E94E-80BD-29FB16AC5929}"/>
+              </a:ext>
+            </a:extLst>
+          </p:cNvPr>
+          <p:cNvSpPr txBox="1"/>
+          <p:nvPr/>
+        </p:nvSpPr>
+        <p:spPr>
+          <a:xfrm>
+            <a:off x="4376058" y="812589"/>
+            <a:ext cx="1985768" cy="461665"/>
+          </a:xfrm>
+          <a:prstGeom prst="rect">
+            <a:avLst/>
+          </a:prstGeom>
+          <a:solidFill>
+            <a:srgbClr val="FFFF00"/>
+          </a:solidFill>
+        </p:spPr>
+        <p:txBody>
+          <a:bodyPr wrap="square" rtlCol="0">
+            <a:spAutoFit/>
+          </a:bodyPr>
+          <a:lstStyle/>
+          <a:p>
+            <a:r>
+              <a:rPr lang="en-GB" sz="1200" dirty="0"/>
+              <a:t>Does travelled way include foot paths and cycle paths?</a:t>
+            </a:r>
+          </a:p>
+        </p:txBody>
+      </p:sp>
+      <p:sp>
+        <p:nvSpPr>
+          <p:cNvPr id="97" name="Right Brace 96">
+            <a:extLst>
+              <a:ext uri="{FF2B5EF4-FFF2-40B4-BE49-F238E27FC236}">
+                <a16:creationId xmlns:a16="http://schemas.microsoft.com/office/drawing/2014/main" id="{7C666409-5385-8A43-A0BF-7336A75F13C5}"/>
+              </a:ext>
+            </a:extLst>
+          </p:cNvPr>
+          <p:cNvSpPr/>
+          <p:nvPr/>
+        </p:nvSpPr>
+        <p:spPr>
+          <a:xfrm rot="5400000">
+            <a:off x="2569470" y="5236347"/>
+            <a:ext cx="386317" cy="906881"/>
+          </a:xfrm>
+          <a:prstGeom prst="rightBrace">
+            <a:avLst/>
+          </a:prstGeom>
+        </p:spPr>
+        <p:style>
+          <a:lnRef idx="1">
+            <a:schemeClr val="accent1"/>
+          </a:lnRef>
+          <a:fillRef idx="0">
+            <a:schemeClr val="accent1"/>
+          </a:fillRef>
+          <a:effectRef idx="0">
+            <a:schemeClr val="accent1"/>
+          </a:effectRef>
+          <a:fontRef idx="minor">
+            <a:schemeClr val="tx1"/>
+          </a:fontRef>
+        </p:style>
+        <p:txBody>
+          <a:bodyPr rtlCol="0" anchor="ctr"/>
+          <a:lstStyle/>
+          <a:p>
+            <a:pPr algn="ctr"/>
+            <a:endParaRPr lang="en-GB"/>
+          </a:p>
+        </p:txBody>
+      </p:sp>
+      <p:sp>
+        <p:nvSpPr>
+          <p:cNvPr id="106" name="TextBox 105">
+            <a:extLst>
+              <a:ext uri="{FF2B5EF4-FFF2-40B4-BE49-F238E27FC236}">
+                <a16:creationId xmlns:a16="http://schemas.microsoft.com/office/drawing/2014/main" id="{B9CC9F6D-1178-A24B-8594-0AFEE673CCE8}"/>
+              </a:ext>
+            </a:extLst>
+          </p:cNvPr>
+          <p:cNvSpPr txBox="1"/>
+          <p:nvPr/>
+        </p:nvSpPr>
+        <p:spPr>
+          <a:xfrm rot="16200000">
+            <a:off x="1580076" y="4418473"/>
+            <a:ext cx="1889813" cy="369332"/>
+          </a:xfrm>
+          <a:prstGeom prst="rect">
+            <a:avLst/>
+          </a:prstGeom>
+          <a:noFill/>
+        </p:spPr>
+        <p:txBody>
+          <a:bodyPr wrap="none" rtlCol="0">
+            <a:spAutoFit/>
+          </a:bodyPr>
+          <a:lstStyle/>
+          <a:p>
+            <a:pPr algn="ctr"/>
+            <a:r>
+              <a:rPr lang="en-GB" dirty="0"/>
+              <a:t>separation barrier</a:t>
+            </a:r>
+          </a:p>
+        </p:txBody>
+      </p:sp>
+      <p:sp>
+        <p:nvSpPr>
+          <p:cNvPr id="2" name="TextBox 1">
+            <a:extLst>
+              <a:ext uri="{FF2B5EF4-FFF2-40B4-BE49-F238E27FC236}">
+                <a16:creationId xmlns:a16="http://schemas.microsoft.com/office/drawing/2014/main" id="{E86E9609-69F2-2D4B-B752-CE894372CC65}"/>
+              </a:ext>
+            </a:extLst>
+          </p:cNvPr>
+          <p:cNvSpPr txBox="1"/>
+          <p:nvPr/>
+        </p:nvSpPr>
+        <p:spPr>
+          <a:xfrm>
+            <a:off x="2803440" y="6496382"/>
+            <a:ext cx="2432654" cy="369332"/>
+          </a:xfrm>
+          <a:prstGeom prst="rect">
+            <a:avLst/>
+          </a:prstGeom>
+          <a:noFill/>
+        </p:spPr>
+        <p:txBody>
+          <a:bodyPr wrap="none" rtlCol="0">
+            <a:spAutoFit/>
+          </a:bodyPr>
+          <a:lstStyle/>
+          <a:p>
+            <a:r>
+              <a:rPr lang="en-GB" dirty="0">
+                <a:highlight>
+                  <a:srgbClr val="FFFF00"/>
+                </a:highlight>
+              </a:rPr>
+              <a:t>Add picture with a ditch</a:t>
             </a:r>
           </a:p>
         </p:txBody>
@@ -6295,6 +6827,3157 @@
     <p:extLst>
       <p:ext uri="{BB962C8B-B14F-4D97-AF65-F5344CB8AC3E}">
         <p14:creationId xmlns:p14="http://schemas.microsoft.com/office/powerpoint/2010/main" val="3106302050"/>
+      </p:ext>
+    </p:extLst>
+  </p:cSld>
+  <p:clrMapOvr>
+    <a:masterClrMapping/>
+  </p:clrMapOvr>
+</p:sld>
+</file>
+
+<file path=ppt/slides/slide2.xml><?xml version="1.0" encoding="utf-8"?>
+<p:sld xmlns:a="http://schemas.openxmlformats.org/drawingml/2006/main" xmlns:r="http://schemas.openxmlformats.org/officeDocument/2006/relationships" xmlns:p="http://schemas.openxmlformats.org/presentationml/2006/main">
+  <p:cSld>
+    <p:spTree>
+      <p:nvGrpSpPr>
+        <p:cNvPr id="1" name=""/>
+        <p:cNvGrpSpPr/>
+        <p:nvPr/>
+      </p:nvGrpSpPr>
+      <p:grpSpPr>
+        <a:xfrm>
+          <a:off x="0" y="0"/>
+          <a:ext cx="0" cy="0"/>
+          <a:chOff x="0" y="0"/>
+          <a:chExt cx="0" cy="0"/>
+        </a:xfrm>
+      </p:grpSpPr>
+      <p:pic>
+        <p:nvPicPr>
+          <p:cNvPr id="2" name="Picture 1">
+            <a:extLst>
+              <a:ext uri="{FF2B5EF4-FFF2-40B4-BE49-F238E27FC236}">
+                <a16:creationId xmlns:a16="http://schemas.microsoft.com/office/drawing/2014/main" id="{26D0685C-723E-204B-AAA5-CE66167F4577}"/>
+              </a:ext>
+            </a:extLst>
+          </p:cNvPr>
+          <p:cNvPicPr>
+            <a:picLocks noChangeAspect="1"/>
+          </p:cNvPicPr>
+          <p:nvPr/>
+        </p:nvPicPr>
+        <p:blipFill rotWithShape="1">
+          <a:blip r:embed="rId2"/>
+          <a:srcRect r="50000"/>
+          <a:stretch/>
+        </p:blipFill>
+        <p:spPr>
+          <a:xfrm>
+            <a:off x="2293335" y="3419820"/>
+            <a:ext cx="457197" cy="457200"/>
+          </a:xfrm>
+          <a:prstGeom prst="rect">
+            <a:avLst/>
+          </a:prstGeom>
+        </p:spPr>
+      </p:pic>
+      <p:pic>
+        <p:nvPicPr>
+          <p:cNvPr id="3" name="Picture 2">
+            <a:extLst>
+              <a:ext uri="{FF2B5EF4-FFF2-40B4-BE49-F238E27FC236}">
+                <a16:creationId xmlns:a16="http://schemas.microsoft.com/office/drawing/2014/main" id="{81D8EF82-5E05-744E-B708-635972C469AB}"/>
+              </a:ext>
+            </a:extLst>
+          </p:cNvPr>
+          <p:cNvPicPr>
+            <a:picLocks noChangeAspect="1"/>
+          </p:cNvPicPr>
+          <p:nvPr/>
+        </p:nvPicPr>
+        <p:blipFill>
+          <a:blip r:embed="rId3"/>
+          <a:stretch>
+            <a:fillRect/>
+          </a:stretch>
+        </p:blipFill>
+        <p:spPr>
+          <a:xfrm>
+            <a:off x="3348929" y="2821293"/>
+            <a:ext cx="1089216" cy="892708"/>
+          </a:xfrm>
+          <a:prstGeom prst="rect">
+            <a:avLst/>
+          </a:prstGeom>
+        </p:spPr>
+      </p:pic>
+      <p:pic>
+        <p:nvPicPr>
+          <p:cNvPr id="4" name="Picture 3">
+            <a:extLst>
+              <a:ext uri="{FF2B5EF4-FFF2-40B4-BE49-F238E27FC236}">
+                <a16:creationId xmlns:a16="http://schemas.microsoft.com/office/drawing/2014/main" id="{5526CABD-F11C-174E-B58A-B5D9CFAA2DA0}"/>
+              </a:ext>
+            </a:extLst>
+          </p:cNvPr>
+          <p:cNvPicPr>
+            <a:picLocks noChangeAspect="1"/>
+          </p:cNvPicPr>
+          <p:nvPr/>
+        </p:nvPicPr>
+        <p:blipFill>
+          <a:blip r:embed="rId4"/>
+          <a:stretch>
+            <a:fillRect/>
+          </a:stretch>
+        </p:blipFill>
+        <p:spPr>
+          <a:xfrm>
+            <a:off x="4678945" y="2799254"/>
+            <a:ext cx="1018244" cy="906144"/>
+          </a:xfrm>
+          <a:prstGeom prst="rect">
+            <a:avLst/>
+          </a:prstGeom>
+        </p:spPr>
+      </p:pic>
+      <p:pic>
+        <p:nvPicPr>
+          <p:cNvPr id="5" name="Picture 4">
+            <a:extLst>
+              <a:ext uri="{FF2B5EF4-FFF2-40B4-BE49-F238E27FC236}">
+                <a16:creationId xmlns:a16="http://schemas.microsoft.com/office/drawing/2014/main" id="{9F7FE6B0-9AE1-A94D-84A9-680CB3F57561}"/>
+              </a:ext>
+            </a:extLst>
+          </p:cNvPr>
+          <p:cNvPicPr>
+            <a:picLocks noChangeAspect="1"/>
+          </p:cNvPicPr>
+          <p:nvPr/>
+        </p:nvPicPr>
+        <p:blipFill>
+          <a:blip r:embed="rId5"/>
+          <a:stretch>
+            <a:fillRect/>
+          </a:stretch>
+        </p:blipFill>
+        <p:spPr>
+          <a:xfrm>
+            <a:off x="1649119" y="2777217"/>
+            <a:ext cx="583328" cy="906141"/>
+          </a:xfrm>
+          <a:prstGeom prst="rect">
+            <a:avLst/>
+          </a:prstGeom>
+        </p:spPr>
+      </p:pic>
+      <p:sp>
+        <p:nvSpPr>
+          <p:cNvPr id="6" name="Rectangle 5">
+            <a:extLst>
+              <a:ext uri="{FF2B5EF4-FFF2-40B4-BE49-F238E27FC236}">
+                <a16:creationId xmlns:a16="http://schemas.microsoft.com/office/drawing/2014/main" id="{C4E8CF96-E5FF-1146-A1E8-E092C1969A48}"/>
+              </a:ext>
+            </a:extLst>
+          </p:cNvPr>
+          <p:cNvSpPr/>
+          <p:nvPr/>
+        </p:nvSpPr>
+        <p:spPr>
+          <a:xfrm>
+            <a:off x="3204159" y="3683358"/>
+            <a:ext cx="2743200" cy="45720"/>
+          </a:xfrm>
+          <a:prstGeom prst="rect">
+            <a:avLst/>
+          </a:prstGeom>
+          <a:solidFill>
+            <a:schemeClr val="tx2"/>
+          </a:solidFill>
+        </p:spPr>
+        <p:style>
+          <a:lnRef idx="2">
+            <a:schemeClr val="accent1">
+              <a:shade val="50000"/>
+            </a:schemeClr>
+          </a:lnRef>
+          <a:fillRef idx="1">
+            <a:schemeClr val="accent1"/>
+          </a:fillRef>
+          <a:effectRef idx="0">
+            <a:schemeClr val="accent1"/>
+          </a:effectRef>
+          <a:fontRef idx="minor">
+            <a:schemeClr val="lt1"/>
+          </a:fontRef>
+        </p:style>
+        <p:txBody>
+          <a:bodyPr rtlCol="0" anchor="ctr"/>
+          <a:lstStyle/>
+          <a:p>
+            <a:pPr algn="ctr"/>
+            <a:endParaRPr lang="en-GB"/>
+          </a:p>
+        </p:txBody>
+      </p:sp>
+      <p:sp>
+        <p:nvSpPr>
+          <p:cNvPr id="7" name="Rectangle 6">
+            <a:extLst>
+              <a:ext uri="{FF2B5EF4-FFF2-40B4-BE49-F238E27FC236}">
+                <a16:creationId xmlns:a16="http://schemas.microsoft.com/office/drawing/2014/main" id="{311ED257-6E95-B347-9B7F-E246ED416CAE}"/>
+              </a:ext>
+            </a:extLst>
+          </p:cNvPr>
+          <p:cNvSpPr/>
+          <p:nvPr/>
+        </p:nvSpPr>
+        <p:spPr>
+          <a:xfrm>
+            <a:off x="2738503" y="3674107"/>
+            <a:ext cx="457200" cy="54971"/>
+          </a:xfrm>
+          <a:prstGeom prst="rect">
+            <a:avLst/>
+          </a:prstGeom>
+          <a:pattFill prst="lgConfetti">
+            <a:fgClr>
+              <a:schemeClr val="tx2"/>
+            </a:fgClr>
+            <a:bgClr>
+              <a:schemeClr val="bg1"/>
+            </a:bgClr>
+          </a:pattFill>
+          <a:ln>
+            <a:noFill/>
+          </a:ln>
+        </p:spPr>
+        <p:style>
+          <a:lnRef idx="2">
+            <a:schemeClr val="accent1">
+              <a:shade val="50000"/>
+            </a:schemeClr>
+          </a:lnRef>
+          <a:fillRef idx="1">
+            <a:schemeClr val="accent1"/>
+          </a:fillRef>
+          <a:effectRef idx="0">
+            <a:schemeClr val="accent1"/>
+          </a:effectRef>
+          <a:fontRef idx="minor">
+            <a:schemeClr val="lt1"/>
+          </a:fontRef>
+        </p:style>
+        <p:txBody>
+          <a:bodyPr rtlCol="0" anchor="ctr"/>
+          <a:lstStyle/>
+          <a:p>
+            <a:pPr algn="ctr"/>
+            <a:endParaRPr lang="en-GB"/>
+          </a:p>
+        </p:txBody>
+      </p:sp>
+      <p:sp>
+        <p:nvSpPr>
+          <p:cNvPr id="8" name="Rectangle 7">
+            <a:extLst>
+              <a:ext uri="{FF2B5EF4-FFF2-40B4-BE49-F238E27FC236}">
+                <a16:creationId xmlns:a16="http://schemas.microsoft.com/office/drawing/2014/main" id="{AC238C7D-086E-0B45-AF45-5E318541D820}"/>
+              </a:ext>
+            </a:extLst>
+          </p:cNvPr>
+          <p:cNvSpPr/>
+          <p:nvPr/>
+        </p:nvSpPr>
+        <p:spPr>
+          <a:xfrm>
+            <a:off x="1387125" y="3683358"/>
+            <a:ext cx="914400" cy="45720"/>
+          </a:xfrm>
+          <a:prstGeom prst="rect">
+            <a:avLst/>
+          </a:prstGeom>
+          <a:solidFill>
+            <a:schemeClr val="tx2"/>
+          </a:solidFill>
+          <a:ln>
+            <a:noFill/>
+          </a:ln>
+        </p:spPr>
+        <p:style>
+          <a:lnRef idx="2">
+            <a:schemeClr val="accent1">
+              <a:shade val="50000"/>
+            </a:schemeClr>
+          </a:lnRef>
+          <a:fillRef idx="1">
+            <a:schemeClr val="accent1"/>
+          </a:fillRef>
+          <a:effectRef idx="0">
+            <a:schemeClr val="accent1"/>
+          </a:effectRef>
+          <a:fontRef idx="minor">
+            <a:schemeClr val="lt1"/>
+          </a:fontRef>
+        </p:style>
+        <p:txBody>
+          <a:bodyPr rtlCol="0" anchor="ctr"/>
+          <a:lstStyle/>
+          <a:p>
+            <a:pPr algn="ctr"/>
+            <a:endParaRPr lang="en-GB" dirty="0"/>
+          </a:p>
+        </p:txBody>
+      </p:sp>
+      <p:sp>
+        <p:nvSpPr>
+          <p:cNvPr id="9" name="Rectangle 8">
+            <a:extLst>
+              <a:ext uri="{FF2B5EF4-FFF2-40B4-BE49-F238E27FC236}">
+                <a16:creationId xmlns:a16="http://schemas.microsoft.com/office/drawing/2014/main" id="{6EB2D1FE-2DC1-DB49-953D-3644C68E9595}"/>
+              </a:ext>
+            </a:extLst>
+          </p:cNvPr>
+          <p:cNvSpPr/>
+          <p:nvPr/>
+        </p:nvSpPr>
+        <p:spPr>
+          <a:xfrm>
+            <a:off x="1387126" y="3720943"/>
+            <a:ext cx="906210" cy="93539"/>
+          </a:xfrm>
+          <a:prstGeom prst="rect">
+            <a:avLst/>
+          </a:prstGeom>
+          <a:pattFill prst="lgConfetti">
+            <a:fgClr>
+              <a:schemeClr val="tx2"/>
+            </a:fgClr>
+            <a:bgClr>
+              <a:schemeClr val="bg1"/>
+            </a:bgClr>
+          </a:pattFill>
+          <a:ln>
+            <a:noFill/>
+          </a:ln>
+        </p:spPr>
+        <p:style>
+          <a:lnRef idx="2">
+            <a:schemeClr val="accent1">
+              <a:shade val="50000"/>
+            </a:schemeClr>
+          </a:lnRef>
+          <a:fillRef idx="1">
+            <a:schemeClr val="accent1"/>
+          </a:fillRef>
+          <a:effectRef idx="0">
+            <a:schemeClr val="accent1"/>
+          </a:effectRef>
+          <a:fontRef idx="minor">
+            <a:schemeClr val="lt1"/>
+          </a:fontRef>
+        </p:style>
+        <p:txBody>
+          <a:bodyPr rtlCol="0" anchor="ctr"/>
+          <a:lstStyle/>
+          <a:p>
+            <a:pPr algn="ctr"/>
+            <a:endParaRPr lang="en-GB"/>
+          </a:p>
+        </p:txBody>
+      </p:sp>
+      <p:sp>
+        <p:nvSpPr>
+          <p:cNvPr id="10" name="Rectangle 9">
+            <a:extLst>
+              <a:ext uri="{FF2B5EF4-FFF2-40B4-BE49-F238E27FC236}">
+                <a16:creationId xmlns:a16="http://schemas.microsoft.com/office/drawing/2014/main" id="{584378FE-9068-9742-9249-C878F74360EC}"/>
+              </a:ext>
+            </a:extLst>
+          </p:cNvPr>
+          <p:cNvSpPr/>
+          <p:nvPr/>
+        </p:nvSpPr>
+        <p:spPr>
+          <a:xfrm>
+            <a:off x="2742597" y="3740468"/>
+            <a:ext cx="3204761" cy="168144"/>
+          </a:xfrm>
+          <a:prstGeom prst="rect">
+            <a:avLst/>
+          </a:prstGeom>
+          <a:pattFill prst="lgConfetti">
+            <a:fgClr>
+              <a:schemeClr val="tx2"/>
+            </a:fgClr>
+            <a:bgClr>
+              <a:schemeClr val="bg1"/>
+            </a:bgClr>
+          </a:pattFill>
+          <a:ln>
+            <a:noFill/>
+          </a:ln>
+        </p:spPr>
+        <p:style>
+          <a:lnRef idx="2">
+            <a:schemeClr val="accent1">
+              <a:shade val="50000"/>
+            </a:schemeClr>
+          </a:lnRef>
+          <a:fillRef idx="1">
+            <a:schemeClr val="accent1"/>
+          </a:fillRef>
+          <a:effectRef idx="0">
+            <a:schemeClr val="accent1"/>
+          </a:effectRef>
+          <a:fontRef idx="minor">
+            <a:schemeClr val="lt1"/>
+          </a:fontRef>
+        </p:style>
+        <p:txBody>
+          <a:bodyPr rtlCol="0" anchor="ctr"/>
+          <a:lstStyle/>
+          <a:p>
+            <a:pPr algn="ctr"/>
+            <a:endParaRPr lang="en-GB"/>
+          </a:p>
+        </p:txBody>
+      </p:sp>
+      <p:sp>
+        <p:nvSpPr>
+          <p:cNvPr id="11" name="Rectangle 10">
+            <a:extLst>
+              <a:ext uri="{FF2B5EF4-FFF2-40B4-BE49-F238E27FC236}">
+                <a16:creationId xmlns:a16="http://schemas.microsoft.com/office/drawing/2014/main" id="{58009AFB-D33C-8C48-9F43-B18D62E29503}"/>
+              </a:ext>
+            </a:extLst>
+          </p:cNvPr>
+          <p:cNvSpPr/>
+          <p:nvPr/>
+        </p:nvSpPr>
+        <p:spPr>
+          <a:xfrm>
+            <a:off x="1387125" y="3920002"/>
+            <a:ext cx="4560233" cy="168144"/>
+          </a:xfrm>
+          <a:prstGeom prst="rect">
+            <a:avLst/>
+          </a:prstGeom>
+          <a:pattFill prst="dashHorz">
+            <a:fgClr>
+              <a:schemeClr val="tx2"/>
+            </a:fgClr>
+            <a:bgClr>
+              <a:schemeClr val="bg1"/>
+            </a:bgClr>
+          </a:pattFill>
+          <a:ln>
+            <a:noFill/>
+          </a:ln>
+        </p:spPr>
+        <p:style>
+          <a:lnRef idx="2">
+            <a:schemeClr val="accent1">
+              <a:shade val="50000"/>
+            </a:schemeClr>
+          </a:lnRef>
+          <a:fillRef idx="1">
+            <a:schemeClr val="accent1"/>
+          </a:fillRef>
+          <a:effectRef idx="0">
+            <a:schemeClr val="accent1"/>
+          </a:effectRef>
+          <a:fontRef idx="minor">
+            <a:schemeClr val="lt1"/>
+          </a:fontRef>
+        </p:style>
+        <p:txBody>
+          <a:bodyPr rtlCol="0" anchor="ctr"/>
+          <a:lstStyle/>
+          <a:p>
+            <a:pPr algn="ctr"/>
+            <a:endParaRPr lang="en-GB" dirty="0"/>
+          </a:p>
+        </p:txBody>
+      </p:sp>
+      <p:sp>
+        <p:nvSpPr>
+          <p:cNvPr id="12" name="Rectangle 11">
+            <a:extLst>
+              <a:ext uri="{FF2B5EF4-FFF2-40B4-BE49-F238E27FC236}">
+                <a16:creationId xmlns:a16="http://schemas.microsoft.com/office/drawing/2014/main" id="{A744E7C5-4874-D342-AEC8-AD4A6BA6E4DA}"/>
+              </a:ext>
+            </a:extLst>
+          </p:cNvPr>
+          <p:cNvSpPr/>
+          <p:nvPr/>
+        </p:nvSpPr>
+        <p:spPr>
+          <a:xfrm>
+            <a:off x="1387125" y="3812250"/>
+            <a:ext cx="1363407" cy="125395"/>
+          </a:xfrm>
+          <a:prstGeom prst="rect">
+            <a:avLst/>
+          </a:prstGeom>
+          <a:pattFill prst="dashHorz">
+            <a:fgClr>
+              <a:schemeClr val="tx2"/>
+            </a:fgClr>
+            <a:bgClr>
+              <a:schemeClr val="bg1"/>
+            </a:bgClr>
+          </a:pattFill>
+          <a:ln>
+            <a:noFill/>
+          </a:ln>
+        </p:spPr>
+        <p:style>
+          <a:lnRef idx="2">
+            <a:schemeClr val="accent1">
+              <a:shade val="50000"/>
+            </a:schemeClr>
+          </a:lnRef>
+          <a:fillRef idx="1">
+            <a:schemeClr val="accent1"/>
+          </a:fillRef>
+          <a:effectRef idx="0">
+            <a:schemeClr val="accent1"/>
+          </a:effectRef>
+          <a:fontRef idx="minor">
+            <a:schemeClr val="lt1"/>
+          </a:fontRef>
+        </p:style>
+        <p:txBody>
+          <a:bodyPr rtlCol="0" anchor="ctr"/>
+          <a:lstStyle/>
+          <a:p>
+            <a:pPr algn="ctr"/>
+            <a:endParaRPr lang="en-GB" dirty="0"/>
+          </a:p>
+        </p:txBody>
+      </p:sp>
+      <p:sp>
+        <p:nvSpPr>
+          <p:cNvPr id="13" name="Rectangle 12">
+            <a:extLst>
+              <a:ext uri="{FF2B5EF4-FFF2-40B4-BE49-F238E27FC236}">
+                <a16:creationId xmlns:a16="http://schemas.microsoft.com/office/drawing/2014/main" id="{0DA7B8A0-E73C-A140-9563-BFC3D70489B9}"/>
+              </a:ext>
+            </a:extLst>
+          </p:cNvPr>
+          <p:cNvSpPr/>
+          <p:nvPr/>
+        </p:nvSpPr>
+        <p:spPr>
+          <a:xfrm>
+            <a:off x="2293334" y="3729078"/>
+            <a:ext cx="449137" cy="125395"/>
+          </a:xfrm>
+          <a:prstGeom prst="rect">
+            <a:avLst/>
+          </a:prstGeom>
+          <a:pattFill prst="dashHorz">
+            <a:fgClr>
+              <a:schemeClr val="tx2"/>
+            </a:fgClr>
+            <a:bgClr>
+              <a:schemeClr val="bg1"/>
+            </a:bgClr>
+          </a:pattFill>
+          <a:ln>
+            <a:noFill/>
+          </a:ln>
+        </p:spPr>
+        <p:style>
+          <a:lnRef idx="2">
+            <a:schemeClr val="accent1">
+              <a:shade val="50000"/>
+            </a:schemeClr>
+          </a:lnRef>
+          <a:fillRef idx="1">
+            <a:schemeClr val="accent1"/>
+          </a:fillRef>
+          <a:effectRef idx="0">
+            <a:schemeClr val="accent1"/>
+          </a:effectRef>
+          <a:fontRef idx="minor">
+            <a:schemeClr val="lt1"/>
+          </a:fontRef>
+        </p:style>
+        <p:txBody>
+          <a:bodyPr rtlCol="0" anchor="ctr"/>
+          <a:lstStyle/>
+          <a:p>
+            <a:pPr algn="ctr"/>
+            <a:endParaRPr lang="en-GB" dirty="0"/>
+          </a:p>
+        </p:txBody>
+      </p:sp>
+      <p:sp>
+        <p:nvSpPr>
+          <p:cNvPr id="15" name="Line Callout 1 (Accent Bar) 14">
+            <a:extLst>
+              <a:ext uri="{FF2B5EF4-FFF2-40B4-BE49-F238E27FC236}">
+                <a16:creationId xmlns:a16="http://schemas.microsoft.com/office/drawing/2014/main" id="{B59D20CA-96C5-9446-8E75-99F59AE77614}"/>
+              </a:ext>
+            </a:extLst>
+          </p:cNvPr>
+          <p:cNvSpPr/>
+          <p:nvPr/>
+        </p:nvSpPr>
+        <p:spPr>
+          <a:xfrm>
+            <a:off x="6096000" y="3410640"/>
+            <a:ext cx="714375" cy="183805"/>
+          </a:xfrm>
+          <a:prstGeom prst="accentCallout1">
+            <a:avLst>
+              <a:gd name="adj1" fmla="val 18750"/>
+              <a:gd name="adj2" fmla="val -8333"/>
+              <a:gd name="adj3" fmla="val 143593"/>
+              <a:gd name="adj4" fmla="val -37444"/>
+            </a:avLst>
+          </a:prstGeom>
+          <a:noFill/>
+          <a:ln>
+            <a:tailEnd type="stealth" w="med" len="lg"/>
+          </a:ln>
+        </p:spPr>
+        <p:style>
+          <a:lnRef idx="2">
+            <a:schemeClr val="accent1">
+              <a:shade val="50000"/>
+            </a:schemeClr>
+          </a:lnRef>
+          <a:fillRef idx="1">
+            <a:schemeClr val="accent1"/>
+          </a:fillRef>
+          <a:effectRef idx="0">
+            <a:schemeClr val="accent1"/>
+          </a:effectRef>
+          <a:fontRef idx="minor">
+            <a:schemeClr val="lt1"/>
+          </a:fontRef>
+        </p:style>
+        <p:txBody>
+          <a:bodyPr lIns="0" rtlCol="0" anchor="ctr"/>
+          <a:lstStyle/>
+          <a:p>
+            <a:r>
+              <a:rPr lang="en-GB" sz="1200" dirty="0">
+                <a:solidFill>
+                  <a:schemeClr val="tx1"/>
+                </a:solidFill>
+              </a:rPr>
+              <a:t>surface</a:t>
+            </a:r>
+          </a:p>
+        </p:txBody>
+      </p:sp>
+      <p:sp>
+        <p:nvSpPr>
+          <p:cNvPr id="17" name="Line Callout 1 (Accent Bar) 16">
+            <a:extLst>
+              <a:ext uri="{FF2B5EF4-FFF2-40B4-BE49-F238E27FC236}">
+                <a16:creationId xmlns:a16="http://schemas.microsoft.com/office/drawing/2014/main" id="{D3E31729-4461-884D-B24E-94163CA9F55B}"/>
+              </a:ext>
+            </a:extLst>
+          </p:cNvPr>
+          <p:cNvSpPr/>
+          <p:nvPr/>
+        </p:nvSpPr>
+        <p:spPr>
+          <a:xfrm>
+            <a:off x="6276975" y="3591455"/>
+            <a:ext cx="714375" cy="183805"/>
+          </a:xfrm>
+          <a:prstGeom prst="accentCallout1">
+            <a:avLst>
+              <a:gd name="adj1" fmla="val 18750"/>
+              <a:gd name="adj2" fmla="val -8333"/>
+              <a:gd name="adj3" fmla="val 62406"/>
+              <a:gd name="adj4" fmla="val -47222"/>
+            </a:avLst>
+          </a:prstGeom>
+          <a:noFill/>
+          <a:ln>
+            <a:tailEnd type="stealth" w="med" len="lg"/>
+          </a:ln>
+        </p:spPr>
+        <p:style>
+          <a:lnRef idx="2">
+            <a:schemeClr val="accent1">
+              <a:shade val="50000"/>
+            </a:schemeClr>
+          </a:lnRef>
+          <a:fillRef idx="1">
+            <a:schemeClr val="accent1"/>
+          </a:fillRef>
+          <a:effectRef idx="0">
+            <a:schemeClr val="accent1"/>
+          </a:effectRef>
+          <a:fontRef idx="minor">
+            <a:schemeClr val="lt1"/>
+          </a:fontRef>
+        </p:style>
+        <p:txBody>
+          <a:bodyPr lIns="0" rtlCol="0" anchor="ctr"/>
+          <a:lstStyle/>
+          <a:p>
+            <a:r>
+              <a:rPr lang="en-GB" sz="1200" dirty="0">
+                <a:solidFill>
+                  <a:schemeClr val="tx1"/>
+                </a:solidFill>
+                <a:highlight>
+                  <a:srgbClr val="FFFF00"/>
+                </a:highlight>
+              </a:rPr>
+              <a:t>pavement</a:t>
+            </a:r>
+          </a:p>
+        </p:txBody>
+      </p:sp>
+      <p:sp>
+        <p:nvSpPr>
+          <p:cNvPr id="18" name="Line Callout 1 (Accent Bar) 17">
+            <a:extLst>
+              <a:ext uri="{FF2B5EF4-FFF2-40B4-BE49-F238E27FC236}">
+                <a16:creationId xmlns:a16="http://schemas.microsoft.com/office/drawing/2014/main" id="{B1512C00-62F1-044A-996B-4821AB70F4C9}"/>
+              </a:ext>
+            </a:extLst>
+          </p:cNvPr>
+          <p:cNvSpPr/>
+          <p:nvPr/>
+        </p:nvSpPr>
+        <p:spPr>
+          <a:xfrm>
+            <a:off x="6340474" y="3854473"/>
+            <a:ext cx="825703" cy="183805"/>
+          </a:xfrm>
+          <a:prstGeom prst="accentCallout1">
+            <a:avLst>
+              <a:gd name="adj1" fmla="val 18750"/>
+              <a:gd name="adj2" fmla="val -8333"/>
+              <a:gd name="adj3" fmla="val -15325"/>
+              <a:gd name="adj4" fmla="val -52392"/>
+            </a:avLst>
+          </a:prstGeom>
+          <a:noFill/>
+          <a:ln>
+            <a:tailEnd type="stealth" w="med" len="lg"/>
+          </a:ln>
+        </p:spPr>
+        <p:style>
+          <a:lnRef idx="2">
+            <a:schemeClr val="accent1">
+              <a:shade val="50000"/>
+            </a:schemeClr>
+          </a:lnRef>
+          <a:fillRef idx="1">
+            <a:schemeClr val="accent1"/>
+          </a:fillRef>
+          <a:effectRef idx="0">
+            <a:schemeClr val="accent1"/>
+          </a:effectRef>
+          <a:fontRef idx="minor">
+            <a:schemeClr val="lt1"/>
+          </a:fontRef>
+        </p:style>
+        <p:txBody>
+          <a:bodyPr lIns="0" rtlCol="0" anchor="ctr"/>
+          <a:lstStyle/>
+          <a:p>
+            <a:r>
+              <a:rPr lang="en-GB" sz="1200" dirty="0">
+                <a:solidFill>
+                  <a:schemeClr val="tx1"/>
+                </a:solidFill>
+              </a:rPr>
+              <a:t>Subsurface or roadbed</a:t>
+            </a:r>
+          </a:p>
+        </p:txBody>
+      </p:sp>
+      <p:cxnSp>
+        <p:nvCxnSpPr>
+          <p:cNvPr id="19" name="Straight Connector 18">
+            <a:extLst>
+              <a:ext uri="{FF2B5EF4-FFF2-40B4-BE49-F238E27FC236}">
+                <a16:creationId xmlns:a16="http://schemas.microsoft.com/office/drawing/2014/main" id="{BAF05439-056E-3D49-A66D-628F9AF7FF96}"/>
+              </a:ext>
+            </a:extLst>
+          </p:cNvPr>
+          <p:cNvCxnSpPr/>
+          <p:nvPr/>
+        </p:nvCxnSpPr>
+        <p:spPr>
+          <a:xfrm>
+            <a:off x="3207737" y="3856540"/>
+            <a:ext cx="0" cy="1371600"/>
+          </a:xfrm>
+          <a:prstGeom prst="line">
+            <a:avLst/>
+          </a:prstGeom>
+        </p:spPr>
+        <p:style>
+          <a:lnRef idx="1">
+            <a:schemeClr val="accent1"/>
+          </a:lnRef>
+          <a:fillRef idx="0">
+            <a:schemeClr val="accent1"/>
+          </a:fillRef>
+          <a:effectRef idx="0">
+            <a:schemeClr val="accent1"/>
+          </a:effectRef>
+          <a:fontRef idx="minor">
+            <a:schemeClr val="tx1"/>
+          </a:fontRef>
+        </p:style>
+      </p:cxnSp>
+      <p:cxnSp>
+        <p:nvCxnSpPr>
+          <p:cNvPr id="20" name="Straight Connector 19">
+            <a:extLst>
+              <a:ext uri="{FF2B5EF4-FFF2-40B4-BE49-F238E27FC236}">
+                <a16:creationId xmlns:a16="http://schemas.microsoft.com/office/drawing/2014/main" id="{649A3803-0D48-7C4E-A1E7-D89AB229C1CF}"/>
+              </a:ext>
+            </a:extLst>
+          </p:cNvPr>
+          <p:cNvCxnSpPr/>
+          <p:nvPr/>
+        </p:nvCxnSpPr>
+        <p:spPr>
+          <a:xfrm>
+            <a:off x="2293337" y="3856540"/>
+            <a:ext cx="0" cy="1371600"/>
+          </a:xfrm>
+          <a:prstGeom prst="line">
+            <a:avLst/>
+          </a:prstGeom>
+        </p:spPr>
+        <p:style>
+          <a:lnRef idx="1">
+            <a:schemeClr val="accent1"/>
+          </a:lnRef>
+          <a:fillRef idx="0">
+            <a:schemeClr val="accent1"/>
+          </a:fillRef>
+          <a:effectRef idx="0">
+            <a:schemeClr val="accent1"/>
+          </a:effectRef>
+          <a:fontRef idx="minor">
+            <a:schemeClr val="tx1"/>
+          </a:fontRef>
+        </p:style>
+      </p:cxnSp>
+      <p:cxnSp>
+        <p:nvCxnSpPr>
+          <p:cNvPr id="21" name="Straight Connector 20">
+            <a:extLst>
+              <a:ext uri="{FF2B5EF4-FFF2-40B4-BE49-F238E27FC236}">
+                <a16:creationId xmlns:a16="http://schemas.microsoft.com/office/drawing/2014/main" id="{61B34D3D-0958-4C46-B298-241A00F07C35}"/>
+              </a:ext>
+            </a:extLst>
+          </p:cNvPr>
+          <p:cNvCxnSpPr/>
+          <p:nvPr/>
+        </p:nvCxnSpPr>
+        <p:spPr>
+          <a:xfrm>
+            <a:off x="2750537" y="3856540"/>
+            <a:ext cx="0" cy="1371600"/>
+          </a:xfrm>
+          <a:prstGeom prst="line">
+            <a:avLst/>
+          </a:prstGeom>
+        </p:spPr>
+        <p:style>
+          <a:lnRef idx="1">
+            <a:schemeClr val="accent1"/>
+          </a:lnRef>
+          <a:fillRef idx="0">
+            <a:schemeClr val="accent1"/>
+          </a:fillRef>
+          <a:effectRef idx="0">
+            <a:schemeClr val="accent1"/>
+          </a:effectRef>
+          <a:fontRef idx="minor">
+            <a:schemeClr val="tx1"/>
+          </a:fontRef>
+        </p:style>
+      </p:cxnSp>
+      <p:cxnSp>
+        <p:nvCxnSpPr>
+          <p:cNvPr id="22" name="Straight Connector 21">
+            <a:extLst>
+              <a:ext uri="{FF2B5EF4-FFF2-40B4-BE49-F238E27FC236}">
+                <a16:creationId xmlns:a16="http://schemas.microsoft.com/office/drawing/2014/main" id="{CE456FE2-2E8C-0448-9238-29C9D2B6AD08}"/>
+              </a:ext>
+            </a:extLst>
+          </p:cNvPr>
+          <p:cNvCxnSpPr/>
+          <p:nvPr/>
+        </p:nvCxnSpPr>
+        <p:spPr>
+          <a:xfrm>
+            <a:off x="4579337" y="3856540"/>
+            <a:ext cx="0" cy="1371600"/>
+          </a:xfrm>
+          <a:prstGeom prst="line">
+            <a:avLst/>
+          </a:prstGeom>
+        </p:spPr>
+        <p:style>
+          <a:lnRef idx="1">
+            <a:schemeClr val="accent1"/>
+          </a:lnRef>
+          <a:fillRef idx="0">
+            <a:schemeClr val="accent1"/>
+          </a:fillRef>
+          <a:effectRef idx="0">
+            <a:schemeClr val="accent1"/>
+          </a:effectRef>
+          <a:fontRef idx="minor">
+            <a:schemeClr val="tx1"/>
+          </a:fontRef>
+        </p:style>
+      </p:cxnSp>
+      <p:cxnSp>
+        <p:nvCxnSpPr>
+          <p:cNvPr id="23" name="Straight Connector 22">
+            <a:extLst>
+              <a:ext uri="{FF2B5EF4-FFF2-40B4-BE49-F238E27FC236}">
+                <a16:creationId xmlns:a16="http://schemas.microsoft.com/office/drawing/2014/main" id="{908236EF-16DA-6842-99F0-3425145D079F}"/>
+              </a:ext>
+            </a:extLst>
+          </p:cNvPr>
+          <p:cNvCxnSpPr/>
+          <p:nvPr/>
+        </p:nvCxnSpPr>
+        <p:spPr>
+          <a:xfrm>
+            <a:off x="5950937" y="3856540"/>
+            <a:ext cx="0" cy="1371600"/>
+          </a:xfrm>
+          <a:prstGeom prst="line">
+            <a:avLst/>
+          </a:prstGeom>
+        </p:spPr>
+        <p:style>
+          <a:lnRef idx="1">
+            <a:schemeClr val="accent1"/>
+          </a:lnRef>
+          <a:fillRef idx="0">
+            <a:schemeClr val="accent1"/>
+          </a:fillRef>
+          <a:effectRef idx="0">
+            <a:schemeClr val="accent1"/>
+          </a:effectRef>
+          <a:fontRef idx="minor">
+            <a:schemeClr val="tx1"/>
+          </a:fontRef>
+        </p:style>
+      </p:cxnSp>
+      <p:sp>
+        <p:nvSpPr>
+          <p:cNvPr id="24" name="TextBox 23">
+            <a:extLst>
+              <a:ext uri="{FF2B5EF4-FFF2-40B4-BE49-F238E27FC236}">
+                <a16:creationId xmlns:a16="http://schemas.microsoft.com/office/drawing/2014/main" id="{6CE0752D-3DDA-A64A-82E1-620E88CA5E94}"/>
+              </a:ext>
+            </a:extLst>
+          </p:cNvPr>
+          <p:cNvSpPr txBox="1"/>
+          <p:nvPr/>
+        </p:nvSpPr>
+        <p:spPr>
+          <a:xfrm>
+            <a:off x="3510063" y="4219174"/>
+            <a:ext cx="766941" cy="646331"/>
+          </a:xfrm>
+          <a:prstGeom prst="rect">
+            <a:avLst/>
+          </a:prstGeom>
+          <a:noFill/>
+        </p:spPr>
+        <p:txBody>
+          <a:bodyPr wrap="none" rtlCol="0">
+            <a:spAutoFit/>
+          </a:bodyPr>
+          <a:lstStyle/>
+          <a:p>
+            <a:pPr algn="ctr"/>
+            <a:r>
+              <a:rPr lang="en-GB" dirty="0"/>
+              <a:t>travel </a:t>
+            </a:r>
+          </a:p>
+          <a:p>
+            <a:pPr algn="ctr"/>
+            <a:r>
+              <a:rPr lang="en-GB" dirty="0"/>
+              <a:t>lane</a:t>
+            </a:r>
+          </a:p>
+        </p:txBody>
+      </p:sp>
+      <p:sp>
+        <p:nvSpPr>
+          <p:cNvPr id="25" name="TextBox 24">
+            <a:extLst>
+              <a:ext uri="{FF2B5EF4-FFF2-40B4-BE49-F238E27FC236}">
+                <a16:creationId xmlns:a16="http://schemas.microsoft.com/office/drawing/2014/main" id="{6CF2AFAC-9C99-1747-8E7D-853D8081E7B2}"/>
+              </a:ext>
+            </a:extLst>
+          </p:cNvPr>
+          <p:cNvSpPr txBox="1"/>
+          <p:nvPr/>
+        </p:nvSpPr>
+        <p:spPr>
+          <a:xfrm>
+            <a:off x="4881662" y="4219173"/>
+            <a:ext cx="766941" cy="646331"/>
+          </a:xfrm>
+          <a:prstGeom prst="rect">
+            <a:avLst/>
+          </a:prstGeom>
+          <a:noFill/>
+        </p:spPr>
+        <p:txBody>
+          <a:bodyPr wrap="none" rtlCol="0">
+            <a:spAutoFit/>
+          </a:bodyPr>
+          <a:lstStyle/>
+          <a:p>
+            <a:pPr algn="ctr"/>
+            <a:r>
+              <a:rPr lang="en-GB" dirty="0"/>
+              <a:t>travel </a:t>
+            </a:r>
+          </a:p>
+          <a:p>
+            <a:pPr algn="ctr"/>
+            <a:r>
+              <a:rPr lang="en-GB" dirty="0"/>
+              <a:t>lane</a:t>
+            </a:r>
+          </a:p>
+        </p:txBody>
+      </p:sp>
+      <p:sp>
+        <p:nvSpPr>
+          <p:cNvPr id="26" name="Right Brace 25">
+            <a:extLst>
+              <a:ext uri="{FF2B5EF4-FFF2-40B4-BE49-F238E27FC236}">
+                <a16:creationId xmlns:a16="http://schemas.microsoft.com/office/drawing/2014/main" id="{EF7438AF-3237-194C-A531-9A313FED267F}"/>
+              </a:ext>
+            </a:extLst>
+          </p:cNvPr>
+          <p:cNvSpPr/>
+          <p:nvPr/>
+        </p:nvSpPr>
+        <p:spPr>
+          <a:xfrm rot="5400000">
+            <a:off x="4386175" y="4074607"/>
+            <a:ext cx="386317" cy="2743194"/>
+          </a:xfrm>
+          <a:prstGeom prst="rightBrace">
+            <a:avLst/>
+          </a:prstGeom>
+        </p:spPr>
+        <p:style>
+          <a:lnRef idx="1">
+            <a:schemeClr val="accent1"/>
+          </a:lnRef>
+          <a:fillRef idx="0">
+            <a:schemeClr val="accent1"/>
+          </a:fillRef>
+          <a:effectRef idx="0">
+            <a:schemeClr val="accent1"/>
+          </a:effectRef>
+          <a:fontRef idx="minor">
+            <a:schemeClr val="tx1"/>
+          </a:fontRef>
+        </p:style>
+        <p:txBody>
+          <a:bodyPr rtlCol="0" anchor="ctr"/>
+          <a:lstStyle/>
+          <a:p>
+            <a:pPr algn="ctr"/>
+            <a:endParaRPr lang="en-GB"/>
+          </a:p>
+        </p:txBody>
+      </p:sp>
+      <p:sp>
+        <p:nvSpPr>
+          <p:cNvPr id="27" name="TextBox 26">
+            <a:extLst>
+              <a:ext uri="{FF2B5EF4-FFF2-40B4-BE49-F238E27FC236}">
+                <a16:creationId xmlns:a16="http://schemas.microsoft.com/office/drawing/2014/main" id="{EBEF1769-5DA1-3D4E-A9C8-F678C773B4BA}"/>
+              </a:ext>
+            </a:extLst>
+          </p:cNvPr>
+          <p:cNvSpPr txBox="1"/>
+          <p:nvPr/>
+        </p:nvSpPr>
+        <p:spPr>
+          <a:xfrm rot="16200000">
+            <a:off x="2265622" y="4353507"/>
+            <a:ext cx="1422184" cy="369332"/>
+          </a:xfrm>
+          <a:prstGeom prst="rect">
+            <a:avLst/>
+          </a:prstGeom>
+          <a:noFill/>
+        </p:spPr>
+        <p:txBody>
+          <a:bodyPr wrap="none" rtlCol="0">
+            <a:spAutoFit/>
+          </a:bodyPr>
+          <a:lstStyle/>
+          <a:p>
+            <a:r>
+              <a:rPr lang="en-GB" dirty="0"/>
+              <a:t>soft shoulder</a:t>
+            </a:r>
+          </a:p>
+        </p:txBody>
+      </p:sp>
+      <p:sp>
+        <p:nvSpPr>
+          <p:cNvPr id="28" name="Right Brace 27">
+            <a:extLst>
+              <a:ext uri="{FF2B5EF4-FFF2-40B4-BE49-F238E27FC236}">
+                <a16:creationId xmlns:a16="http://schemas.microsoft.com/office/drawing/2014/main" id="{4F066420-8A8A-EE4F-B548-B37E95B8E1E1}"/>
+              </a:ext>
+            </a:extLst>
+          </p:cNvPr>
+          <p:cNvSpPr/>
+          <p:nvPr/>
+        </p:nvSpPr>
+        <p:spPr>
+          <a:xfrm rot="16200000">
+            <a:off x="4153826" y="447256"/>
+            <a:ext cx="386317" cy="3192911"/>
+          </a:xfrm>
+          <a:prstGeom prst="rightBrace">
+            <a:avLst/>
+          </a:prstGeom>
+        </p:spPr>
+        <p:style>
+          <a:lnRef idx="1">
+            <a:schemeClr val="accent1"/>
+          </a:lnRef>
+          <a:fillRef idx="0">
+            <a:schemeClr val="accent1"/>
+          </a:fillRef>
+          <a:effectRef idx="0">
+            <a:schemeClr val="accent1"/>
+          </a:effectRef>
+          <a:fontRef idx="minor">
+            <a:schemeClr val="tx1"/>
+          </a:fontRef>
+        </p:style>
+        <p:txBody>
+          <a:bodyPr rtlCol="0" anchor="ctr"/>
+          <a:lstStyle/>
+          <a:p>
+            <a:pPr algn="ctr"/>
+            <a:endParaRPr lang="en-GB"/>
+          </a:p>
+        </p:txBody>
+      </p:sp>
+      <p:sp>
+        <p:nvSpPr>
+          <p:cNvPr id="29" name="TextBox 28">
+            <a:extLst>
+              <a:ext uri="{FF2B5EF4-FFF2-40B4-BE49-F238E27FC236}">
+                <a16:creationId xmlns:a16="http://schemas.microsoft.com/office/drawing/2014/main" id="{4C3BCD7C-5739-2E46-AA3B-46D79636A6C4}"/>
+              </a:ext>
+            </a:extLst>
+          </p:cNvPr>
+          <p:cNvSpPr txBox="1"/>
+          <p:nvPr/>
+        </p:nvSpPr>
+        <p:spPr>
+          <a:xfrm rot="16200000">
+            <a:off x="1402117" y="4404832"/>
+            <a:ext cx="943977" cy="369332"/>
+          </a:xfrm>
+          <a:prstGeom prst="rect">
+            <a:avLst/>
+          </a:prstGeom>
+          <a:noFill/>
+        </p:spPr>
+        <p:txBody>
+          <a:bodyPr wrap="none" rtlCol="0">
+            <a:spAutoFit/>
+          </a:bodyPr>
+          <a:lstStyle/>
+          <a:p>
+            <a:pPr algn="ctr"/>
+            <a:r>
+              <a:rPr lang="en-GB" dirty="0"/>
+              <a:t>footway</a:t>
+            </a:r>
+          </a:p>
+        </p:txBody>
+      </p:sp>
+      <p:sp>
+        <p:nvSpPr>
+          <p:cNvPr id="30" name="TextBox 29">
+            <a:extLst>
+              <a:ext uri="{FF2B5EF4-FFF2-40B4-BE49-F238E27FC236}">
+                <a16:creationId xmlns:a16="http://schemas.microsoft.com/office/drawing/2014/main" id="{152C713C-2A5A-FD47-A552-84B2F0E0E4B8}"/>
+              </a:ext>
+            </a:extLst>
+          </p:cNvPr>
+          <p:cNvSpPr txBox="1"/>
+          <p:nvPr/>
+        </p:nvSpPr>
+        <p:spPr>
+          <a:xfrm rot="16200000">
+            <a:off x="1911797" y="4394306"/>
+            <a:ext cx="1210588" cy="369332"/>
+          </a:xfrm>
+          <a:prstGeom prst="rect">
+            <a:avLst/>
+          </a:prstGeom>
+          <a:noFill/>
+        </p:spPr>
+        <p:txBody>
+          <a:bodyPr wrap="none" rtlCol="0">
+            <a:spAutoFit/>
+          </a:bodyPr>
+          <a:lstStyle/>
+          <a:p>
+            <a:pPr algn="ctr"/>
+            <a:r>
+              <a:rPr lang="en-GB" dirty="0"/>
+              <a:t>buffer lane</a:t>
+            </a:r>
+          </a:p>
+        </p:txBody>
+      </p:sp>
+      <p:cxnSp>
+        <p:nvCxnSpPr>
+          <p:cNvPr id="31" name="Straight Connector 30">
+            <a:extLst>
+              <a:ext uri="{FF2B5EF4-FFF2-40B4-BE49-F238E27FC236}">
+                <a16:creationId xmlns:a16="http://schemas.microsoft.com/office/drawing/2014/main" id="{BA432EF3-FF9A-E14F-891E-83E4C4584ED7}"/>
+              </a:ext>
+            </a:extLst>
+          </p:cNvPr>
+          <p:cNvCxnSpPr/>
+          <p:nvPr/>
+        </p:nvCxnSpPr>
+        <p:spPr>
+          <a:xfrm>
+            <a:off x="1387114" y="3856540"/>
+            <a:ext cx="0" cy="1371600"/>
+          </a:xfrm>
+          <a:prstGeom prst="line">
+            <a:avLst/>
+          </a:prstGeom>
+        </p:spPr>
+        <p:style>
+          <a:lnRef idx="1">
+            <a:schemeClr val="accent1"/>
+          </a:lnRef>
+          <a:fillRef idx="0">
+            <a:schemeClr val="accent1"/>
+          </a:fillRef>
+          <a:effectRef idx="0">
+            <a:schemeClr val="accent1"/>
+          </a:effectRef>
+          <a:fontRef idx="minor">
+            <a:schemeClr val="tx1"/>
+          </a:fontRef>
+        </p:style>
+      </p:cxnSp>
+      <p:sp>
+        <p:nvSpPr>
+          <p:cNvPr id="32" name="Right Brace 31">
+            <a:extLst>
+              <a:ext uri="{FF2B5EF4-FFF2-40B4-BE49-F238E27FC236}">
+                <a16:creationId xmlns:a16="http://schemas.microsoft.com/office/drawing/2014/main" id="{E5016F5B-4477-F742-A55C-A9BE641B2DB7}"/>
+              </a:ext>
+            </a:extLst>
+          </p:cNvPr>
+          <p:cNvSpPr/>
+          <p:nvPr/>
+        </p:nvSpPr>
+        <p:spPr>
+          <a:xfrm rot="16200000">
+            <a:off x="1870815" y="1362008"/>
+            <a:ext cx="386317" cy="1363406"/>
+          </a:xfrm>
+          <a:prstGeom prst="rightBrace">
+            <a:avLst/>
+          </a:prstGeom>
+        </p:spPr>
+        <p:style>
+          <a:lnRef idx="1">
+            <a:schemeClr val="accent1"/>
+          </a:lnRef>
+          <a:fillRef idx="0">
+            <a:schemeClr val="accent1"/>
+          </a:fillRef>
+          <a:effectRef idx="0">
+            <a:schemeClr val="accent1"/>
+          </a:effectRef>
+          <a:fontRef idx="minor">
+            <a:schemeClr val="tx1"/>
+          </a:fontRef>
+        </p:style>
+        <p:txBody>
+          <a:bodyPr rtlCol="0" anchor="ctr"/>
+          <a:lstStyle/>
+          <a:p>
+            <a:pPr algn="ctr"/>
+            <a:endParaRPr lang="en-GB"/>
+          </a:p>
+        </p:txBody>
+      </p:sp>
+      <p:sp>
+        <p:nvSpPr>
+          <p:cNvPr id="33" name="TextBox 32">
+            <a:extLst>
+              <a:ext uri="{FF2B5EF4-FFF2-40B4-BE49-F238E27FC236}">
+                <a16:creationId xmlns:a16="http://schemas.microsoft.com/office/drawing/2014/main" id="{0DCE8206-9A1D-A042-AB36-FD53CEF35989}"/>
+              </a:ext>
+            </a:extLst>
+          </p:cNvPr>
+          <p:cNvSpPr txBox="1"/>
+          <p:nvPr/>
+        </p:nvSpPr>
+        <p:spPr>
+          <a:xfrm>
+            <a:off x="3692317" y="1515679"/>
+            <a:ext cx="1309333" cy="369332"/>
+          </a:xfrm>
+          <a:prstGeom prst="rect">
+            <a:avLst/>
+          </a:prstGeom>
+          <a:noFill/>
+        </p:spPr>
+        <p:txBody>
+          <a:bodyPr wrap="none" rtlCol="0">
+            <a:spAutoFit/>
+          </a:bodyPr>
+          <a:lstStyle/>
+          <a:p>
+            <a:r>
+              <a:rPr lang="en-GB" dirty="0"/>
+              <a:t>carriageway</a:t>
+            </a:r>
+          </a:p>
+        </p:txBody>
+      </p:sp>
+      <p:sp>
+        <p:nvSpPr>
+          <p:cNvPr id="34" name="TextBox 33">
+            <a:extLst>
+              <a:ext uri="{FF2B5EF4-FFF2-40B4-BE49-F238E27FC236}">
+                <a16:creationId xmlns:a16="http://schemas.microsoft.com/office/drawing/2014/main" id="{796730E8-7DDB-7B40-8FB0-B12DA536FB42}"/>
+              </a:ext>
+            </a:extLst>
+          </p:cNvPr>
+          <p:cNvSpPr txBox="1"/>
+          <p:nvPr/>
+        </p:nvSpPr>
+        <p:spPr>
+          <a:xfrm>
+            <a:off x="1566336" y="1515679"/>
+            <a:ext cx="995273" cy="369332"/>
+          </a:xfrm>
+          <a:prstGeom prst="rect">
+            <a:avLst/>
+          </a:prstGeom>
+          <a:noFill/>
+        </p:spPr>
+        <p:txBody>
+          <a:bodyPr wrap="none" rtlCol="0">
+            <a:spAutoFit/>
+          </a:bodyPr>
+          <a:lstStyle/>
+          <a:p>
+            <a:pPr algn="ctr"/>
+            <a:r>
+              <a:rPr lang="en-GB" dirty="0"/>
+              <a:t>roadside</a:t>
+            </a:r>
+          </a:p>
+        </p:txBody>
+      </p:sp>
+      <p:sp>
+        <p:nvSpPr>
+          <p:cNvPr id="35" name="TextBox 34">
+            <a:extLst>
+              <a:ext uri="{FF2B5EF4-FFF2-40B4-BE49-F238E27FC236}">
+                <a16:creationId xmlns:a16="http://schemas.microsoft.com/office/drawing/2014/main" id="{F69CDE77-25A0-5441-A346-E96E3B7F6675}"/>
+              </a:ext>
+            </a:extLst>
+          </p:cNvPr>
+          <p:cNvSpPr txBox="1"/>
+          <p:nvPr/>
+        </p:nvSpPr>
+        <p:spPr>
+          <a:xfrm>
+            <a:off x="4050791" y="5613114"/>
+            <a:ext cx="1057084" cy="646331"/>
+          </a:xfrm>
+          <a:prstGeom prst="rect">
+            <a:avLst/>
+          </a:prstGeom>
+          <a:noFill/>
+        </p:spPr>
+        <p:txBody>
+          <a:bodyPr wrap="none" rtlCol="0">
+            <a:spAutoFit/>
+          </a:bodyPr>
+          <a:lstStyle/>
+          <a:p>
+            <a:pPr algn="ctr"/>
+            <a:r>
+              <a:rPr lang="en-GB" dirty="0"/>
+              <a:t>travelled </a:t>
+            </a:r>
+          </a:p>
+          <a:p>
+            <a:pPr algn="ctr"/>
+            <a:r>
+              <a:rPr lang="en-GB" dirty="0"/>
+              <a:t>way</a:t>
+            </a:r>
+          </a:p>
+        </p:txBody>
+      </p:sp>
+    </p:spTree>
+    <p:extLst>
+      <p:ext uri="{BB962C8B-B14F-4D97-AF65-F5344CB8AC3E}">
+        <p14:creationId xmlns:p14="http://schemas.microsoft.com/office/powerpoint/2010/main" val="2967412928"/>
+      </p:ext>
+    </p:extLst>
+  </p:cSld>
+  <p:clrMapOvr>
+    <a:masterClrMapping/>
+  </p:clrMapOvr>
+</p:sld>
+</file>
+
+<file path=ppt/slides/slide3.xml><?xml version="1.0" encoding="utf-8"?>
+<p:sld xmlns:a="http://schemas.openxmlformats.org/drawingml/2006/main" xmlns:r="http://schemas.openxmlformats.org/officeDocument/2006/relationships" xmlns:p="http://schemas.openxmlformats.org/presentationml/2006/main">
+  <p:cSld>
+    <p:spTree>
+      <p:nvGrpSpPr>
+        <p:cNvPr id="1" name=""/>
+        <p:cNvGrpSpPr/>
+        <p:nvPr/>
+      </p:nvGrpSpPr>
+      <p:grpSpPr>
+        <a:xfrm>
+          <a:off x="0" y="0"/>
+          <a:ext cx="0" cy="0"/>
+          <a:chOff x="0" y="0"/>
+          <a:chExt cx="0" cy="0"/>
+        </a:xfrm>
+      </p:grpSpPr>
+      <p:pic>
+        <p:nvPicPr>
+          <p:cNvPr id="2" name="Picture 1">
+            <a:extLst>
+              <a:ext uri="{FF2B5EF4-FFF2-40B4-BE49-F238E27FC236}">
+                <a16:creationId xmlns:a16="http://schemas.microsoft.com/office/drawing/2014/main" id="{26D0685C-723E-204B-AAA5-CE66167F4577}"/>
+              </a:ext>
+            </a:extLst>
+          </p:cNvPr>
+          <p:cNvPicPr>
+            <a:picLocks noChangeAspect="1"/>
+          </p:cNvPicPr>
+          <p:nvPr/>
+        </p:nvPicPr>
+        <p:blipFill rotWithShape="1">
+          <a:blip r:embed="rId2"/>
+          <a:srcRect r="50000"/>
+          <a:stretch/>
+        </p:blipFill>
+        <p:spPr>
+          <a:xfrm>
+            <a:off x="2293335" y="3419820"/>
+            <a:ext cx="457197" cy="457200"/>
+          </a:xfrm>
+          <a:prstGeom prst="rect">
+            <a:avLst/>
+          </a:prstGeom>
+        </p:spPr>
+      </p:pic>
+      <p:pic>
+        <p:nvPicPr>
+          <p:cNvPr id="3" name="Picture 2">
+            <a:extLst>
+              <a:ext uri="{FF2B5EF4-FFF2-40B4-BE49-F238E27FC236}">
+                <a16:creationId xmlns:a16="http://schemas.microsoft.com/office/drawing/2014/main" id="{81D8EF82-5E05-744E-B708-635972C469AB}"/>
+              </a:ext>
+            </a:extLst>
+          </p:cNvPr>
+          <p:cNvPicPr>
+            <a:picLocks noChangeAspect="1"/>
+          </p:cNvPicPr>
+          <p:nvPr/>
+        </p:nvPicPr>
+        <p:blipFill>
+          <a:blip r:embed="rId3"/>
+          <a:stretch>
+            <a:fillRect/>
+          </a:stretch>
+        </p:blipFill>
+        <p:spPr>
+          <a:xfrm>
+            <a:off x="3348929" y="2821293"/>
+            <a:ext cx="1089216" cy="892708"/>
+          </a:xfrm>
+          <a:prstGeom prst="rect">
+            <a:avLst/>
+          </a:prstGeom>
+        </p:spPr>
+      </p:pic>
+      <p:pic>
+        <p:nvPicPr>
+          <p:cNvPr id="4" name="Picture 3">
+            <a:extLst>
+              <a:ext uri="{FF2B5EF4-FFF2-40B4-BE49-F238E27FC236}">
+                <a16:creationId xmlns:a16="http://schemas.microsoft.com/office/drawing/2014/main" id="{5526CABD-F11C-174E-B58A-B5D9CFAA2DA0}"/>
+              </a:ext>
+            </a:extLst>
+          </p:cNvPr>
+          <p:cNvPicPr>
+            <a:picLocks noChangeAspect="1"/>
+          </p:cNvPicPr>
+          <p:nvPr/>
+        </p:nvPicPr>
+        <p:blipFill>
+          <a:blip r:embed="rId4"/>
+          <a:stretch>
+            <a:fillRect/>
+          </a:stretch>
+        </p:blipFill>
+        <p:spPr>
+          <a:xfrm>
+            <a:off x="4678945" y="2799254"/>
+            <a:ext cx="1018244" cy="906144"/>
+          </a:xfrm>
+          <a:prstGeom prst="rect">
+            <a:avLst/>
+          </a:prstGeom>
+        </p:spPr>
+      </p:pic>
+      <p:pic>
+        <p:nvPicPr>
+          <p:cNvPr id="5" name="Picture 4">
+            <a:extLst>
+              <a:ext uri="{FF2B5EF4-FFF2-40B4-BE49-F238E27FC236}">
+                <a16:creationId xmlns:a16="http://schemas.microsoft.com/office/drawing/2014/main" id="{9F7FE6B0-9AE1-A94D-84A9-680CB3F57561}"/>
+              </a:ext>
+            </a:extLst>
+          </p:cNvPr>
+          <p:cNvPicPr>
+            <a:picLocks noChangeAspect="1"/>
+          </p:cNvPicPr>
+          <p:nvPr/>
+        </p:nvPicPr>
+        <p:blipFill>
+          <a:blip r:embed="rId5"/>
+          <a:stretch>
+            <a:fillRect/>
+          </a:stretch>
+        </p:blipFill>
+        <p:spPr>
+          <a:xfrm>
+            <a:off x="1649119" y="2777217"/>
+            <a:ext cx="583328" cy="906141"/>
+          </a:xfrm>
+          <a:prstGeom prst="rect">
+            <a:avLst/>
+          </a:prstGeom>
+        </p:spPr>
+      </p:pic>
+      <p:sp>
+        <p:nvSpPr>
+          <p:cNvPr id="6" name="Rectangle 5">
+            <a:extLst>
+              <a:ext uri="{FF2B5EF4-FFF2-40B4-BE49-F238E27FC236}">
+                <a16:creationId xmlns:a16="http://schemas.microsoft.com/office/drawing/2014/main" id="{C4E8CF96-E5FF-1146-A1E8-E092C1969A48}"/>
+              </a:ext>
+            </a:extLst>
+          </p:cNvPr>
+          <p:cNvSpPr/>
+          <p:nvPr/>
+        </p:nvSpPr>
+        <p:spPr>
+          <a:xfrm>
+            <a:off x="3204159" y="3683358"/>
+            <a:ext cx="2743200" cy="45720"/>
+          </a:xfrm>
+          <a:prstGeom prst="rect">
+            <a:avLst/>
+          </a:prstGeom>
+          <a:solidFill>
+            <a:schemeClr val="tx2"/>
+          </a:solidFill>
+        </p:spPr>
+        <p:style>
+          <a:lnRef idx="2">
+            <a:schemeClr val="accent1">
+              <a:shade val="50000"/>
+            </a:schemeClr>
+          </a:lnRef>
+          <a:fillRef idx="1">
+            <a:schemeClr val="accent1"/>
+          </a:fillRef>
+          <a:effectRef idx="0">
+            <a:schemeClr val="accent1"/>
+          </a:effectRef>
+          <a:fontRef idx="minor">
+            <a:schemeClr val="lt1"/>
+          </a:fontRef>
+        </p:style>
+        <p:txBody>
+          <a:bodyPr rtlCol="0" anchor="ctr"/>
+          <a:lstStyle/>
+          <a:p>
+            <a:pPr algn="ctr"/>
+            <a:endParaRPr lang="en-GB"/>
+          </a:p>
+        </p:txBody>
+      </p:sp>
+      <p:sp>
+        <p:nvSpPr>
+          <p:cNvPr id="8" name="Rectangle 7">
+            <a:extLst>
+              <a:ext uri="{FF2B5EF4-FFF2-40B4-BE49-F238E27FC236}">
+                <a16:creationId xmlns:a16="http://schemas.microsoft.com/office/drawing/2014/main" id="{AC238C7D-086E-0B45-AF45-5E318541D820}"/>
+              </a:ext>
+            </a:extLst>
+          </p:cNvPr>
+          <p:cNvSpPr/>
+          <p:nvPr/>
+        </p:nvSpPr>
+        <p:spPr>
+          <a:xfrm>
+            <a:off x="1387125" y="3683358"/>
+            <a:ext cx="914400" cy="45720"/>
+          </a:xfrm>
+          <a:prstGeom prst="rect">
+            <a:avLst/>
+          </a:prstGeom>
+          <a:solidFill>
+            <a:schemeClr val="tx2"/>
+          </a:solidFill>
+          <a:ln>
+            <a:noFill/>
+          </a:ln>
+        </p:spPr>
+        <p:style>
+          <a:lnRef idx="2">
+            <a:schemeClr val="accent1">
+              <a:shade val="50000"/>
+            </a:schemeClr>
+          </a:lnRef>
+          <a:fillRef idx="1">
+            <a:schemeClr val="accent1"/>
+          </a:fillRef>
+          <a:effectRef idx="0">
+            <a:schemeClr val="accent1"/>
+          </a:effectRef>
+          <a:fontRef idx="minor">
+            <a:schemeClr val="lt1"/>
+          </a:fontRef>
+        </p:style>
+        <p:txBody>
+          <a:bodyPr rtlCol="0" anchor="ctr"/>
+          <a:lstStyle/>
+          <a:p>
+            <a:pPr algn="ctr"/>
+            <a:endParaRPr lang="en-GB" dirty="0"/>
+          </a:p>
+        </p:txBody>
+      </p:sp>
+      <p:sp>
+        <p:nvSpPr>
+          <p:cNvPr id="9" name="Rectangle 8">
+            <a:extLst>
+              <a:ext uri="{FF2B5EF4-FFF2-40B4-BE49-F238E27FC236}">
+                <a16:creationId xmlns:a16="http://schemas.microsoft.com/office/drawing/2014/main" id="{6EB2D1FE-2DC1-DB49-953D-3644C68E9595}"/>
+              </a:ext>
+            </a:extLst>
+          </p:cNvPr>
+          <p:cNvSpPr/>
+          <p:nvPr/>
+        </p:nvSpPr>
+        <p:spPr>
+          <a:xfrm>
+            <a:off x="1387126" y="3720943"/>
+            <a:ext cx="906210" cy="93539"/>
+          </a:xfrm>
+          <a:prstGeom prst="rect">
+            <a:avLst/>
+          </a:prstGeom>
+          <a:pattFill prst="lgConfetti">
+            <a:fgClr>
+              <a:schemeClr val="tx2"/>
+            </a:fgClr>
+            <a:bgClr>
+              <a:schemeClr val="bg1"/>
+            </a:bgClr>
+          </a:pattFill>
+          <a:ln>
+            <a:noFill/>
+          </a:ln>
+        </p:spPr>
+        <p:style>
+          <a:lnRef idx="2">
+            <a:schemeClr val="accent1">
+              <a:shade val="50000"/>
+            </a:schemeClr>
+          </a:lnRef>
+          <a:fillRef idx="1">
+            <a:schemeClr val="accent1"/>
+          </a:fillRef>
+          <a:effectRef idx="0">
+            <a:schemeClr val="accent1"/>
+          </a:effectRef>
+          <a:fontRef idx="minor">
+            <a:schemeClr val="lt1"/>
+          </a:fontRef>
+        </p:style>
+        <p:txBody>
+          <a:bodyPr rtlCol="0" anchor="ctr"/>
+          <a:lstStyle/>
+          <a:p>
+            <a:pPr algn="ctr"/>
+            <a:endParaRPr lang="en-GB"/>
+          </a:p>
+        </p:txBody>
+      </p:sp>
+      <p:sp>
+        <p:nvSpPr>
+          <p:cNvPr id="10" name="Rectangle 9">
+            <a:extLst>
+              <a:ext uri="{FF2B5EF4-FFF2-40B4-BE49-F238E27FC236}">
+                <a16:creationId xmlns:a16="http://schemas.microsoft.com/office/drawing/2014/main" id="{584378FE-9068-9742-9249-C878F74360EC}"/>
+              </a:ext>
+            </a:extLst>
+          </p:cNvPr>
+          <p:cNvSpPr/>
+          <p:nvPr/>
+        </p:nvSpPr>
+        <p:spPr>
+          <a:xfrm>
+            <a:off x="2742597" y="3740468"/>
+            <a:ext cx="3204761" cy="168144"/>
+          </a:xfrm>
+          <a:prstGeom prst="rect">
+            <a:avLst/>
+          </a:prstGeom>
+          <a:pattFill prst="lgConfetti">
+            <a:fgClr>
+              <a:schemeClr val="tx2"/>
+            </a:fgClr>
+            <a:bgClr>
+              <a:schemeClr val="bg1"/>
+            </a:bgClr>
+          </a:pattFill>
+          <a:ln>
+            <a:noFill/>
+          </a:ln>
+        </p:spPr>
+        <p:style>
+          <a:lnRef idx="2">
+            <a:schemeClr val="accent1">
+              <a:shade val="50000"/>
+            </a:schemeClr>
+          </a:lnRef>
+          <a:fillRef idx="1">
+            <a:schemeClr val="accent1"/>
+          </a:fillRef>
+          <a:effectRef idx="0">
+            <a:schemeClr val="accent1"/>
+          </a:effectRef>
+          <a:fontRef idx="minor">
+            <a:schemeClr val="lt1"/>
+          </a:fontRef>
+        </p:style>
+        <p:txBody>
+          <a:bodyPr rtlCol="0" anchor="ctr"/>
+          <a:lstStyle/>
+          <a:p>
+            <a:pPr algn="ctr"/>
+            <a:endParaRPr lang="en-GB"/>
+          </a:p>
+        </p:txBody>
+      </p:sp>
+      <p:sp>
+        <p:nvSpPr>
+          <p:cNvPr id="11" name="Rectangle 10">
+            <a:extLst>
+              <a:ext uri="{FF2B5EF4-FFF2-40B4-BE49-F238E27FC236}">
+                <a16:creationId xmlns:a16="http://schemas.microsoft.com/office/drawing/2014/main" id="{58009AFB-D33C-8C48-9F43-B18D62E29503}"/>
+              </a:ext>
+            </a:extLst>
+          </p:cNvPr>
+          <p:cNvSpPr/>
+          <p:nvPr/>
+        </p:nvSpPr>
+        <p:spPr>
+          <a:xfrm>
+            <a:off x="1387125" y="3920002"/>
+            <a:ext cx="4560233" cy="168144"/>
+          </a:xfrm>
+          <a:prstGeom prst="rect">
+            <a:avLst/>
+          </a:prstGeom>
+          <a:pattFill prst="dashHorz">
+            <a:fgClr>
+              <a:schemeClr val="tx2"/>
+            </a:fgClr>
+            <a:bgClr>
+              <a:schemeClr val="bg1"/>
+            </a:bgClr>
+          </a:pattFill>
+          <a:ln>
+            <a:noFill/>
+          </a:ln>
+        </p:spPr>
+        <p:style>
+          <a:lnRef idx="2">
+            <a:schemeClr val="accent1">
+              <a:shade val="50000"/>
+            </a:schemeClr>
+          </a:lnRef>
+          <a:fillRef idx="1">
+            <a:schemeClr val="accent1"/>
+          </a:fillRef>
+          <a:effectRef idx="0">
+            <a:schemeClr val="accent1"/>
+          </a:effectRef>
+          <a:fontRef idx="minor">
+            <a:schemeClr val="lt1"/>
+          </a:fontRef>
+        </p:style>
+        <p:txBody>
+          <a:bodyPr rtlCol="0" anchor="ctr"/>
+          <a:lstStyle/>
+          <a:p>
+            <a:pPr algn="ctr"/>
+            <a:endParaRPr lang="en-GB" dirty="0"/>
+          </a:p>
+        </p:txBody>
+      </p:sp>
+      <p:sp>
+        <p:nvSpPr>
+          <p:cNvPr id="12" name="Rectangle 11">
+            <a:extLst>
+              <a:ext uri="{FF2B5EF4-FFF2-40B4-BE49-F238E27FC236}">
+                <a16:creationId xmlns:a16="http://schemas.microsoft.com/office/drawing/2014/main" id="{A744E7C5-4874-D342-AEC8-AD4A6BA6E4DA}"/>
+              </a:ext>
+            </a:extLst>
+          </p:cNvPr>
+          <p:cNvSpPr/>
+          <p:nvPr/>
+        </p:nvSpPr>
+        <p:spPr>
+          <a:xfrm>
+            <a:off x="1387125" y="3812250"/>
+            <a:ext cx="1363407" cy="125395"/>
+          </a:xfrm>
+          <a:prstGeom prst="rect">
+            <a:avLst/>
+          </a:prstGeom>
+          <a:pattFill prst="dashHorz">
+            <a:fgClr>
+              <a:schemeClr val="tx2"/>
+            </a:fgClr>
+            <a:bgClr>
+              <a:schemeClr val="bg1"/>
+            </a:bgClr>
+          </a:pattFill>
+          <a:ln>
+            <a:noFill/>
+          </a:ln>
+        </p:spPr>
+        <p:style>
+          <a:lnRef idx="2">
+            <a:schemeClr val="accent1">
+              <a:shade val="50000"/>
+            </a:schemeClr>
+          </a:lnRef>
+          <a:fillRef idx="1">
+            <a:schemeClr val="accent1"/>
+          </a:fillRef>
+          <a:effectRef idx="0">
+            <a:schemeClr val="accent1"/>
+          </a:effectRef>
+          <a:fontRef idx="minor">
+            <a:schemeClr val="lt1"/>
+          </a:fontRef>
+        </p:style>
+        <p:txBody>
+          <a:bodyPr rtlCol="0" anchor="ctr"/>
+          <a:lstStyle/>
+          <a:p>
+            <a:pPr algn="ctr"/>
+            <a:endParaRPr lang="en-GB" dirty="0"/>
+          </a:p>
+        </p:txBody>
+      </p:sp>
+      <p:sp>
+        <p:nvSpPr>
+          <p:cNvPr id="13" name="Rectangle 12">
+            <a:extLst>
+              <a:ext uri="{FF2B5EF4-FFF2-40B4-BE49-F238E27FC236}">
+                <a16:creationId xmlns:a16="http://schemas.microsoft.com/office/drawing/2014/main" id="{0DA7B8A0-E73C-A140-9563-BFC3D70489B9}"/>
+              </a:ext>
+            </a:extLst>
+          </p:cNvPr>
+          <p:cNvSpPr/>
+          <p:nvPr/>
+        </p:nvSpPr>
+        <p:spPr>
+          <a:xfrm>
+            <a:off x="2293334" y="3729078"/>
+            <a:ext cx="449137" cy="125395"/>
+          </a:xfrm>
+          <a:prstGeom prst="rect">
+            <a:avLst/>
+          </a:prstGeom>
+          <a:pattFill prst="dashHorz">
+            <a:fgClr>
+              <a:schemeClr val="tx2"/>
+            </a:fgClr>
+            <a:bgClr>
+              <a:schemeClr val="bg1"/>
+            </a:bgClr>
+          </a:pattFill>
+          <a:ln>
+            <a:noFill/>
+          </a:ln>
+        </p:spPr>
+        <p:style>
+          <a:lnRef idx="2">
+            <a:schemeClr val="accent1">
+              <a:shade val="50000"/>
+            </a:schemeClr>
+          </a:lnRef>
+          <a:fillRef idx="1">
+            <a:schemeClr val="accent1"/>
+          </a:fillRef>
+          <a:effectRef idx="0">
+            <a:schemeClr val="accent1"/>
+          </a:effectRef>
+          <a:fontRef idx="minor">
+            <a:schemeClr val="lt1"/>
+          </a:fontRef>
+        </p:style>
+        <p:txBody>
+          <a:bodyPr rtlCol="0" anchor="ctr"/>
+          <a:lstStyle/>
+          <a:p>
+            <a:pPr algn="ctr"/>
+            <a:endParaRPr lang="en-GB" dirty="0"/>
+          </a:p>
+        </p:txBody>
+      </p:sp>
+      <p:sp>
+        <p:nvSpPr>
+          <p:cNvPr id="15" name="Line Callout 1 (Accent Bar) 14">
+            <a:extLst>
+              <a:ext uri="{FF2B5EF4-FFF2-40B4-BE49-F238E27FC236}">
+                <a16:creationId xmlns:a16="http://schemas.microsoft.com/office/drawing/2014/main" id="{B59D20CA-96C5-9446-8E75-99F59AE77614}"/>
+              </a:ext>
+            </a:extLst>
+          </p:cNvPr>
+          <p:cNvSpPr/>
+          <p:nvPr/>
+        </p:nvSpPr>
+        <p:spPr>
+          <a:xfrm>
+            <a:off x="6096000" y="3410640"/>
+            <a:ext cx="714375" cy="183805"/>
+          </a:xfrm>
+          <a:prstGeom prst="accentCallout1">
+            <a:avLst>
+              <a:gd name="adj1" fmla="val 18750"/>
+              <a:gd name="adj2" fmla="val -8333"/>
+              <a:gd name="adj3" fmla="val 143593"/>
+              <a:gd name="adj4" fmla="val -37444"/>
+            </a:avLst>
+          </a:prstGeom>
+          <a:noFill/>
+          <a:ln>
+            <a:tailEnd type="stealth" w="med" len="lg"/>
+          </a:ln>
+        </p:spPr>
+        <p:style>
+          <a:lnRef idx="2">
+            <a:schemeClr val="accent1">
+              <a:shade val="50000"/>
+            </a:schemeClr>
+          </a:lnRef>
+          <a:fillRef idx="1">
+            <a:schemeClr val="accent1"/>
+          </a:fillRef>
+          <a:effectRef idx="0">
+            <a:schemeClr val="accent1"/>
+          </a:effectRef>
+          <a:fontRef idx="minor">
+            <a:schemeClr val="lt1"/>
+          </a:fontRef>
+        </p:style>
+        <p:txBody>
+          <a:bodyPr lIns="0" rtlCol="0" anchor="ctr"/>
+          <a:lstStyle/>
+          <a:p>
+            <a:r>
+              <a:rPr lang="en-GB" sz="1200" dirty="0">
+                <a:solidFill>
+                  <a:schemeClr val="tx1"/>
+                </a:solidFill>
+              </a:rPr>
+              <a:t>surface</a:t>
+            </a:r>
+          </a:p>
+        </p:txBody>
+      </p:sp>
+      <p:sp>
+        <p:nvSpPr>
+          <p:cNvPr id="17" name="Line Callout 1 (Accent Bar) 16">
+            <a:extLst>
+              <a:ext uri="{FF2B5EF4-FFF2-40B4-BE49-F238E27FC236}">
+                <a16:creationId xmlns:a16="http://schemas.microsoft.com/office/drawing/2014/main" id="{D3E31729-4461-884D-B24E-94163CA9F55B}"/>
+              </a:ext>
+            </a:extLst>
+          </p:cNvPr>
+          <p:cNvSpPr/>
+          <p:nvPr/>
+        </p:nvSpPr>
+        <p:spPr>
+          <a:xfrm>
+            <a:off x="6276975" y="3591455"/>
+            <a:ext cx="714375" cy="183805"/>
+          </a:xfrm>
+          <a:prstGeom prst="accentCallout1">
+            <a:avLst>
+              <a:gd name="adj1" fmla="val 18750"/>
+              <a:gd name="adj2" fmla="val -8333"/>
+              <a:gd name="adj3" fmla="val 62406"/>
+              <a:gd name="adj4" fmla="val -47222"/>
+            </a:avLst>
+          </a:prstGeom>
+          <a:noFill/>
+          <a:ln>
+            <a:tailEnd type="stealth" w="med" len="lg"/>
+          </a:ln>
+        </p:spPr>
+        <p:style>
+          <a:lnRef idx="2">
+            <a:schemeClr val="accent1">
+              <a:shade val="50000"/>
+            </a:schemeClr>
+          </a:lnRef>
+          <a:fillRef idx="1">
+            <a:schemeClr val="accent1"/>
+          </a:fillRef>
+          <a:effectRef idx="0">
+            <a:schemeClr val="accent1"/>
+          </a:effectRef>
+          <a:fontRef idx="minor">
+            <a:schemeClr val="lt1"/>
+          </a:fontRef>
+        </p:style>
+        <p:txBody>
+          <a:bodyPr lIns="0" rtlCol="0" anchor="ctr"/>
+          <a:lstStyle/>
+          <a:p>
+            <a:r>
+              <a:rPr lang="en-GB" sz="1200" dirty="0">
+                <a:solidFill>
+                  <a:schemeClr val="tx1"/>
+                </a:solidFill>
+                <a:highlight>
+                  <a:srgbClr val="FFFF00"/>
+                </a:highlight>
+              </a:rPr>
+              <a:t>pavement</a:t>
+            </a:r>
+          </a:p>
+        </p:txBody>
+      </p:sp>
+      <p:sp>
+        <p:nvSpPr>
+          <p:cNvPr id="18" name="Line Callout 1 (Accent Bar) 17">
+            <a:extLst>
+              <a:ext uri="{FF2B5EF4-FFF2-40B4-BE49-F238E27FC236}">
+                <a16:creationId xmlns:a16="http://schemas.microsoft.com/office/drawing/2014/main" id="{B1512C00-62F1-044A-996B-4821AB70F4C9}"/>
+              </a:ext>
+            </a:extLst>
+          </p:cNvPr>
+          <p:cNvSpPr/>
+          <p:nvPr/>
+        </p:nvSpPr>
+        <p:spPr>
+          <a:xfrm>
+            <a:off x="6340474" y="3854473"/>
+            <a:ext cx="825703" cy="183805"/>
+          </a:xfrm>
+          <a:prstGeom prst="accentCallout1">
+            <a:avLst>
+              <a:gd name="adj1" fmla="val 18750"/>
+              <a:gd name="adj2" fmla="val -8333"/>
+              <a:gd name="adj3" fmla="val -15325"/>
+              <a:gd name="adj4" fmla="val -52392"/>
+            </a:avLst>
+          </a:prstGeom>
+          <a:noFill/>
+          <a:ln>
+            <a:tailEnd type="stealth" w="med" len="lg"/>
+          </a:ln>
+        </p:spPr>
+        <p:style>
+          <a:lnRef idx="2">
+            <a:schemeClr val="accent1">
+              <a:shade val="50000"/>
+            </a:schemeClr>
+          </a:lnRef>
+          <a:fillRef idx="1">
+            <a:schemeClr val="accent1"/>
+          </a:fillRef>
+          <a:effectRef idx="0">
+            <a:schemeClr val="accent1"/>
+          </a:effectRef>
+          <a:fontRef idx="minor">
+            <a:schemeClr val="lt1"/>
+          </a:fontRef>
+        </p:style>
+        <p:txBody>
+          <a:bodyPr lIns="0" rtlCol="0" anchor="ctr"/>
+          <a:lstStyle/>
+          <a:p>
+            <a:r>
+              <a:rPr lang="en-GB" sz="1200" dirty="0">
+                <a:solidFill>
+                  <a:schemeClr val="tx1"/>
+                </a:solidFill>
+              </a:rPr>
+              <a:t>Subsurface or roadbed</a:t>
+            </a:r>
+          </a:p>
+        </p:txBody>
+      </p:sp>
+      <p:cxnSp>
+        <p:nvCxnSpPr>
+          <p:cNvPr id="19" name="Straight Connector 18">
+            <a:extLst>
+              <a:ext uri="{FF2B5EF4-FFF2-40B4-BE49-F238E27FC236}">
+                <a16:creationId xmlns:a16="http://schemas.microsoft.com/office/drawing/2014/main" id="{BAF05439-056E-3D49-A66D-628F9AF7FF96}"/>
+              </a:ext>
+            </a:extLst>
+          </p:cNvPr>
+          <p:cNvCxnSpPr/>
+          <p:nvPr/>
+        </p:nvCxnSpPr>
+        <p:spPr>
+          <a:xfrm>
+            <a:off x="3207737" y="3856540"/>
+            <a:ext cx="0" cy="1371600"/>
+          </a:xfrm>
+          <a:prstGeom prst="line">
+            <a:avLst/>
+          </a:prstGeom>
+        </p:spPr>
+        <p:style>
+          <a:lnRef idx="1">
+            <a:schemeClr val="accent1"/>
+          </a:lnRef>
+          <a:fillRef idx="0">
+            <a:schemeClr val="accent1"/>
+          </a:fillRef>
+          <a:effectRef idx="0">
+            <a:schemeClr val="accent1"/>
+          </a:effectRef>
+          <a:fontRef idx="minor">
+            <a:schemeClr val="tx1"/>
+          </a:fontRef>
+        </p:style>
+      </p:cxnSp>
+      <p:cxnSp>
+        <p:nvCxnSpPr>
+          <p:cNvPr id="20" name="Straight Connector 19">
+            <a:extLst>
+              <a:ext uri="{FF2B5EF4-FFF2-40B4-BE49-F238E27FC236}">
+                <a16:creationId xmlns:a16="http://schemas.microsoft.com/office/drawing/2014/main" id="{649A3803-0D48-7C4E-A1E7-D89AB229C1CF}"/>
+              </a:ext>
+            </a:extLst>
+          </p:cNvPr>
+          <p:cNvCxnSpPr/>
+          <p:nvPr/>
+        </p:nvCxnSpPr>
+        <p:spPr>
+          <a:xfrm>
+            <a:off x="2293337" y="3856540"/>
+            <a:ext cx="0" cy="1371600"/>
+          </a:xfrm>
+          <a:prstGeom prst="line">
+            <a:avLst/>
+          </a:prstGeom>
+        </p:spPr>
+        <p:style>
+          <a:lnRef idx="1">
+            <a:schemeClr val="accent1"/>
+          </a:lnRef>
+          <a:fillRef idx="0">
+            <a:schemeClr val="accent1"/>
+          </a:fillRef>
+          <a:effectRef idx="0">
+            <a:schemeClr val="accent1"/>
+          </a:effectRef>
+          <a:fontRef idx="minor">
+            <a:schemeClr val="tx1"/>
+          </a:fontRef>
+        </p:style>
+      </p:cxnSp>
+      <p:cxnSp>
+        <p:nvCxnSpPr>
+          <p:cNvPr id="21" name="Straight Connector 20">
+            <a:extLst>
+              <a:ext uri="{FF2B5EF4-FFF2-40B4-BE49-F238E27FC236}">
+                <a16:creationId xmlns:a16="http://schemas.microsoft.com/office/drawing/2014/main" id="{61B34D3D-0958-4C46-B298-241A00F07C35}"/>
+              </a:ext>
+            </a:extLst>
+          </p:cNvPr>
+          <p:cNvCxnSpPr/>
+          <p:nvPr/>
+        </p:nvCxnSpPr>
+        <p:spPr>
+          <a:xfrm>
+            <a:off x="2750537" y="3856540"/>
+            <a:ext cx="0" cy="1371600"/>
+          </a:xfrm>
+          <a:prstGeom prst="line">
+            <a:avLst/>
+          </a:prstGeom>
+        </p:spPr>
+        <p:style>
+          <a:lnRef idx="1">
+            <a:schemeClr val="accent1"/>
+          </a:lnRef>
+          <a:fillRef idx="0">
+            <a:schemeClr val="accent1"/>
+          </a:fillRef>
+          <a:effectRef idx="0">
+            <a:schemeClr val="accent1"/>
+          </a:effectRef>
+          <a:fontRef idx="minor">
+            <a:schemeClr val="tx1"/>
+          </a:fontRef>
+        </p:style>
+      </p:cxnSp>
+      <p:cxnSp>
+        <p:nvCxnSpPr>
+          <p:cNvPr id="22" name="Straight Connector 21">
+            <a:extLst>
+              <a:ext uri="{FF2B5EF4-FFF2-40B4-BE49-F238E27FC236}">
+                <a16:creationId xmlns:a16="http://schemas.microsoft.com/office/drawing/2014/main" id="{CE456FE2-2E8C-0448-9238-29C9D2B6AD08}"/>
+              </a:ext>
+            </a:extLst>
+          </p:cNvPr>
+          <p:cNvCxnSpPr/>
+          <p:nvPr/>
+        </p:nvCxnSpPr>
+        <p:spPr>
+          <a:xfrm>
+            <a:off x="4579337" y="3856540"/>
+            <a:ext cx="0" cy="1371600"/>
+          </a:xfrm>
+          <a:prstGeom prst="line">
+            <a:avLst/>
+          </a:prstGeom>
+        </p:spPr>
+        <p:style>
+          <a:lnRef idx="1">
+            <a:schemeClr val="accent1"/>
+          </a:lnRef>
+          <a:fillRef idx="0">
+            <a:schemeClr val="accent1"/>
+          </a:fillRef>
+          <a:effectRef idx="0">
+            <a:schemeClr val="accent1"/>
+          </a:effectRef>
+          <a:fontRef idx="minor">
+            <a:schemeClr val="tx1"/>
+          </a:fontRef>
+        </p:style>
+      </p:cxnSp>
+      <p:cxnSp>
+        <p:nvCxnSpPr>
+          <p:cNvPr id="23" name="Straight Connector 22">
+            <a:extLst>
+              <a:ext uri="{FF2B5EF4-FFF2-40B4-BE49-F238E27FC236}">
+                <a16:creationId xmlns:a16="http://schemas.microsoft.com/office/drawing/2014/main" id="{908236EF-16DA-6842-99F0-3425145D079F}"/>
+              </a:ext>
+            </a:extLst>
+          </p:cNvPr>
+          <p:cNvCxnSpPr/>
+          <p:nvPr/>
+        </p:nvCxnSpPr>
+        <p:spPr>
+          <a:xfrm>
+            <a:off x="5950937" y="3856540"/>
+            <a:ext cx="0" cy="1371600"/>
+          </a:xfrm>
+          <a:prstGeom prst="line">
+            <a:avLst/>
+          </a:prstGeom>
+        </p:spPr>
+        <p:style>
+          <a:lnRef idx="1">
+            <a:schemeClr val="accent1"/>
+          </a:lnRef>
+          <a:fillRef idx="0">
+            <a:schemeClr val="accent1"/>
+          </a:fillRef>
+          <a:effectRef idx="0">
+            <a:schemeClr val="accent1"/>
+          </a:effectRef>
+          <a:fontRef idx="minor">
+            <a:schemeClr val="tx1"/>
+          </a:fontRef>
+        </p:style>
+      </p:cxnSp>
+      <p:sp>
+        <p:nvSpPr>
+          <p:cNvPr id="24" name="TextBox 23">
+            <a:extLst>
+              <a:ext uri="{FF2B5EF4-FFF2-40B4-BE49-F238E27FC236}">
+                <a16:creationId xmlns:a16="http://schemas.microsoft.com/office/drawing/2014/main" id="{6CE0752D-3DDA-A64A-82E1-620E88CA5E94}"/>
+              </a:ext>
+            </a:extLst>
+          </p:cNvPr>
+          <p:cNvSpPr txBox="1"/>
+          <p:nvPr/>
+        </p:nvSpPr>
+        <p:spPr>
+          <a:xfrm>
+            <a:off x="3510063" y="4219174"/>
+            <a:ext cx="766941" cy="646331"/>
+          </a:xfrm>
+          <a:prstGeom prst="rect">
+            <a:avLst/>
+          </a:prstGeom>
+          <a:noFill/>
+        </p:spPr>
+        <p:txBody>
+          <a:bodyPr wrap="none" rtlCol="0">
+            <a:spAutoFit/>
+          </a:bodyPr>
+          <a:lstStyle/>
+          <a:p>
+            <a:pPr algn="ctr"/>
+            <a:r>
+              <a:rPr lang="en-GB" dirty="0"/>
+              <a:t>travel </a:t>
+            </a:r>
+          </a:p>
+          <a:p>
+            <a:pPr algn="ctr"/>
+            <a:r>
+              <a:rPr lang="en-GB" dirty="0"/>
+              <a:t>lane</a:t>
+            </a:r>
+          </a:p>
+        </p:txBody>
+      </p:sp>
+      <p:sp>
+        <p:nvSpPr>
+          <p:cNvPr id="25" name="TextBox 24">
+            <a:extLst>
+              <a:ext uri="{FF2B5EF4-FFF2-40B4-BE49-F238E27FC236}">
+                <a16:creationId xmlns:a16="http://schemas.microsoft.com/office/drawing/2014/main" id="{6CF2AFAC-9C99-1747-8E7D-853D8081E7B2}"/>
+              </a:ext>
+            </a:extLst>
+          </p:cNvPr>
+          <p:cNvSpPr txBox="1"/>
+          <p:nvPr/>
+        </p:nvSpPr>
+        <p:spPr>
+          <a:xfrm>
+            <a:off x="4881662" y="4219173"/>
+            <a:ext cx="766941" cy="646331"/>
+          </a:xfrm>
+          <a:prstGeom prst="rect">
+            <a:avLst/>
+          </a:prstGeom>
+          <a:noFill/>
+        </p:spPr>
+        <p:txBody>
+          <a:bodyPr wrap="none" rtlCol="0">
+            <a:spAutoFit/>
+          </a:bodyPr>
+          <a:lstStyle/>
+          <a:p>
+            <a:pPr algn="ctr"/>
+            <a:r>
+              <a:rPr lang="en-GB" dirty="0"/>
+              <a:t>travel </a:t>
+            </a:r>
+          </a:p>
+          <a:p>
+            <a:pPr algn="ctr"/>
+            <a:r>
+              <a:rPr lang="en-GB" dirty="0"/>
+              <a:t>lane</a:t>
+            </a:r>
+          </a:p>
+        </p:txBody>
+      </p:sp>
+      <p:sp>
+        <p:nvSpPr>
+          <p:cNvPr id="26" name="Right Brace 25">
+            <a:extLst>
+              <a:ext uri="{FF2B5EF4-FFF2-40B4-BE49-F238E27FC236}">
+                <a16:creationId xmlns:a16="http://schemas.microsoft.com/office/drawing/2014/main" id="{EF7438AF-3237-194C-A531-9A313FED267F}"/>
+              </a:ext>
+            </a:extLst>
+          </p:cNvPr>
+          <p:cNvSpPr/>
+          <p:nvPr/>
+        </p:nvSpPr>
+        <p:spPr>
+          <a:xfrm rot="5400000">
+            <a:off x="4386175" y="4074607"/>
+            <a:ext cx="386317" cy="2743194"/>
+          </a:xfrm>
+          <a:prstGeom prst="rightBrace">
+            <a:avLst/>
+          </a:prstGeom>
+        </p:spPr>
+        <p:style>
+          <a:lnRef idx="1">
+            <a:schemeClr val="accent1"/>
+          </a:lnRef>
+          <a:fillRef idx="0">
+            <a:schemeClr val="accent1"/>
+          </a:fillRef>
+          <a:effectRef idx="0">
+            <a:schemeClr val="accent1"/>
+          </a:effectRef>
+          <a:fontRef idx="minor">
+            <a:schemeClr val="tx1"/>
+          </a:fontRef>
+        </p:style>
+        <p:txBody>
+          <a:bodyPr rtlCol="0" anchor="ctr"/>
+          <a:lstStyle/>
+          <a:p>
+            <a:pPr algn="ctr"/>
+            <a:endParaRPr lang="en-GB"/>
+          </a:p>
+        </p:txBody>
+      </p:sp>
+      <p:sp>
+        <p:nvSpPr>
+          <p:cNvPr id="27" name="TextBox 26">
+            <a:extLst>
+              <a:ext uri="{FF2B5EF4-FFF2-40B4-BE49-F238E27FC236}">
+                <a16:creationId xmlns:a16="http://schemas.microsoft.com/office/drawing/2014/main" id="{EBEF1769-5DA1-3D4E-A9C8-F678C773B4BA}"/>
+              </a:ext>
+            </a:extLst>
+          </p:cNvPr>
+          <p:cNvSpPr txBox="1"/>
+          <p:nvPr/>
+        </p:nvSpPr>
+        <p:spPr>
+          <a:xfrm rot="16200000">
+            <a:off x="2265622" y="4353507"/>
+            <a:ext cx="1422184" cy="369332"/>
+          </a:xfrm>
+          <a:prstGeom prst="rect">
+            <a:avLst/>
+          </a:prstGeom>
+          <a:noFill/>
+        </p:spPr>
+        <p:txBody>
+          <a:bodyPr wrap="none" rtlCol="0">
+            <a:spAutoFit/>
+          </a:bodyPr>
+          <a:lstStyle/>
+          <a:p>
+            <a:r>
+              <a:rPr lang="en-GB" dirty="0"/>
+              <a:t>soft shoulder</a:t>
+            </a:r>
+          </a:p>
+        </p:txBody>
+      </p:sp>
+      <p:sp>
+        <p:nvSpPr>
+          <p:cNvPr id="28" name="Right Brace 27">
+            <a:extLst>
+              <a:ext uri="{FF2B5EF4-FFF2-40B4-BE49-F238E27FC236}">
+                <a16:creationId xmlns:a16="http://schemas.microsoft.com/office/drawing/2014/main" id="{4F066420-8A8A-EE4F-B548-B37E95B8E1E1}"/>
+              </a:ext>
+            </a:extLst>
+          </p:cNvPr>
+          <p:cNvSpPr/>
+          <p:nvPr/>
+        </p:nvSpPr>
+        <p:spPr>
+          <a:xfrm rot="16200000">
+            <a:off x="4153826" y="447256"/>
+            <a:ext cx="386317" cy="3192911"/>
+          </a:xfrm>
+          <a:prstGeom prst="rightBrace">
+            <a:avLst/>
+          </a:prstGeom>
+        </p:spPr>
+        <p:style>
+          <a:lnRef idx="1">
+            <a:schemeClr val="accent1"/>
+          </a:lnRef>
+          <a:fillRef idx="0">
+            <a:schemeClr val="accent1"/>
+          </a:fillRef>
+          <a:effectRef idx="0">
+            <a:schemeClr val="accent1"/>
+          </a:effectRef>
+          <a:fontRef idx="minor">
+            <a:schemeClr val="tx1"/>
+          </a:fontRef>
+        </p:style>
+        <p:txBody>
+          <a:bodyPr rtlCol="0" anchor="ctr"/>
+          <a:lstStyle/>
+          <a:p>
+            <a:pPr algn="ctr"/>
+            <a:endParaRPr lang="en-GB"/>
+          </a:p>
+        </p:txBody>
+      </p:sp>
+      <p:sp>
+        <p:nvSpPr>
+          <p:cNvPr id="29" name="TextBox 28">
+            <a:extLst>
+              <a:ext uri="{FF2B5EF4-FFF2-40B4-BE49-F238E27FC236}">
+                <a16:creationId xmlns:a16="http://schemas.microsoft.com/office/drawing/2014/main" id="{4C3BCD7C-5739-2E46-AA3B-46D79636A6C4}"/>
+              </a:ext>
+            </a:extLst>
+          </p:cNvPr>
+          <p:cNvSpPr txBox="1"/>
+          <p:nvPr/>
+        </p:nvSpPr>
+        <p:spPr>
+          <a:xfrm rot="16200000">
+            <a:off x="1402117" y="4404832"/>
+            <a:ext cx="943977" cy="369332"/>
+          </a:xfrm>
+          <a:prstGeom prst="rect">
+            <a:avLst/>
+          </a:prstGeom>
+          <a:noFill/>
+        </p:spPr>
+        <p:txBody>
+          <a:bodyPr wrap="none" rtlCol="0">
+            <a:spAutoFit/>
+          </a:bodyPr>
+          <a:lstStyle/>
+          <a:p>
+            <a:pPr algn="ctr"/>
+            <a:r>
+              <a:rPr lang="en-GB" dirty="0"/>
+              <a:t>footway</a:t>
+            </a:r>
+          </a:p>
+        </p:txBody>
+      </p:sp>
+      <p:sp>
+        <p:nvSpPr>
+          <p:cNvPr id="30" name="TextBox 29">
+            <a:extLst>
+              <a:ext uri="{FF2B5EF4-FFF2-40B4-BE49-F238E27FC236}">
+                <a16:creationId xmlns:a16="http://schemas.microsoft.com/office/drawing/2014/main" id="{152C713C-2A5A-FD47-A552-84B2F0E0E4B8}"/>
+              </a:ext>
+            </a:extLst>
+          </p:cNvPr>
+          <p:cNvSpPr txBox="1"/>
+          <p:nvPr/>
+        </p:nvSpPr>
+        <p:spPr>
+          <a:xfrm rot="16200000">
+            <a:off x="1911797" y="4394306"/>
+            <a:ext cx="1210588" cy="369332"/>
+          </a:xfrm>
+          <a:prstGeom prst="rect">
+            <a:avLst/>
+          </a:prstGeom>
+          <a:noFill/>
+        </p:spPr>
+        <p:txBody>
+          <a:bodyPr wrap="none" rtlCol="0">
+            <a:spAutoFit/>
+          </a:bodyPr>
+          <a:lstStyle/>
+          <a:p>
+            <a:pPr algn="ctr"/>
+            <a:r>
+              <a:rPr lang="en-GB" dirty="0"/>
+              <a:t>buffer lane</a:t>
+            </a:r>
+          </a:p>
+        </p:txBody>
+      </p:sp>
+      <p:cxnSp>
+        <p:nvCxnSpPr>
+          <p:cNvPr id="31" name="Straight Connector 30">
+            <a:extLst>
+              <a:ext uri="{FF2B5EF4-FFF2-40B4-BE49-F238E27FC236}">
+                <a16:creationId xmlns:a16="http://schemas.microsoft.com/office/drawing/2014/main" id="{BA432EF3-FF9A-E14F-891E-83E4C4584ED7}"/>
+              </a:ext>
+            </a:extLst>
+          </p:cNvPr>
+          <p:cNvCxnSpPr/>
+          <p:nvPr/>
+        </p:nvCxnSpPr>
+        <p:spPr>
+          <a:xfrm>
+            <a:off x="1387114" y="3856540"/>
+            <a:ext cx="0" cy="1371600"/>
+          </a:xfrm>
+          <a:prstGeom prst="line">
+            <a:avLst/>
+          </a:prstGeom>
+        </p:spPr>
+        <p:style>
+          <a:lnRef idx="1">
+            <a:schemeClr val="accent1"/>
+          </a:lnRef>
+          <a:fillRef idx="0">
+            <a:schemeClr val="accent1"/>
+          </a:fillRef>
+          <a:effectRef idx="0">
+            <a:schemeClr val="accent1"/>
+          </a:effectRef>
+          <a:fontRef idx="minor">
+            <a:schemeClr val="tx1"/>
+          </a:fontRef>
+        </p:style>
+      </p:cxnSp>
+      <p:sp>
+        <p:nvSpPr>
+          <p:cNvPr id="32" name="Right Brace 31">
+            <a:extLst>
+              <a:ext uri="{FF2B5EF4-FFF2-40B4-BE49-F238E27FC236}">
+                <a16:creationId xmlns:a16="http://schemas.microsoft.com/office/drawing/2014/main" id="{E5016F5B-4477-F742-A55C-A9BE641B2DB7}"/>
+              </a:ext>
+            </a:extLst>
+          </p:cNvPr>
+          <p:cNvSpPr/>
+          <p:nvPr/>
+        </p:nvSpPr>
+        <p:spPr>
+          <a:xfrm rot="16200000">
+            <a:off x="1870815" y="1362008"/>
+            <a:ext cx="386317" cy="1363406"/>
+          </a:xfrm>
+          <a:prstGeom prst="rightBrace">
+            <a:avLst/>
+          </a:prstGeom>
+        </p:spPr>
+        <p:style>
+          <a:lnRef idx="1">
+            <a:schemeClr val="accent1"/>
+          </a:lnRef>
+          <a:fillRef idx="0">
+            <a:schemeClr val="accent1"/>
+          </a:fillRef>
+          <a:effectRef idx="0">
+            <a:schemeClr val="accent1"/>
+          </a:effectRef>
+          <a:fontRef idx="minor">
+            <a:schemeClr val="tx1"/>
+          </a:fontRef>
+        </p:style>
+        <p:txBody>
+          <a:bodyPr rtlCol="0" anchor="ctr"/>
+          <a:lstStyle/>
+          <a:p>
+            <a:pPr algn="ctr"/>
+            <a:endParaRPr lang="en-GB"/>
+          </a:p>
+        </p:txBody>
+      </p:sp>
+      <p:sp>
+        <p:nvSpPr>
+          <p:cNvPr id="33" name="TextBox 32">
+            <a:extLst>
+              <a:ext uri="{FF2B5EF4-FFF2-40B4-BE49-F238E27FC236}">
+                <a16:creationId xmlns:a16="http://schemas.microsoft.com/office/drawing/2014/main" id="{0DCE8206-9A1D-A042-AB36-FD53CEF35989}"/>
+              </a:ext>
+            </a:extLst>
+          </p:cNvPr>
+          <p:cNvSpPr txBox="1"/>
+          <p:nvPr/>
+        </p:nvSpPr>
+        <p:spPr>
+          <a:xfrm>
+            <a:off x="3692317" y="1515679"/>
+            <a:ext cx="1309333" cy="369332"/>
+          </a:xfrm>
+          <a:prstGeom prst="rect">
+            <a:avLst/>
+          </a:prstGeom>
+          <a:noFill/>
+        </p:spPr>
+        <p:txBody>
+          <a:bodyPr wrap="none" rtlCol="0">
+            <a:spAutoFit/>
+          </a:bodyPr>
+          <a:lstStyle/>
+          <a:p>
+            <a:r>
+              <a:rPr lang="en-GB" dirty="0"/>
+              <a:t>carriageway</a:t>
+            </a:r>
+          </a:p>
+        </p:txBody>
+      </p:sp>
+      <p:sp>
+        <p:nvSpPr>
+          <p:cNvPr id="34" name="TextBox 33">
+            <a:extLst>
+              <a:ext uri="{FF2B5EF4-FFF2-40B4-BE49-F238E27FC236}">
+                <a16:creationId xmlns:a16="http://schemas.microsoft.com/office/drawing/2014/main" id="{796730E8-7DDB-7B40-8FB0-B12DA536FB42}"/>
+              </a:ext>
+            </a:extLst>
+          </p:cNvPr>
+          <p:cNvSpPr txBox="1"/>
+          <p:nvPr/>
+        </p:nvSpPr>
+        <p:spPr>
+          <a:xfrm>
+            <a:off x="1566336" y="1515679"/>
+            <a:ext cx="995273" cy="369332"/>
+          </a:xfrm>
+          <a:prstGeom prst="rect">
+            <a:avLst/>
+          </a:prstGeom>
+          <a:noFill/>
+        </p:spPr>
+        <p:txBody>
+          <a:bodyPr wrap="none" rtlCol="0">
+            <a:spAutoFit/>
+          </a:bodyPr>
+          <a:lstStyle/>
+          <a:p>
+            <a:pPr algn="ctr"/>
+            <a:r>
+              <a:rPr lang="en-GB" dirty="0"/>
+              <a:t>roadside</a:t>
+            </a:r>
+          </a:p>
+        </p:txBody>
+      </p:sp>
+      <p:sp>
+        <p:nvSpPr>
+          <p:cNvPr id="35" name="TextBox 34">
+            <a:extLst>
+              <a:ext uri="{FF2B5EF4-FFF2-40B4-BE49-F238E27FC236}">
+                <a16:creationId xmlns:a16="http://schemas.microsoft.com/office/drawing/2014/main" id="{F69CDE77-25A0-5441-A346-E96E3B7F6675}"/>
+              </a:ext>
+            </a:extLst>
+          </p:cNvPr>
+          <p:cNvSpPr txBox="1"/>
+          <p:nvPr/>
+        </p:nvSpPr>
+        <p:spPr>
+          <a:xfrm>
+            <a:off x="4050791" y="5613114"/>
+            <a:ext cx="1057084" cy="646331"/>
+          </a:xfrm>
+          <a:prstGeom prst="rect">
+            <a:avLst/>
+          </a:prstGeom>
+          <a:noFill/>
+        </p:spPr>
+        <p:txBody>
+          <a:bodyPr wrap="none" rtlCol="0">
+            <a:spAutoFit/>
+          </a:bodyPr>
+          <a:lstStyle/>
+          <a:p>
+            <a:pPr algn="ctr"/>
+            <a:r>
+              <a:rPr lang="en-GB" dirty="0"/>
+              <a:t>travelled </a:t>
+            </a:r>
+          </a:p>
+          <a:p>
+            <a:pPr algn="ctr"/>
+            <a:r>
+              <a:rPr lang="en-GB" dirty="0"/>
+              <a:t>way</a:t>
+            </a:r>
+          </a:p>
+        </p:txBody>
+      </p:sp>
+      <p:sp>
+        <p:nvSpPr>
+          <p:cNvPr id="36" name="Rectangle 35">
+            <a:extLst>
+              <a:ext uri="{FF2B5EF4-FFF2-40B4-BE49-F238E27FC236}">
+                <a16:creationId xmlns:a16="http://schemas.microsoft.com/office/drawing/2014/main" id="{2D8DB50E-E837-6542-AEEC-39BCD72E12DF}"/>
+              </a:ext>
+            </a:extLst>
+          </p:cNvPr>
+          <p:cNvSpPr/>
+          <p:nvPr/>
+        </p:nvSpPr>
+        <p:spPr>
+          <a:xfrm>
+            <a:off x="3072086" y="3609440"/>
+            <a:ext cx="127647" cy="120349"/>
+          </a:xfrm>
+          <a:prstGeom prst="rect">
+            <a:avLst/>
+          </a:prstGeom>
+          <a:solidFill>
+            <a:schemeClr val="tx2"/>
+          </a:solidFill>
+          <a:ln>
+            <a:noFill/>
+          </a:ln>
+        </p:spPr>
+        <p:style>
+          <a:lnRef idx="2">
+            <a:schemeClr val="accent1">
+              <a:shade val="50000"/>
+            </a:schemeClr>
+          </a:lnRef>
+          <a:fillRef idx="1">
+            <a:schemeClr val="accent1"/>
+          </a:fillRef>
+          <a:effectRef idx="0">
+            <a:schemeClr val="accent1"/>
+          </a:effectRef>
+          <a:fontRef idx="minor">
+            <a:schemeClr val="lt1"/>
+          </a:fontRef>
+        </p:style>
+        <p:txBody>
+          <a:bodyPr rtlCol="0" anchor="ctr"/>
+          <a:lstStyle/>
+          <a:p>
+            <a:pPr algn="ctr"/>
+            <a:endParaRPr lang="en-GB" dirty="0"/>
+          </a:p>
+        </p:txBody>
+      </p:sp>
+      <p:sp>
+        <p:nvSpPr>
+          <p:cNvPr id="14" name="TextBox 13">
+            <a:extLst>
+              <a:ext uri="{FF2B5EF4-FFF2-40B4-BE49-F238E27FC236}">
+                <a16:creationId xmlns:a16="http://schemas.microsoft.com/office/drawing/2014/main" id="{114F1B1D-DED4-FF4C-A838-5FCA003E4410}"/>
+              </a:ext>
+            </a:extLst>
+          </p:cNvPr>
+          <p:cNvSpPr txBox="1"/>
+          <p:nvPr/>
+        </p:nvSpPr>
+        <p:spPr>
+          <a:xfrm>
+            <a:off x="2565536" y="2770920"/>
+            <a:ext cx="977575" cy="646331"/>
+          </a:xfrm>
+          <a:prstGeom prst="rect">
+            <a:avLst/>
+          </a:prstGeom>
+          <a:noFill/>
+        </p:spPr>
+        <p:txBody>
+          <a:bodyPr wrap="none" rtlCol="0">
+            <a:spAutoFit/>
+          </a:bodyPr>
+          <a:lstStyle/>
+          <a:p>
+            <a:r>
+              <a:rPr lang="en-GB" dirty="0">
+                <a:highlight>
+                  <a:srgbClr val="FFFF00"/>
+                </a:highlight>
+              </a:rPr>
+              <a:t>Kerb</a:t>
+            </a:r>
+          </a:p>
+          <a:p>
+            <a:r>
+              <a:rPr lang="en-GB" dirty="0">
+                <a:highlight>
+                  <a:srgbClr val="FFFF00"/>
+                </a:highlight>
+              </a:rPr>
+              <a:t>kerbside</a:t>
+            </a:r>
+          </a:p>
+        </p:txBody>
+      </p:sp>
+      <p:cxnSp>
+        <p:nvCxnSpPr>
+          <p:cNvPr id="37" name="Straight Arrow Connector 36">
+            <a:extLst>
+              <a:ext uri="{FF2B5EF4-FFF2-40B4-BE49-F238E27FC236}">
+                <a16:creationId xmlns:a16="http://schemas.microsoft.com/office/drawing/2014/main" id="{792A4849-644B-AE4A-86D7-B1AAF42855D3}"/>
+              </a:ext>
+            </a:extLst>
+          </p:cNvPr>
+          <p:cNvCxnSpPr>
+            <a:stCxn id="14" idx="2"/>
+            <a:endCxn id="36" idx="0"/>
+          </p:cNvCxnSpPr>
+          <p:nvPr/>
+        </p:nvCxnSpPr>
+        <p:spPr>
+          <a:xfrm>
+            <a:off x="3054324" y="3417251"/>
+            <a:ext cx="81586" cy="192189"/>
+          </a:xfrm>
+          <a:prstGeom prst="straightConnector1">
+            <a:avLst/>
+          </a:prstGeom>
+          <a:ln>
+            <a:tailEnd type="triangle"/>
+          </a:ln>
+        </p:spPr>
+        <p:style>
+          <a:lnRef idx="1">
+            <a:schemeClr val="accent1"/>
+          </a:lnRef>
+          <a:fillRef idx="0">
+            <a:schemeClr val="accent1"/>
+          </a:fillRef>
+          <a:effectRef idx="0">
+            <a:schemeClr val="accent1"/>
+          </a:effectRef>
+          <a:fontRef idx="minor">
+            <a:schemeClr val="tx1"/>
+          </a:fontRef>
+        </p:style>
+      </p:cxnSp>
+    </p:spTree>
+    <p:extLst>
+      <p:ext uri="{BB962C8B-B14F-4D97-AF65-F5344CB8AC3E}">
+        <p14:creationId xmlns:p14="http://schemas.microsoft.com/office/powerpoint/2010/main" val="2150918848"/>
+      </p:ext>
+    </p:extLst>
+  </p:cSld>
+  <p:clrMapOvr>
+    <a:masterClrMapping/>
+  </p:clrMapOvr>
+</p:sld>
+</file>
+
+<file path=ppt/slides/slide4.xml><?xml version="1.0" encoding="utf-8"?>
+<p:sld xmlns:a="http://schemas.openxmlformats.org/drawingml/2006/main" xmlns:r="http://schemas.openxmlformats.org/officeDocument/2006/relationships" xmlns:p="http://schemas.openxmlformats.org/presentationml/2006/main">
+  <p:cSld>
+    <p:spTree>
+      <p:nvGrpSpPr>
+        <p:cNvPr id="1" name=""/>
+        <p:cNvGrpSpPr/>
+        <p:nvPr/>
+      </p:nvGrpSpPr>
+      <p:grpSpPr>
+        <a:xfrm>
+          <a:off x="0" y="0"/>
+          <a:ext cx="0" cy="0"/>
+          <a:chOff x="0" y="0"/>
+          <a:chExt cx="0" cy="0"/>
+        </a:xfrm>
+      </p:grpSpPr>
+      <p:pic>
+        <p:nvPicPr>
+          <p:cNvPr id="2" name="Picture 1">
+            <a:extLst>
+              <a:ext uri="{FF2B5EF4-FFF2-40B4-BE49-F238E27FC236}">
+                <a16:creationId xmlns:a16="http://schemas.microsoft.com/office/drawing/2014/main" id="{9F133BBF-A79D-F34E-A8F0-83FDDF50F93A}"/>
+              </a:ext>
+            </a:extLst>
+          </p:cNvPr>
+          <p:cNvPicPr>
+            <a:picLocks noChangeAspect="1"/>
+          </p:cNvPicPr>
+          <p:nvPr/>
+        </p:nvPicPr>
+        <p:blipFill>
+          <a:blip r:embed="rId2"/>
+          <a:stretch>
+            <a:fillRect/>
+          </a:stretch>
+        </p:blipFill>
+        <p:spPr>
+          <a:xfrm>
+            <a:off x="2961515" y="0"/>
+            <a:ext cx="6268969" cy="6858000"/>
+          </a:xfrm>
+          <a:prstGeom prst="rect">
+            <a:avLst/>
+          </a:prstGeom>
+        </p:spPr>
+      </p:pic>
+      <p:sp>
+        <p:nvSpPr>
+          <p:cNvPr id="3" name="Rectangle 2">
+            <a:extLst>
+              <a:ext uri="{FF2B5EF4-FFF2-40B4-BE49-F238E27FC236}">
+                <a16:creationId xmlns:a16="http://schemas.microsoft.com/office/drawing/2014/main" id="{BB8D3D5B-CFB6-4F46-84C7-DBAF83CC763F}"/>
+              </a:ext>
+            </a:extLst>
+          </p:cNvPr>
+          <p:cNvSpPr/>
+          <p:nvPr/>
+        </p:nvSpPr>
+        <p:spPr>
+          <a:xfrm>
+            <a:off x="7003626" y="1869440"/>
+            <a:ext cx="1361440" cy="778933"/>
+          </a:xfrm>
+          <a:prstGeom prst="rect">
+            <a:avLst/>
+          </a:prstGeom>
+          <a:noFill/>
+          <a:ln w="38100">
+            <a:solidFill>
+              <a:srgbClr val="C00000"/>
+            </a:solidFill>
+          </a:ln>
+        </p:spPr>
+        <p:style>
+          <a:lnRef idx="2">
+            <a:schemeClr val="accent1">
+              <a:shade val="50000"/>
+            </a:schemeClr>
+          </a:lnRef>
+          <a:fillRef idx="1">
+            <a:schemeClr val="accent1"/>
+          </a:fillRef>
+          <a:effectRef idx="0">
+            <a:schemeClr val="accent1"/>
+          </a:effectRef>
+          <a:fontRef idx="minor">
+            <a:schemeClr val="lt1"/>
+          </a:fontRef>
+        </p:style>
+        <p:txBody>
+          <a:bodyPr rtlCol="0" anchor="ctr"/>
+          <a:lstStyle/>
+          <a:p>
+            <a:pPr algn="ctr"/>
+            <a:endParaRPr lang="en-GB"/>
+          </a:p>
+        </p:txBody>
+      </p:sp>
+      <p:sp>
+        <p:nvSpPr>
+          <p:cNvPr id="4" name="Rectangle 3">
+            <a:extLst>
+              <a:ext uri="{FF2B5EF4-FFF2-40B4-BE49-F238E27FC236}">
+                <a16:creationId xmlns:a16="http://schemas.microsoft.com/office/drawing/2014/main" id="{E104A254-A66B-D049-B2AE-AF74D30EE9E4}"/>
+              </a:ext>
+            </a:extLst>
+          </p:cNvPr>
+          <p:cNvSpPr/>
+          <p:nvPr/>
+        </p:nvSpPr>
+        <p:spPr>
+          <a:xfrm>
+            <a:off x="5699759" y="5178213"/>
+            <a:ext cx="1361440" cy="778933"/>
+          </a:xfrm>
+          <a:prstGeom prst="rect">
+            <a:avLst/>
+          </a:prstGeom>
+          <a:noFill/>
+          <a:ln w="38100">
+            <a:solidFill>
+              <a:srgbClr val="C00000"/>
+            </a:solidFill>
+          </a:ln>
+        </p:spPr>
+        <p:style>
+          <a:lnRef idx="2">
+            <a:schemeClr val="accent1">
+              <a:shade val="50000"/>
+            </a:schemeClr>
+          </a:lnRef>
+          <a:fillRef idx="1">
+            <a:schemeClr val="accent1"/>
+          </a:fillRef>
+          <a:effectRef idx="0">
+            <a:schemeClr val="accent1"/>
+          </a:effectRef>
+          <a:fontRef idx="minor">
+            <a:schemeClr val="lt1"/>
+          </a:fontRef>
+        </p:style>
+        <p:txBody>
+          <a:bodyPr rtlCol="0" anchor="ctr"/>
+          <a:lstStyle/>
+          <a:p>
+            <a:pPr algn="ctr"/>
+            <a:endParaRPr lang="en-GB"/>
+          </a:p>
+        </p:txBody>
+      </p:sp>
+      <p:sp>
+        <p:nvSpPr>
+          <p:cNvPr id="5" name="TextBox 4">
+            <a:extLst>
+              <a:ext uri="{FF2B5EF4-FFF2-40B4-BE49-F238E27FC236}">
+                <a16:creationId xmlns:a16="http://schemas.microsoft.com/office/drawing/2014/main" id="{48CF7AB2-CB53-A441-8338-C5CAF862945B}"/>
+              </a:ext>
+            </a:extLst>
+          </p:cNvPr>
+          <p:cNvSpPr txBox="1"/>
+          <p:nvPr/>
+        </p:nvSpPr>
+        <p:spPr>
+          <a:xfrm>
+            <a:off x="5699759" y="5113865"/>
+            <a:ext cx="1404680" cy="276999"/>
+          </a:xfrm>
+          <a:prstGeom prst="rect">
+            <a:avLst/>
+          </a:prstGeom>
+          <a:noFill/>
+        </p:spPr>
+        <p:txBody>
+          <a:bodyPr wrap="none" rtlCol="0">
+            <a:spAutoFit/>
+          </a:bodyPr>
+          <a:lstStyle/>
+          <a:p>
+            <a:r>
+              <a:rPr lang="en-GB" sz="1200" dirty="0"/>
+              <a:t>‘traffic’ or ‘driving’?</a:t>
+            </a:r>
+          </a:p>
+        </p:txBody>
+      </p:sp>
+    </p:spTree>
+    <p:extLst>
+      <p:ext uri="{BB962C8B-B14F-4D97-AF65-F5344CB8AC3E}">
+        <p14:creationId xmlns:p14="http://schemas.microsoft.com/office/powerpoint/2010/main" val="2658140554"/>
       </p:ext>
     </p:extLst>
   </p:cSld>

</xml_diff>

<commit_message>
Update based on DTS ballot
</commit_message>
<xml_diff>
--- a/pics.pptx
+++ b/pics.pptx
@@ -266,7 +266,7 @@
           <a:p>
             <a:fld id="{AB152B3D-A1C5-AF4C-B483-6B4B52E57E57}" type="datetimeFigureOut">
               <a:rPr lang="en-GB" smtClean="0"/>
-              <a:t>23/08/2020</a:t>
+              <a:t>07/09/2021</a:t>
             </a:fld>
             <a:endParaRPr lang="en-GB"/>
           </a:p>
@@ -466,7 +466,7 @@
           <a:p>
             <a:fld id="{AB152B3D-A1C5-AF4C-B483-6B4B52E57E57}" type="datetimeFigureOut">
               <a:rPr lang="en-GB" smtClean="0"/>
-              <a:t>23/08/2020</a:t>
+              <a:t>07/09/2021</a:t>
             </a:fld>
             <a:endParaRPr lang="en-GB"/>
           </a:p>
@@ -676,7 +676,7 @@
           <a:p>
             <a:fld id="{AB152B3D-A1C5-AF4C-B483-6B4B52E57E57}" type="datetimeFigureOut">
               <a:rPr lang="en-GB" smtClean="0"/>
-              <a:t>23/08/2020</a:t>
+              <a:t>07/09/2021</a:t>
             </a:fld>
             <a:endParaRPr lang="en-GB"/>
           </a:p>
@@ -876,7 +876,7 @@
           <a:p>
             <a:fld id="{AB152B3D-A1C5-AF4C-B483-6B4B52E57E57}" type="datetimeFigureOut">
               <a:rPr lang="en-GB" smtClean="0"/>
-              <a:t>23/08/2020</a:t>
+              <a:t>07/09/2021</a:t>
             </a:fld>
             <a:endParaRPr lang="en-GB"/>
           </a:p>
@@ -1152,7 +1152,7 @@
           <a:p>
             <a:fld id="{AB152B3D-A1C5-AF4C-B483-6B4B52E57E57}" type="datetimeFigureOut">
               <a:rPr lang="en-GB" smtClean="0"/>
-              <a:t>23/08/2020</a:t>
+              <a:t>07/09/2021</a:t>
             </a:fld>
             <a:endParaRPr lang="en-GB"/>
           </a:p>
@@ -1420,7 +1420,7 @@
           <a:p>
             <a:fld id="{AB152B3D-A1C5-AF4C-B483-6B4B52E57E57}" type="datetimeFigureOut">
               <a:rPr lang="en-GB" smtClean="0"/>
-              <a:t>23/08/2020</a:t>
+              <a:t>07/09/2021</a:t>
             </a:fld>
             <a:endParaRPr lang="en-GB"/>
           </a:p>
@@ -1835,7 +1835,7 @@
           <a:p>
             <a:fld id="{AB152B3D-A1C5-AF4C-B483-6B4B52E57E57}" type="datetimeFigureOut">
               <a:rPr lang="en-GB" smtClean="0"/>
-              <a:t>23/08/2020</a:t>
+              <a:t>07/09/2021</a:t>
             </a:fld>
             <a:endParaRPr lang="en-GB"/>
           </a:p>
@@ -1977,7 +1977,7 @@
           <a:p>
             <a:fld id="{AB152B3D-A1C5-AF4C-B483-6B4B52E57E57}" type="datetimeFigureOut">
               <a:rPr lang="en-GB" smtClean="0"/>
-              <a:t>23/08/2020</a:t>
+              <a:t>07/09/2021</a:t>
             </a:fld>
             <a:endParaRPr lang="en-GB"/>
           </a:p>
@@ -2090,7 +2090,7 @@
           <a:p>
             <a:fld id="{AB152B3D-A1C5-AF4C-B483-6B4B52E57E57}" type="datetimeFigureOut">
               <a:rPr lang="en-GB" smtClean="0"/>
-              <a:t>23/08/2020</a:t>
+              <a:t>07/09/2021</a:t>
             </a:fld>
             <a:endParaRPr lang="en-GB"/>
           </a:p>
@@ -2403,7 +2403,7 @@
           <a:p>
             <a:fld id="{AB152B3D-A1C5-AF4C-B483-6B4B52E57E57}" type="datetimeFigureOut">
               <a:rPr lang="en-GB" smtClean="0"/>
-              <a:t>23/08/2020</a:t>
+              <a:t>07/09/2021</a:t>
             </a:fld>
             <a:endParaRPr lang="en-GB"/>
           </a:p>
@@ -2692,7 +2692,7 @@
           <a:p>
             <a:fld id="{AB152B3D-A1C5-AF4C-B483-6B4B52E57E57}" type="datetimeFigureOut">
               <a:rPr lang="en-GB" smtClean="0"/>
-              <a:t>23/08/2020</a:t>
+              <a:t>07/09/2021</a:t>
             </a:fld>
             <a:endParaRPr lang="en-GB"/>
           </a:p>
@@ -2935,7 +2935,7 @@
           <a:p>
             <a:fld id="{AB152B3D-A1C5-AF4C-B483-6B4B52E57E57}" type="datetimeFigureOut">
               <a:rPr lang="en-GB" smtClean="0"/>
-              <a:t>23/08/2020</a:t>
+              <a:t>07/09/2021</a:t>
             </a:fld>
             <a:endParaRPr lang="en-GB"/>
           </a:p>
@@ -3361,13 +3361,15 @@
               </a:ext>
             </a:extLst>
           </p:cNvPr>
-          <p:cNvCxnSpPr/>
+          <p:cNvCxnSpPr>
+            <a:cxnSpLocks/>
+          </p:cNvCxnSpPr>
           <p:nvPr/>
         </p:nvCxnSpPr>
         <p:spPr>
           <a:xfrm>
             <a:off x="11254457" y="3856540"/>
-            <a:ext cx="0" cy="1371600"/>
+            <a:ext cx="0" cy="930102"/>
           </a:xfrm>
           <a:prstGeom prst="line">
             <a:avLst/>
@@ -3397,13 +3399,15 @@
               </a:ext>
             </a:extLst>
           </p:cNvPr>
-          <p:cNvCxnSpPr/>
+          <p:cNvCxnSpPr>
+            <a:cxnSpLocks/>
+          </p:cNvCxnSpPr>
           <p:nvPr/>
         </p:nvCxnSpPr>
         <p:spPr>
           <a:xfrm>
-            <a:off x="3207737" y="3856540"/>
-            <a:ext cx="0" cy="1371600"/>
+            <a:off x="3207737" y="3846897"/>
+            <a:ext cx="0" cy="939745"/>
           </a:xfrm>
           <a:prstGeom prst="line">
             <a:avLst/>
@@ -3649,13 +3653,15 @@
               </a:ext>
             </a:extLst>
           </p:cNvPr>
-          <p:cNvCxnSpPr/>
+          <p:cNvCxnSpPr>
+            <a:cxnSpLocks/>
+          </p:cNvCxnSpPr>
           <p:nvPr/>
         </p:nvCxnSpPr>
         <p:spPr>
           <a:xfrm>
             <a:off x="9882857" y="3856540"/>
-            <a:ext cx="0" cy="1371600"/>
+            <a:ext cx="0" cy="578691"/>
           </a:xfrm>
           <a:prstGeom prst="line">
             <a:avLst/>
@@ -4050,13 +4056,15 @@
               </a:ext>
             </a:extLst>
           </p:cNvPr>
-          <p:cNvCxnSpPr/>
+          <p:cNvCxnSpPr>
+            <a:cxnSpLocks/>
+          </p:cNvCxnSpPr>
           <p:nvPr/>
         </p:nvCxnSpPr>
         <p:spPr>
           <a:xfrm>
-            <a:off x="2750537" y="3856540"/>
-            <a:ext cx="0" cy="1371600"/>
+            <a:off x="2750537" y="3846897"/>
+            <a:ext cx="0" cy="939745"/>
           </a:xfrm>
           <a:prstGeom prst="line">
             <a:avLst/>
@@ -4086,13 +4094,15 @@
               </a:ext>
             </a:extLst>
           </p:cNvPr>
-          <p:cNvCxnSpPr/>
+          <p:cNvCxnSpPr>
+            <a:cxnSpLocks/>
+          </p:cNvCxnSpPr>
           <p:nvPr/>
         </p:nvCxnSpPr>
         <p:spPr>
           <a:xfrm>
-            <a:off x="4579337" y="3856540"/>
-            <a:ext cx="0" cy="1371600"/>
+            <a:off x="4579337" y="3846897"/>
+            <a:ext cx="0" cy="939745"/>
           </a:xfrm>
           <a:prstGeom prst="line">
             <a:avLst/>
@@ -4122,13 +4132,15 @@
               </a:ext>
             </a:extLst>
           </p:cNvPr>
-          <p:cNvCxnSpPr/>
+          <p:cNvCxnSpPr>
+            <a:cxnSpLocks/>
+          </p:cNvCxnSpPr>
           <p:nvPr/>
         </p:nvCxnSpPr>
         <p:spPr>
           <a:xfrm>
             <a:off x="5950937" y="3856540"/>
-            <a:ext cx="0" cy="1371600"/>
+            <a:ext cx="0" cy="930102"/>
           </a:xfrm>
           <a:prstGeom prst="line">
             <a:avLst/>
@@ -4158,13 +4170,15 @@
               </a:ext>
             </a:extLst>
           </p:cNvPr>
-          <p:cNvCxnSpPr/>
+          <p:cNvCxnSpPr>
+            <a:cxnSpLocks/>
+          </p:cNvCxnSpPr>
           <p:nvPr/>
         </p:nvCxnSpPr>
         <p:spPr>
           <a:xfrm>
             <a:off x="6408137" y="3856540"/>
-            <a:ext cx="0" cy="1371600"/>
+            <a:ext cx="0" cy="930102"/>
           </a:xfrm>
           <a:prstGeom prst="line">
             <a:avLst/>
@@ -4194,13 +4208,15 @@
               </a:ext>
             </a:extLst>
           </p:cNvPr>
-          <p:cNvCxnSpPr/>
+          <p:cNvCxnSpPr>
+            <a:cxnSpLocks/>
+          </p:cNvCxnSpPr>
           <p:nvPr/>
         </p:nvCxnSpPr>
         <p:spPr>
           <a:xfrm>
             <a:off x="8236937" y="3856540"/>
-            <a:ext cx="0" cy="1371600"/>
+            <a:ext cx="0" cy="930102"/>
           </a:xfrm>
           <a:prstGeom prst="line">
             <a:avLst/>
@@ -4230,13 +4246,15 @@
               </a:ext>
             </a:extLst>
           </p:cNvPr>
-          <p:cNvCxnSpPr/>
+          <p:cNvCxnSpPr>
+            <a:cxnSpLocks/>
+          </p:cNvCxnSpPr>
           <p:nvPr/>
         </p:nvCxnSpPr>
         <p:spPr>
           <a:xfrm>
             <a:off x="8511257" y="3856540"/>
-            <a:ext cx="0" cy="1371600"/>
+            <a:ext cx="0" cy="930102"/>
           </a:xfrm>
           <a:prstGeom prst="line">
             <a:avLst/>
@@ -4266,13 +4284,15 @@
               </a:ext>
             </a:extLst>
           </p:cNvPr>
-          <p:cNvCxnSpPr/>
+          <p:cNvCxnSpPr>
+            <a:cxnSpLocks/>
+          </p:cNvCxnSpPr>
           <p:nvPr/>
         </p:nvCxnSpPr>
         <p:spPr>
           <a:xfrm>
             <a:off x="11711657" y="3856540"/>
-            <a:ext cx="0" cy="1371600"/>
+            <a:ext cx="0" cy="930102"/>
           </a:xfrm>
           <a:prstGeom prst="line">
             <a:avLst/>
@@ -4302,13 +4322,15 @@
               </a:ext>
             </a:extLst>
           </p:cNvPr>
-          <p:cNvCxnSpPr/>
+          <p:cNvCxnSpPr>
+            <a:cxnSpLocks/>
+          </p:cNvCxnSpPr>
           <p:nvPr/>
         </p:nvCxnSpPr>
         <p:spPr>
           <a:xfrm>
             <a:off x="12168857" y="3856540"/>
-            <a:ext cx="0" cy="1371600"/>
+            <a:ext cx="0" cy="930102"/>
           </a:xfrm>
           <a:prstGeom prst="line">
             <a:avLst/>
@@ -4372,7 +4394,7 @@
         </p:nvSpPr>
         <p:spPr>
           <a:xfrm>
-            <a:off x="3499195" y="4219174"/>
+            <a:off x="3499195" y="3867477"/>
             <a:ext cx="788677" cy="646331"/>
           </a:xfrm>
           <a:prstGeom prst="rect">
@@ -4415,7 +4437,7 @@
         </p:nvSpPr>
         <p:spPr>
           <a:xfrm>
-            <a:off x="4870794" y="4219173"/>
+            <a:off x="4870794" y="3867476"/>
             <a:ext cx="788677" cy="646331"/>
           </a:xfrm>
           <a:prstGeom prst="rect">
@@ -4458,7 +4480,7 @@
         </p:nvSpPr>
         <p:spPr>
           <a:xfrm>
-            <a:off x="10174318" y="4215009"/>
+            <a:off x="10174318" y="3863312"/>
             <a:ext cx="788677" cy="646331"/>
           </a:xfrm>
           <a:prstGeom prst="rect">
@@ -4501,7 +4523,7 @@
         </p:nvSpPr>
         <p:spPr>
           <a:xfrm>
-            <a:off x="8802719" y="4215009"/>
+            <a:off x="8802719" y="3863312"/>
             <a:ext cx="788677" cy="646331"/>
           </a:xfrm>
           <a:prstGeom prst="rect">
@@ -4544,7 +4566,7 @@
         </p:nvSpPr>
         <p:spPr>
           <a:xfrm>
-            <a:off x="6361825" y="4215009"/>
+            <a:off x="6361825" y="3863312"/>
             <a:ext cx="1922001" cy="923330"/>
           </a:xfrm>
           <a:prstGeom prst="rect">
@@ -4594,7 +4616,7 @@
         </p:nvSpPr>
         <p:spPr>
           <a:xfrm rot="5400000">
-            <a:off x="4386175" y="4074607"/>
+            <a:off x="4385097" y="3625133"/>
             <a:ext cx="386317" cy="2743194"/>
           </a:xfrm>
           <a:prstGeom prst="rightBrace">
@@ -4626,49 +4648,6 @@
       </p:sp>
       <p:sp>
         <p:nvSpPr>
-          <p:cNvPr id="65" name="TextBox 64">
-            <a:extLst>
-              <a:ext uri="{FF2B5EF4-FFF2-40B4-BE49-F238E27FC236}">
-                <a16:creationId xmlns:a16="http://schemas.microsoft.com/office/drawing/2014/main" id="{EC29DC05-BB67-AD43-9DC1-1C7C92D2B004}"/>
-              </a:ext>
-            </a:extLst>
-          </p:cNvPr>
-          <p:cNvSpPr txBox="1"/>
-          <p:nvPr/>
-        </p:nvSpPr>
-        <p:spPr>
-          <a:xfrm>
-            <a:off x="4050791" y="5613114"/>
-            <a:ext cx="1057084" cy="646331"/>
-          </a:xfrm>
-          <a:prstGeom prst="rect">
-            <a:avLst/>
-          </a:prstGeom>
-          <a:noFill/>
-        </p:spPr>
-        <p:txBody>
-          <a:bodyPr wrap="none" rtlCol="0">
-            <a:spAutoFit/>
-          </a:bodyPr>
-          <a:lstStyle/>
-          <a:p>
-            <a:pPr algn="ctr"/>
-            <a:r>
-              <a:rPr lang="en-GB" dirty="0"/>
-              <a:t>travelled </a:t>
-            </a:r>
-          </a:p>
-          <a:p>
-            <a:pPr algn="ctr"/>
-            <a:r>
-              <a:rPr lang="en-GB" dirty="0"/>
-              <a:t>way</a:t>
-            </a:r>
-          </a:p>
-        </p:txBody>
-      </p:sp>
-      <p:sp>
-        <p:nvSpPr>
           <p:cNvPr id="66" name="Right Brace 65">
             <a:extLst>
               <a:ext uri="{FF2B5EF4-FFF2-40B4-BE49-F238E27FC236}">
@@ -4681,8 +4660,8 @@
         </p:nvSpPr>
         <p:spPr>
           <a:xfrm rot="5400000">
-            <a:off x="9689701" y="4074607"/>
-            <a:ext cx="386317" cy="2743194"/>
+            <a:off x="9918100" y="3677010"/>
+            <a:ext cx="386317" cy="3194332"/>
           </a:xfrm>
           <a:prstGeom prst="rightBrace">
             <a:avLst/>
@@ -4725,8 +4704,8 @@
         </p:nvSpPr>
         <p:spPr>
           <a:xfrm>
-            <a:off x="9354317" y="5613114"/>
-            <a:ext cx="1057084" cy="646331"/>
+            <a:off x="7376810" y="6167806"/>
+            <a:ext cx="1041312" cy="646331"/>
           </a:xfrm>
           <a:prstGeom prst="rect">
             <a:avLst/>
@@ -4742,14 +4721,14 @@
             <a:pPr algn="ctr"/>
             <a:r>
               <a:rPr lang="en-GB" dirty="0"/>
-              <a:t>travelled </a:t>
-            </a:r>
-          </a:p>
-          <a:p>
-            <a:pPr algn="ctr"/>
-            <a:r>
+              <a:t>roadway </a:t>
+            </a:r>
+            <a:br>
               <a:rPr lang="en-GB" dirty="0"/>
-              <a:t>way</a:t>
+            </a:br>
+            <a:r>
+              <a:rPr lang="en-GB" dirty="0"/>
+              <a:t>(jointly)</a:t>
             </a:r>
           </a:p>
         </p:txBody>
@@ -4768,7 +4747,7 @@
         </p:nvSpPr>
         <p:spPr>
           <a:xfrm rot="5400000">
-            <a:off x="7115406" y="4531808"/>
+            <a:off x="7129960" y="4082334"/>
             <a:ext cx="386317" cy="1828794"/>
           </a:xfrm>
           <a:prstGeom prst="rightBrace">
@@ -4800,49 +4779,6 @@
       </p:sp>
       <p:sp>
         <p:nvSpPr>
-          <p:cNvPr id="69" name="TextBox 68">
-            <a:extLst>
-              <a:ext uri="{FF2B5EF4-FFF2-40B4-BE49-F238E27FC236}">
-                <a16:creationId xmlns:a16="http://schemas.microsoft.com/office/drawing/2014/main" id="{08C91685-FAC2-264F-BA0B-99AE2797CEED}"/>
-              </a:ext>
-            </a:extLst>
-          </p:cNvPr>
-          <p:cNvSpPr txBox="1"/>
-          <p:nvPr/>
-        </p:nvSpPr>
-        <p:spPr>
-          <a:xfrm>
-            <a:off x="6774484" y="5606488"/>
-            <a:ext cx="1057084" cy="646331"/>
-          </a:xfrm>
-          <a:prstGeom prst="rect">
-            <a:avLst/>
-          </a:prstGeom>
-          <a:noFill/>
-        </p:spPr>
-        <p:txBody>
-          <a:bodyPr wrap="none" rtlCol="0">
-            <a:spAutoFit/>
-          </a:bodyPr>
-          <a:lstStyle/>
-          <a:p>
-            <a:pPr algn="ctr"/>
-            <a:r>
-              <a:rPr lang="en-GB" dirty="0"/>
-              <a:t>travelled </a:t>
-            </a:r>
-          </a:p>
-          <a:p>
-            <a:pPr algn="ctr"/>
-            <a:r>
-              <a:rPr lang="en-GB" dirty="0"/>
-              <a:t>way</a:t>
-            </a:r>
-          </a:p>
-        </p:txBody>
-      </p:sp>
-      <p:sp>
-        <p:nvSpPr>
           <p:cNvPr id="70" name="TextBox 69">
             <a:extLst>
               <a:ext uri="{FF2B5EF4-FFF2-40B4-BE49-F238E27FC236}">
@@ -5037,15 +4973,15 @@
           </p:cNvPr>
           <p:cNvCxnSpPr>
             <a:cxnSpLocks/>
-            <a:stCxn id="82" idx="0"/>
+            <a:stCxn id="151" idx="0"/>
             <a:endCxn id="74" idx="2"/>
           </p:cNvCxnSpPr>
           <p:nvPr/>
         </p:nvCxnSpPr>
         <p:spPr>
           <a:xfrm rot="5400000" flipH="1" flipV="1">
-            <a:off x="6174558" y="-589166"/>
-            <a:ext cx="647046" cy="3707666"/>
+            <a:off x="5913837" y="-395520"/>
+            <a:ext cx="1101412" cy="3774741"/>
           </a:xfrm>
           <a:prstGeom prst="curvedConnector3">
             <a:avLst>
@@ -5079,15 +5015,15 @@
           </p:cNvPr>
           <p:cNvCxnSpPr>
             <a:cxnSpLocks/>
-            <a:stCxn id="84" idx="0"/>
+            <a:stCxn id="152" idx="0"/>
             <a:endCxn id="74" idx="2"/>
           </p:cNvCxnSpPr>
           <p:nvPr/>
         </p:nvCxnSpPr>
         <p:spPr>
           <a:xfrm rot="16200000" flipV="1">
-            <a:off x="8941796" y="351262"/>
-            <a:ext cx="578676" cy="1758440"/>
+            <a:off x="8678869" y="614189"/>
+            <a:ext cx="1107004" cy="1760914"/>
           </a:xfrm>
           <a:prstGeom prst="curvedConnector3">
             <a:avLst>
@@ -5121,15 +5057,15 @@
           </p:cNvPr>
           <p:cNvCxnSpPr>
             <a:cxnSpLocks/>
-            <a:stCxn id="86" idx="0"/>
+            <a:stCxn id="153" idx="0"/>
             <a:endCxn id="74" idx="2"/>
           </p:cNvCxnSpPr>
           <p:nvPr/>
         </p:nvCxnSpPr>
         <p:spPr>
           <a:xfrm rot="5400000" flipH="1" flipV="1">
-            <a:off x="7580548" y="748454"/>
-            <a:ext cx="578676" cy="964056"/>
+            <a:off x="7281320" y="977554"/>
+            <a:ext cx="1107004" cy="1034184"/>
           </a:xfrm>
           <a:prstGeom prst="curvedConnector3">
             <a:avLst>
@@ -5154,50 +5090,6 @@
       </p:cxnSp>
       <p:sp>
         <p:nvSpPr>
-          <p:cNvPr id="81" name="Right Brace 80">
-            <a:extLst>
-              <a:ext uri="{FF2B5EF4-FFF2-40B4-BE49-F238E27FC236}">
-                <a16:creationId xmlns:a16="http://schemas.microsoft.com/office/drawing/2014/main" id="{4E652780-A025-6B42-AB0E-4807F83C0A68}"/>
-              </a:ext>
-            </a:extLst>
-          </p:cNvPr>
-          <p:cNvSpPr/>
-          <p:nvPr/>
-        </p:nvSpPr>
-        <p:spPr>
-          <a:xfrm rot="16200000">
-            <a:off x="4380641" y="674070"/>
-            <a:ext cx="386317" cy="2739281"/>
-          </a:xfrm>
-          <a:prstGeom prst="rightBrace">
-            <a:avLst/>
-          </a:prstGeom>
-        </p:spPr>
-        <p:style>
-          <a:lnRef idx="1">
-            <a:schemeClr val="accent1"/>
-          </a:lnRef>
-          <a:fillRef idx="0">
-            <a:schemeClr val="accent1"/>
-          </a:fillRef>
-          <a:effectRef idx="0">
-            <a:schemeClr val="accent1"/>
-          </a:effectRef>
-          <a:fontRef idx="minor">
-            <a:schemeClr val="tx1"/>
-          </a:fontRef>
-        </p:style>
-        <p:txBody>
-          <a:bodyPr rtlCol="0" anchor="ctr"/>
-          <a:lstStyle/>
-          <a:p>
-            <a:pPr algn="ctr"/>
-            <a:endParaRPr lang="en-GB"/>
-          </a:p>
-        </p:txBody>
-      </p:sp>
-      <p:sp>
-        <p:nvSpPr>
           <p:cNvPr id="82" name="TextBox 81">
             <a:extLst>
               <a:ext uri="{FF2B5EF4-FFF2-40B4-BE49-F238E27FC236}">
@@ -5210,7 +5102,7 @@
         </p:nvSpPr>
         <p:spPr>
           <a:xfrm>
-            <a:off x="3989581" y="1588190"/>
+            <a:off x="3924629" y="5100700"/>
             <a:ext cx="1309333" cy="369332"/>
           </a:xfrm>
           <a:prstGeom prst="rect">
@@ -5224,6 +5116,7 @@
           </a:bodyPr>
           <a:lstStyle/>
           <a:p>
+            <a:pPr algn="ctr"/>
             <a:r>
               <a:rPr lang="en-GB" dirty="0"/>
               <a:t>carriageway</a:t>
@@ -5233,64 +5126,20 @@
       </p:sp>
       <p:sp>
         <p:nvSpPr>
-          <p:cNvPr id="83" name="Right Brace 82">
-            <a:extLst>
-              <a:ext uri="{FF2B5EF4-FFF2-40B4-BE49-F238E27FC236}">
-                <a16:creationId xmlns:a16="http://schemas.microsoft.com/office/drawing/2014/main" id="{1182556A-2B7F-6A4B-9FD5-95CA599AD2AD}"/>
-              </a:ext>
-            </a:extLst>
-          </p:cNvPr>
-          <p:cNvSpPr/>
+          <p:cNvPr id="99" name="TextBox 98">
+            <a:extLst>
+              <a:ext uri="{FF2B5EF4-FFF2-40B4-BE49-F238E27FC236}">
+                <a16:creationId xmlns:a16="http://schemas.microsoft.com/office/drawing/2014/main" id="{04D304B3-2879-8244-90AB-CE3497CA72FE}"/>
+              </a:ext>
+            </a:extLst>
+          </p:cNvPr>
+          <p:cNvSpPr txBox="1"/>
           <p:nvPr/>
         </p:nvSpPr>
         <p:spPr>
           <a:xfrm rot="16200000">
-            <a:off x="9917196" y="451397"/>
-            <a:ext cx="386317" cy="3192911"/>
-          </a:xfrm>
-          <a:prstGeom prst="rightBrace">
-            <a:avLst/>
-          </a:prstGeom>
-        </p:spPr>
-        <p:style>
-          <a:lnRef idx="1">
-            <a:schemeClr val="accent1"/>
-          </a:lnRef>
-          <a:fillRef idx="0">
-            <a:schemeClr val="accent1"/>
-          </a:fillRef>
-          <a:effectRef idx="0">
-            <a:schemeClr val="accent1"/>
-          </a:effectRef>
-          <a:fontRef idx="minor">
-            <a:schemeClr val="tx1"/>
-          </a:fontRef>
-        </p:style>
-        <p:txBody>
-          <a:bodyPr rtlCol="0" anchor="ctr"/>
-          <a:lstStyle/>
-          <a:p>
-            <a:pPr algn="ctr"/>
-            <a:endParaRPr lang="en-GB"/>
-          </a:p>
-        </p:txBody>
-      </p:sp>
-      <p:sp>
-        <p:nvSpPr>
-          <p:cNvPr id="84" name="TextBox 83">
-            <a:extLst>
-              <a:ext uri="{FF2B5EF4-FFF2-40B4-BE49-F238E27FC236}">
-                <a16:creationId xmlns:a16="http://schemas.microsoft.com/office/drawing/2014/main" id="{10B22148-AC20-B242-94B7-CA2DF47CCFA5}"/>
-              </a:ext>
-            </a:extLst>
-          </p:cNvPr>
-          <p:cNvSpPr txBox="1"/>
-          <p:nvPr/>
-        </p:nvSpPr>
-        <p:spPr>
-          <a:xfrm>
-            <a:off x="9455687" y="1519820"/>
-            <a:ext cx="1309333" cy="369332"/>
+            <a:off x="5204975" y="4520077"/>
+            <a:ext cx="1949123" cy="369332"/>
           </a:xfrm>
           <a:prstGeom prst="rect">
             <a:avLst/>
@@ -5303,108 +5152,30 @@
           </a:bodyPr>
           <a:lstStyle/>
           <a:p>
+            <a:pPr algn="ctr"/>
             <a:r>
               <a:rPr lang="en-GB" dirty="0"/>
-              <a:t>carriageway</a:t>
-            </a:r>
-          </a:p>
-        </p:txBody>
-      </p:sp>
-      <p:sp>
-        <p:nvSpPr>
-          <p:cNvPr id="85" name="Right Brace 84">
-            <a:extLst>
-              <a:ext uri="{FF2B5EF4-FFF2-40B4-BE49-F238E27FC236}">
-                <a16:creationId xmlns:a16="http://schemas.microsoft.com/office/drawing/2014/main" id="{73130067-DDCF-E34B-B4FC-E4D98356CCC6}"/>
-              </a:ext>
-            </a:extLst>
-          </p:cNvPr>
-          <p:cNvSpPr/>
+              <a:t>central reservation</a:t>
+            </a:r>
+          </a:p>
+        </p:txBody>
+      </p:sp>
+      <p:sp>
+        <p:nvSpPr>
+          <p:cNvPr id="100" name="TextBox 99">
+            <a:extLst>
+              <a:ext uri="{FF2B5EF4-FFF2-40B4-BE49-F238E27FC236}">
+                <a16:creationId xmlns:a16="http://schemas.microsoft.com/office/drawing/2014/main" id="{63D8BEB9-F7A0-8241-986B-207F8695EDA0}"/>
+              </a:ext>
+            </a:extLst>
+          </p:cNvPr>
+          <p:cNvSpPr txBox="1"/>
           <p:nvPr/>
         </p:nvSpPr>
         <p:spPr>
           <a:xfrm rot="16200000">
-            <a:off x="7132850" y="1133451"/>
-            <a:ext cx="386317" cy="1828800"/>
-          </a:xfrm>
-          <a:prstGeom prst="rightBrace">
-            <a:avLst/>
-          </a:prstGeom>
-        </p:spPr>
-        <p:style>
-          <a:lnRef idx="1">
-            <a:schemeClr val="accent1"/>
-          </a:lnRef>
-          <a:fillRef idx="0">
-            <a:schemeClr val="accent1"/>
-          </a:fillRef>
-          <a:effectRef idx="0">
-            <a:schemeClr val="accent1"/>
-          </a:effectRef>
-          <a:fontRef idx="minor">
-            <a:schemeClr val="tx1"/>
-          </a:fontRef>
-        </p:style>
-        <p:txBody>
-          <a:bodyPr rtlCol="0" anchor="ctr"/>
-          <a:lstStyle/>
-          <a:p>
-            <a:pPr algn="ctr"/>
-            <a:endParaRPr lang="en-GB"/>
-          </a:p>
-        </p:txBody>
-      </p:sp>
-      <p:sp>
-        <p:nvSpPr>
-          <p:cNvPr id="86" name="TextBox 85">
-            <a:extLst>
-              <a:ext uri="{FF2B5EF4-FFF2-40B4-BE49-F238E27FC236}">
-                <a16:creationId xmlns:a16="http://schemas.microsoft.com/office/drawing/2014/main" id="{37EFB901-D3FE-414E-8804-D38E84088EC5}"/>
-              </a:ext>
-            </a:extLst>
-          </p:cNvPr>
-          <p:cNvSpPr txBox="1"/>
-          <p:nvPr/>
-        </p:nvSpPr>
-        <p:spPr>
-          <a:xfrm>
-            <a:off x="6657762" y="1519820"/>
-            <a:ext cx="1460191" cy="369332"/>
-          </a:xfrm>
-          <a:prstGeom prst="rect">
-            <a:avLst/>
-          </a:prstGeom>
-          <a:noFill/>
-        </p:spPr>
-        <p:txBody>
-          <a:bodyPr wrap="square" rtlCol="0">
-            <a:spAutoFit/>
-          </a:bodyPr>
-          <a:lstStyle/>
-          <a:p>
-            <a:r>
-              <a:rPr lang="en-GB" dirty="0"/>
-              <a:t>carriageway</a:t>
-            </a:r>
-          </a:p>
-        </p:txBody>
-      </p:sp>
-      <p:sp>
-        <p:nvSpPr>
-          <p:cNvPr id="99" name="TextBox 98">
-            <a:extLst>
-              <a:ext uri="{FF2B5EF4-FFF2-40B4-BE49-F238E27FC236}">
-                <a16:creationId xmlns:a16="http://schemas.microsoft.com/office/drawing/2014/main" id="{04D304B3-2879-8244-90AB-CE3497CA72FE}"/>
-              </a:ext>
-            </a:extLst>
-          </p:cNvPr>
-          <p:cNvSpPr txBox="1"/>
-          <p:nvPr/>
-        </p:nvSpPr>
-        <p:spPr>
-          <a:xfrm rot="16200000">
-            <a:off x="5204975" y="4520077"/>
-            <a:ext cx="1949123" cy="369332"/>
+            <a:off x="7629822" y="4316875"/>
+            <a:ext cx="1452001" cy="369332"/>
           </a:xfrm>
           <a:prstGeom prst="rect">
             <a:avLst/>
@@ -5420,17 +5191,17 @@
             <a:pPr algn="ctr"/>
             <a:r>
               <a:rPr lang="en-GB" dirty="0"/>
-              <a:t>central reservation</a:t>
-            </a:r>
-          </a:p>
-        </p:txBody>
-      </p:sp>
-      <p:sp>
-        <p:nvSpPr>
-          <p:cNvPr id="100" name="TextBox 99">
-            <a:extLst>
-              <a:ext uri="{FF2B5EF4-FFF2-40B4-BE49-F238E27FC236}">
-                <a16:creationId xmlns:a16="http://schemas.microsoft.com/office/drawing/2014/main" id="{63D8BEB9-F7A0-8241-986B-207F8695EDA0}"/>
+              <a:t>Jersey barrier</a:t>
+            </a:r>
+          </a:p>
+        </p:txBody>
+      </p:sp>
+      <p:sp>
+        <p:nvSpPr>
+          <p:cNvPr id="101" name="TextBox 100">
+            <a:extLst>
+              <a:ext uri="{FF2B5EF4-FFF2-40B4-BE49-F238E27FC236}">
+                <a16:creationId xmlns:a16="http://schemas.microsoft.com/office/drawing/2014/main" id="{F8CA77DD-577B-2E43-9F50-802D5032ACA6}"/>
               </a:ext>
             </a:extLst>
           </p:cNvPr>
@@ -5439,8 +5210,8 @@
         </p:nvSpPr>
         <p:spPr>
           <a:xfrm rot="16200000">
-            <a:off x="7633726" y="4418474"/>
-            <a:ext cx="1452001" cy="369332"/>
+            <a:off x="11437772" y="4353506"/>
+            <a:ext cx="995273" cy="369332"/>
           </a:xfrm>
           <a:prstGeom prst="rect">
             <a:avLst/>
@@ -5456,17 +5227,17 @@
             <a:pPr algn="ctr"/>
             <a:r>
               <a:rPr lang="en-GB" dirty="0"/>
-              <a:t>Jersey barrier</a:t>
-            </a:r>
-          </a:p>
-        </p:txBody>
-      </p:sp>
-      <p:sp>
-        <p:nvSpPr>
-          <p:cNvPr id="101" name="TextBox 100">
-            <a:extLst>
-              <a:ext uri="{FF2B5EF4-FFF2-40B4-BE49-F238E27FC236}">
-                <a16:creationId xmlns:a16="http://schemas.microsoft.com/office/drawing/2014/main" id="{F8CA77DD-577B-2E43-9F50-802D5032ACA6}"/>
+              <a:t>roadside</a:t>
+            </a:r>
+          </a:p>
+        </p:txBody>
+      </p:sp>
+      <p:sp>
+        <p:nvSpPr>
+          <p:cNvPr id="102" name="TextBox 101">
+            <a:extLst>
+              <a:ext uri="{FF2B5EF4-FFF2-40B4-BE49-F238E27FC236}">
+                <a16:creationId xmlns:a16="http://schemas.microsoft.com/office/drawing/2014/main" id="{CB079028-F39A-E54B-87EC-D4A0E83DAF21}"/>
               </a:ext>
             </a:extLst>
           </p:cNvPr>
@@ -5474,44 +5245,8 @@
           <p:nvPr/>
         </p:nvSpPr>
         <p:spPr>
-          <a:xfrm rot="16200000">
-            <a:off x="11437772" y="4353506"/>
-            <a:ext cx="995273" cy="369332"/>
-          </a:xfrm>
-          <a:prstGeom prst="rect">
-            <a:avLst/>
-          </a:prstGeom>
-          <a:noFill/>
-        </p:spPr>
-        <p:txBody>
-          <a:bodyPr wrap="none" rtlCol="0">
-            <a:spAutoFit/>
-          </a:bodyPr>
-          <a:lstStyle/>
-          <a:p>
-            <a:pPr algn="ctr"/>
-            <a:r>
-              <a:rPr lang="en-GB" dirty="0"/>
-              <a:t>roadside</a:t>
-            </a:r>
-          </a:p>
-        </p:txBody>
-      </p:sp>
-      <p:sp>
-        <p:nvSpPr>
-          <p:cNvPr id="102" name="TextBox 101">
-            <a:extLst>
-              <a:ext uri="{FF2B5EF4-FFF2-40B4-BE49-F238E27FC236}">
-                <a16:creationId xmlns:a16="http://schemas.microsoft.com/office/drawing/2014/main" id="{CB079028-F39A-E54B-87EC-D4A0E83DAF21}"/>
-              </a:ext>
-            </a:extLst>
-          </p:cNvPr>
-          <p:cNvSpPr txBox="1"/>
-          <p:nvPr/>
-        </p:nvSpPr>
-        <p:spPr>
-          <a:xfrm>
-            <a:off x="1114972" y="1588190"/>
+          <a:xfrm>
+            <a:off x="1180288" y="1588190"/>
             <a:ext cx="995273" cy="369332"/>
           </a:xfrm>
           <a:prstGeom prst="rect">
@@ -5786,15 +5521,15 @@
         </p:nvSpPr>
         <p:spPr>
           <a:xfrm>
-            <a:off x="11665300" y="3438643"/>
+            <a:off x="11638619" y="3341801"/>
             <a:ext cx="714375" cy="183805"/>
           </a:xfrm>
           <a:prstGeom prst="accentCallout1">
             <a:avLst>
-              <a:gd name="adj1" fmla="val 18750"/>
-              <a:gd name="adj2" fmla="val -8333"/>
-              <a:gd name="adj3" fmla="val 143593"/>
-              <a:gd name="adj4" fmla="val -37444"/>
+              <a:gd name="adj1" fmla="val 60745"/>
+              <a:gd name="adj2" fmla="val -2514"/>
+              <a:gd name="adj3" fmla="val 188818"/>
+              <a:gd name="adj4" fmla="val -27470"/>
             </a:avLst>
           </a:prstGeom>
           <a:noFill/>
@@ -5894,83 +5629,6 @@
           </a:p>
         </p:txBody>
       </p:sp>
-      <p:sp>
-        <p:nvSpPr>
-          <p:cNvPr id="12" name="TextBox 11">
-            <a:extLst>
-              <a:ext uri="{FF2B5EF4-FFF2-40B4-BE49-F238E27FC236}">
-                <a16:creationId xmlns:a16="http://schemas.microsoft.com/office/drawing/2014/main" id="{9804EA8B-7465-F54D-9021-C74E26D03186}"/>
-              </a:ext>
-            </a:extLst>
-          </p:cNvPr>
-          <p:cNvSpPr txBox="1"/>
-          <p:nvPr/>
-        </p:nvSpPr>
-        <p:spPr>
-          <a:xfrm>
-            <a:off x="9734260" y="508882"/>
-            <a:ext cx="2477703" cy="830997"/>
-          </a:xfrm>
-          <a:prstGeom prst="rect">
-            <a:avLst/>
-          </a:prstGeom>
-          <a:noFill/>
-        </p:spPr>
-        <p:txBody>
-          <a:bodyPr wrap="square" rtlCol="0">
-            <a:spAutoFit/>
-          </a:bodyPr>
-          <a:lstStyle/>
-          <a:p>
-            <a:r>
-              <a:rPr lang="en-GB" sz="1200" dirty="0"/>
-              <a:t>Driving space is the composite of all travelled ways in the cross-section plus any hard/soft shoulders and hardstanding</a:t>
-            </a:r>
-            <a:endParaRPr lang="en-GB" sz="1200" dirty="0">
-              <a:highlight>
-                <a:srgbClr val="FFFF00"/>
-              </a:highlight>
-            </a:endParaRPr>
-          </a:p>
-        </p:txBody>
-      </p:sp>
-      <p:sp>
-        <p:nvSpPr>
-          <p:cNvPr id="17" name="TextBox 16">
-            <a:extLst>
-              <a:ext uri="{FF2B5EF4-FFF2-40B4-BE49-F238E27FC236}">
-                <a16:creationId xmlns:a16="http://schemas.microsoft.com/office/drawing/2014/main" id="{900B3C8D-8E3A-E94E-80BD-29FB16AC5929}"/>
-              </a:ext>
-            </a:extLst>
-          </p:cNvPr>
-          <p:cNvSpPr txBox="1"/>
-          <p:nvPr/>
-        </p:nvSpPr>
-        <p:spPr>
-          <a:xfrm>
-            <a:off x="9025926" y="6163019"/>
-            <a:ext cx="1985768" cy="461665"/>
-          </a:xfrm>
-          <a:prstGeom prst="rect">
-            <a:avLst/>
-          </a:prstGeom>
-          <a:solidFill>
-            <a:srgbClr val="FFFF00"/>
-          </a:solidFill>
-        </p:spPr>
-        <p:txBody>
-          <a:bodyPr wrap="square" rtlCol="0">
-            <a:spAutoFit/>
-          </a:bodyPr>
-          <a:lstStyle/>
-          <a:p>
-            <a:r>
-              <a:rPr lang="en-GB" sz="1200" dirty="0"/>
-              <a:t>Does travelled way include foot paths and cycle paths?</a:t>
-            </a:r>
-          </a:p>
-        </p:txBody>
-      </p:sp>
       <p:pic>
         <p:nvPicPr>
           <p:cNvPr id="107" name="Picture 106">
@@ -5992,7 +5650,7 @@
         </p:blipFill>
         <p:spPr>
           <a:xfrm rot="18870957">
-            <a:off x="1052441" y="3565771"/>
+            <a:off x="1051560" y="3566160"/>
             <a:ext cx="457197" cy="457200"/>
           </a:xfrm>
           <a:prstGeom prst="rect">
@@ -6096,13 +5754,15 @@
               </a:ext>
             </a:extLst>
           </p:cNvPr>
-          <p:cNvCxnSpPr/>
+          <p:cNvCxnSpPr>
+            <a:cxnSpLocks/>
+          </p:cNvCxnSpPr>
           <p:nvPr/>
         </p:nvCxnSpPr>
         <p:spPr>
           <a:xfrm>
-            <a:off x="1457825" y="3856540"/>
-            <a:ext cx="0" cy="1371600"/>
+            <a:off x="1451010" y="3846897"/>
+            <a:ext cx="0" cy="936625"/>
           </a:xfrm>
           <a:prstGeom prst="line">
             <a:avLst/>
@@ -6123,6 +5783,439 @@
           </a:fontRef>
         </p:style>
       </p:cxnSp>
+      <p:cxnSp>
+        <p:nvCxnSpPr>
+          <p:cNvPr id="112" name="Curved Connector 111">
+            <a:extLst>
+              <a:ext uri="{FF2B5EF4-FFF2-40B4-BE49-F238E27FC236}">
+                <a16:creationId xmlns:a16="http://schemas.microsoft.com/office/drawing/2014/main" id="{A3E26F02-1548-0449-BFAF-D64230EFC270}"/>
+              </a:ext>
+            </a:extLst>
+          </p:cNvPr>
+          <p:cNvCxnSpPr>
+            <a:cxnSpLocks/>
+            <a:stCxn id="67" idx="0"/>
+            <a:endCxn id="82" idx="2"/>
+          </p:cNvCxnSpPr>
+          <p:nvPr/>
+        </p:nvCxnSpPr>
+        <p:spPr>
+          <a:xfrm rot="16200000" flipV="1">
+            <a:off x="5889494" y="4159834"/>
+            <a:ext cx="697774" cy="3318170"/>
+          </a:xfrm>
+          <a:prstGeom prst="curvedConnector3">
+            <a:avLst>
+              <a:gd name="adj1" fmla="val 50000"/>
+            </a:avLst>
+          </a:prstGeom>
+        </p:spPr>
+        <p:style>
+          <a:lnRef idx="1">
+            <a:schemeClr val="accent1"/>
+          </a:lnRef>
+          <a:fillRef idx="0">
+            <a:schemeClr val="accent1"/>
+          </a:fillRef>
+          <a:effectRef idx="0">
+            <a:schemeClr val="accent1"/>
+          </a:effectRef>
+          <a:fontRef idx="minor">
+            <a:schemeClr val="tx1"/>
+          </a:fontRef>
+        </p:style>
+      </p:cxnSp>
+      <p:cxnSp>
+        <p:nvCxnSpPr>
+          <p:cNvPr id="113" name="Curved Connector 112">
+            <a:extLst>
+              <a:ext uri="{FF2B5EF4-FFF2-40B4-BE49-F238E27FC236}">
+                <a16:creationId xmlns:a16="http://schemas.microsoft.com/office/drawing/2014/main" id="{FE1250A2-A190-5C4C-9C0E-BA024B377D72}"/>
+              </a:ext>
+            </a:extLst>
+          </p:cNvPr>
+          <p:cNvCxnSpPr>
+            <a:cxnSpLocks/>
+            <a:stCxn id="206" idx="2"/>
+            <a:endCxn id="67" idx="0"/>
+          </p:cNvCxnSpPr>
+          <p:nvPr/>
+        </p:nvCxnSpPr>
+        <p:spPr>
+          <a:xfrm rot="5400000">
+            <a:off x="8685060" y="4963152"/>
+            <a:ext cx="417061" cy="1992247"/>
+          </a:xfrm>
+          <a:prstGeom prst="curvedConnector3">
+            <a:avLst>
+              <a:gd name="adj1" fmla="val 50000"/>
+            </a:avLst>
+          </a:prstGeom>
+        </p:spPr>
+        <p:style>
+          <a:lnRef idx="1">
+            <a:schemeClr val="accent1"/>
+          </a:lnRef>
+          <a:fillRef idx="0">
+            <a:schemeClr val="accent1"/>
+          </a:fillRef>
+          <a:effectRef idx="0">
+            <a:schemeClr val="accent1"/>
+          </a:effectRef>
+          <a:fontRef idx="minor">
+            <a:schemeClr val="tx1"/>
+          </a:fontRef>
+        </p:style>
+      </p:cxnSp>
+      <p:cxnSp>
+        <p:nvCxnSpPr>
+          <p:cNvPr id="114" name="Curved Connector 113">
+            <a:extLst>
+              <a:ext uri="{FF2B5EF4-FFF2-40B4-BE49-F238E27FC236}">
+                <a16:creationId xmlns:a16="http://schemas.microsoft.com/office/drawing/2014/main" id="{83BCDE75-C617-7B40-89D8-2C8BC40F0A8B}"/>
+              </a:ext>
+            </a:extLst>
+          </p:cNvPr>
+          <p:cNvCxnSpPr>
+            <a:cxnSpLocks/>
+            <a:stCxn id="207" idx="2"/>
+            <a:endCxn id="67" idx="0"/>
+          </p:cNvCxnSpPr>
+          <p:nvPr/>
+        </p:nvCxnSpPr>
+        <p:spPr>
+          <a:xfrm rot="16200000" flipH="1">
+            <a:off x="7262742" y="5533082"/>
+            <a:ext cx="697774" cy="571673"/>
+          </a:xfrm>
+          <a:prstGeom prst="curvedConnector3">
+            <a:avLst>
+              <a:gd name="adj1" fmla="val 50000"/>
+            </a:avLst>
+          </a:prstGeom>
+        </p:spPr>
+        <p:style>
+          <a:lnRef idx="1">
+            <a:schemeClr val="accent1"/>
+          </a:lnRef>
+          <a:fillRef idx="0">
+            <a:schemeClr val="accent1"/>
+          </a:fillRef>
+          <a:effectRef idx="0">
+            <a:schemeClr val="accent1"/>
+          </a:effectRef>
+          <a:fontRef idx="minor">
+            <a:schemeClr val="tx1"/>
+          </a:fontRef>
+        </p:style>
+      </p:cxnSp>
+      <p:sp>
+        <p:nvSpPr>
+          <p:cNvPr id="151" name="Rectangle 150">
+            <a:extLst>
+              <a:ext uri="{FF2B5EF4-FFF2-40B4-BE49-F238E27FC236}">
+                <a16:creationId xmlns:a16="http://schemas.microsoft.com/office/drawing/2014/main" id="{CD584720-95C4-3B46-B4B5-BDDFD7C36FA1}"/>
+              </a:ext>
+            </a:extLst>
+          </p:cNvPr>
+          <p:cNvSpPr/>
+          <p:nvPr/>
+        </p:nvSpPr>
+        <p:spPr>
+          <a:xfrm>
+            <a:off x="3234524" y="2042556"/>
+            <a:ext cx="2685298" cy="1640025"/>
+          </a:xfrm>
+          <a:prstGeom prst="rect">
+            <a:avLst/>
+          </a:prstGeom>
+          <a:noFill/>
+          <a:ln>
+            <a:solidFill>
+              <a:schemeClr val="accent1"/>
+            </a:solidFill>
+            <a:prstDash val="dash"/>
+          </a:ln>
+        </p:spPr>
+        <p:style>
+          <a:lnRef idx="2">
+            <a:schemeClr val="accent1">
+              <a:shade val="50000"/>
+            </a:schemeClr>
+          </a:lnRef>
+          <a:fillRef idx="1">
+            <a:schemeClr val="accent1"/>
+          </a:fillRef>
+          <a:effectRef idx="0">
+            <a:schemeClr val="accent1"/>
+          </a:effectRef>
+          <a:fontRef idx="minor">
+            <a:schemeClr val="lt1"/>
+          </a:fontRef>
+        </p:style>
+        <p:txBody>
+          <a:bodyPr rtlCol="0" anchor="ctr"/>
+          <a:lstStyle/>
+          <a:p>
+            <a:pPr algn="ctr"/>
+            <a:endParaRPr lang="en-GB"/>
+          </a:p>
+        </p:txBody>
+      </p:sp>
+      <p:sp>
+        <p:nvSpPr>
+          <p:cNvPr id="152" name="Rectangle 151">
+            <a:extLst>
+              <a:ext uri="{FF2B5EF4-FFF2-40B4-BE49-F238E27FC236}">
+                <a16:creationId xmlns:a16="http://schemas.microsoft.com/office/drawing/2014/main" id="{E2692FBC-2EDD-F24A-8A63-7D26092C476D}"/>
+              </a:ext>
+            </a:extLst>
+          </p:cNvPr>
+          <p:cNvSpPr/>
+          <p:nvPr/>
+        </p:nvSpPr>
+        <p:spPr>
+          <a:xfrm>
+            <a:off x="8523696" y="2048148"/>
+            <a:ext cx="3178263" cy="1640025"/>
+          </a:xfrm>
+          <a:prstGeom prst="rect">
+            <a:avLst/>
+          </a:prstGeom>
+          <a:noFill/>
+          <a:ln>
+            <a:solidFill>
+              <a:schemeClr val="accent1"/>
+            </a:solidFill>
+            <a:prstDash val="dash"/>
+          </a:ln>
+        </p:spPr>
+        <p:style>
+          <a:lnRef idx="2">
+            <a:schemeClr val="accent1">
+              <a:shade val="50000"/>
+            </a:schemeClr>
+          </a:lnRef>
+          <a:fillRef idx="1">
+            <a:schemeClr val="accent1"/>
+          </a:fillRef>
+          <a:effectRef idx="0">
+            <a:schemeClr val="accent1"/>
+          </a:effectRef>
+          <a:fontRef idx="minor">
+            <a:schemeClr val="lt1"/>
+          </a:fontRef>
+        </p:style>
+        <p:txBody>
+          <a:bodyPr rtlCol="0" anchor="ctr"/>
+          <a:lstStyle/>
+          <a:p>
+            <a:pPr algn="ctr"/>
+            <a:endParaRPr lang="en-GB"/>
+          </a:p>
+        </p:txBody>
+      </p:sp>
+      <p:sp>
+        <p:nvSpPr>
+          <p:cNvPr id="153" name="Rectangle 152">
+            <a:extLst>
+              <a:ext uri="{FF2B5EF4-FFF2-40B4-BE49-F238E27FC236}">
+                <a16:creationId xmlns:a16="http://schemas.microsoft.com/office/drawing/2014/main" id="{E47F7FA7-ADD4-9347-A77E-F921301192A0}"/>
+              </a:ext>
+            </a:extLst>
+          </p:cNvPr>
+          <p:cNvSpPr/>
+          <p:nvPr/>
+        </p:nvSpPr>
+        <p:spPr>
+          <a:xfrm>
+            <a:off x="6405759" y="2048148"/>
+            <a:ext cx="1823941" cy="1640025"/>
+          </a:xfrm>
+          <a:prstGeom prst="rect">
+            <a:avLst/>
+          </a:prstGeom>
+          <a:noFill/>
+          <a:ln>
+            <a:solidFill>
+              <a:schemeClr val="accent1"/>
+            </a:solidFill>
+            <a:prstDash val="dash"/>
+          </a:ln>
+        </p:spPr>
+        <p:style>
+          <a:lnRef idx="2">
+            <a:schemeClr val="accent1">
+              <a:shade val="50000"/>
+            </a:schemeClr>
+          </a:lnRef>
+          <a:fillRef idx="1">
+            <a:schemeClr val="accent1"/>
+          </a:fillRef>
+          <a:effectRef idx="0">
+            <a:schemeClr val="accent1"/>
+          </a:effectRef>
+          <a:fontRef idx="minor">
+            <a:schemeClr val="lt1"/>
+          </a:fontRef>
+        </p:style>
+        <p:txBody>
+          <a:bodyPr rtlCol="0" anchor="ctr"/>
+          <a:lstStyle/>
+          <a:p>
+            <a:pPr algn="ctr"/>
+            <a:endParaRPr lang="en-GB"/>
+          </a:p>
+        </p:txBody>
+      </p:sp>
+      <p:sp>
+        <p:nvSpPr>
+          <p:cNvPr id="206" name="TextBox 205">
+            <a:extLst>
+              <a:ext uri="{FF2B5EF4-FFF2-40B4-BE49-F238E27FC236}">
+                <a16:creationId xmlns:a16="http://schemas.microsoft.com/office/drawing/2014/main" id="{C6EA2EB0-7BFC-1549-8C32-660CEA643711}"/>
+              </a:ext>
+            </a:extLst>
+          </p:cNvPr>
+          <p:cNvSpPr txBox="1"/>
+          <p:nvPr/>
+        </p:nvSpPr>
+        <p:spPr>
+          <a:xfrm>
+            <a:off x="9235046" y="5381413"/>
+            <a:ext cx="1309333" cy="369332"/>
+          </a:xfrm>
+          <a:prstGeom prst="rect">
+            <a:avLst/>
+          </a:prstGeom>
+          <a:noFill/>
+        </p:spPr>
+        <p:txBody>
+          <a:bodyPr wrap="none" rtlCol="0">
+            <a:spAutoFit/>
+          </a:bodyPr>
+          <a:lstStyle/>
+          <a:p>
+            <a:pPr algn="ctr"/>
+            <a:r>
+              <a:rPr lang="en-GB" dirty="0"/>
+              <a:t>carriageway</a:t>
+            </a:r>
+          </a:p>
+        </p:txBody>
+      </p:sp>
+      <p:sp>
+        <p:nvSpPr>
+          <p:cNvPr id="207" name="TextBox 206">
+            <a:extLst>
+              <a:ext uri="{FF2B5EF4-FFF2-40B4-BE49-F238E27FC236}">
+                <a16:creationId xmlns:a16="http://schemas.microsoft.com/office/drawing/2014/main" id="{192267DD-3DD0-7441-9F3D-2479EA3C6961}"/>
+              </a:ext>
+            </a:extLst>
+          </p:cNvPr>
+          <p:cNvSpPr txBox="1"/>
+          <p:nvPr/>
+        </p:nvSpPr>
+        <p:spPr>
+          <a:xfrm>
+            <a:off x="6671126" y="5100700"/>
+            <a:ext cx="1309333" cy="369332"/>
+          </a:xfrm>
+          <a:prstGeom prst="rect">
+            <a:avLst/>
+          </a:prstGeom>
+          <a:noFill/>
+        </p:spPr>
+        <p:txBody>
+          <a:bodyPr wrap="none" rtlCol="0">
+            <a:spAutoFit/>
+          </a:bodyPr>
+          <a:lstStyle/>
+          <a:p>
+            <a:pPr algn="ctr"/>
+            <a:r>
+              <a:rPr lang="en-GB" dirty="0"/>
+              <a:t>carriageway</a:t>
+            </a:r>
+          </a:p>
+        </p:txBody>
+      </p:sp>
+      <p:cxnSp>
+        <p:nvCxnSpPr>
+          <p:cNvPr id="250" name="Straight Arrow Connector 249">
+            <a:extLst>
+              <a:ext uri="{FF2B5EF4-FFF2-40B4-BE49-F238E27FC236}">
+                <a16:creationId xmlns:a16="http://schemas.microsoft.com/office/drawing/2014/main" id="{380A4087-194E-1249-96CF-81331FA6452B}"/>
+              </a:ext>
+            </a:extLst>
+          </p:cNvPr>
+          <p:cNvCxnSpPr/>
+          <p:nvPr/>
+        </p:nvCxnSpPr>
+        <p:spPr>
+          <a:xfrm>
+            <a:off x="8508025" y="4685323"/>
+            <a:ext cx="2746432" cy="0"/>
+          </a:xfrm>
+          <a:prstGeom prst="straightConnector1">
+            <a:avLst/>
+          </a:prstGeom>
+          <a:ln>
+            <a:headEnd type="triangle"/>
+            <a:tailEnd type="triangle"/>
+          </a:ln>
+        </p:spPr>
+        <p:style>
+          <a:lnRef idx="1">
+            <a:schemeClr val="accent1"/>
+          </a:lnRef>
+          <a:fillRef idx="0">
+            <a:schemeClr val="accent1"/>
+          </a:fillRef>
+          <a:effectRef idx="0">
+            <a:schemeClr val="accent1"/>
+          </a:effectRef>
+          <a:fontRef idx="minor">
+            <a:schemeClr val="tx1"/>
+          </a:fontRef>
+        </p:style>
+      </p:cxnSp>
+      <p:sp>
+        <p:nvSpPr>
+          <p:cNvPr id="251" name="TextBox 250">
+            <a:extLst>
+              <a:ext uri="{FF2B5EF4-FFF2-40B4-BE49-F238E27FC236}">
+                <a16:creationId xmlns:a16="http://schemas.microsoft.com/office/drawing/2014/main" id="{27D87989-E7EE-E34D-A368-EBC1AEAD3D4C}"/>
+              </a:ext>
+            </a:extLst>
+          </p:cNvPr>
+          <p:cNvSpPr txBox="1"/>
+          <p:nvPr/>
+        </p:nvSpPr>
+        <p:spPr>
+          <a:xfrm>
+            <a:off x="9259603" y="4389064"/>
+            <a:ext cx="1414170" cy="369332"/>
+          </a:xfrm>
+          <a:prstGeom prst="rect">
+            <a:avLst/>
+          </a:prstGeom>
+          <a:noFill/>
+        </p:spPr>
+        <p:txBody>
+          <a:bodyPr wrap="none" rtlCol="0">
+            <a:spAutoFit/>
+          </a:bodyPr>
+          <a:lstStyle/>
+          <a:p>
+            <a:pPr algn="ctr"/>
+            <a:r>
+              <a:rPr lang="en-GB" dirty="0"/>
+              <a:t>usable width</a:t>
+            </a:r>
+          </a:p>
+        </p:txBody>
+      </p:sp>
     </p:spTree>
     <p:extLst>
       <p:ext uri="{BB962C8B-B14F-4D97-AF65-F5344CB8AC3E}">
@@ -6162,13 +6255,15 @@
               </a:ext>
             </a:extLst>
           </p:cNvPr>
-          <p:cNvCxnSpPr/>
+          <p:cNvCxnSpPr>
+            <a:cxnSpLocks/>
+          </p:cNvCxnSpPr>
           <p:nvPr/>
         </p:nvCxnSpPr>
         <p:spPr>
           <a:xfrm>
-            <a:off x="5954350" y="3892638"/>
-            <a:ext cx="0" cy="1371600"/>
+            <a:off x="6114668" y="3892638"/>
+            <a:ext cx="0" cy="818485"/>
           </a:xfrm>
           <a:prstGeom prst="line">
             <a:avLst/>
@@ -6198,13 +6293,15 @@
               </a:ext>
             </a:extLst>
           </p:cNvPr>
-          <p:cNvCxnSpPr/>
+          <p:cNvCxnSpPr>
+            <a:cxnSpLocks/>
+          </p:cNvCxnSpPr>
           <p:nvPr/>
         </p:nvCxnSpPr>
         <p:spPr>
           <a:xfrm>
-            <a:off x="3207737" y="3856540"/>
-            <a:ext cx="0" cy="1371600"/>
+            <a:off x="3368055" y="3856540"/>
+            <a:ext cx="0" cy="854584"/>
           </a:xfrm>
           <a:prstGeom prst="line">
             <a:avLst/>
@@ -6246,7 +6343,7 @@
         </p:blipFill>
         <p:spPr>
           <a:xfrm>
-            <a:off x="2293335" y="3419820"/>
+            <a:off x="2453653" y="3419820"/>
             <a:ext cx="457197" cy="457200"/>
           </a:xfrm>
           <a:prstGeom prst="rect">
@@ -6268,7 +6365,7 @@
         </p:nvSpPr>
         <p:spPr>
           <a:xfrm>
-            <a:off x="475802" y="3683358"/>
+            <a:off x="636120" y="3683358"/>
             <a:ext cx="457200" cy="45720"/>
           </a:xfrm>
           <a:prstGeom prst="rect">
@@ -6328,7 +6425,7 @@
         </p:blipFill>
         <p:spPr>
           <a:xfrm>
-            <a:off x="3348929" y="2821293"/>
+            <a:off x="3509247" y="2821293"/>
             <a:ext cx="1089216" cy="892708"/>
           </a:xfrm>
           <a:prstGeom prst="rect">
@@ -6358,7 +6455,7 @@
         </p:blipFill>
         <p:spPr>
           <a:xfrm>
-            <a:off x="349672" y="2777217"/>
+            <a:off x="509990" y="2777217"/>
             <a:ext cx="583328" cy="906141"/>
           </a:xfrm>
           <a:prstGeom prst="rect">
@@ -6380,7 +6477,7 @@
         </p:nvSpPr>
         <p:spPr>
           <a:xfrm>
-            <a:off x="3204158" y="3683358"/>
+            <a:off x="3364476" y="3683358"/>
             <a:ext cx="3159261" cy="45719"/>
           </a:xfrm>
           <a:prstGeom prst="rect">
@@ -6436,7 +6533,7 @@
         </p:blipFill>
         <p:spPr>
           <a:xfrm>
-            <a:off x="6375471" y="3404366"/>
+            <a:off x="6535789" y="3404366"/>
             <a:ext cx="457197" cy="457200"/>
           </a:xfrm>
           <a:prstGeom prst="rect">
@@ -6465,7 +6562,7 @@
         </p:blipFill>
         <p:spPr>
           <a:xfrm>
-            <a:off x="4669794" y="2847600"/>
+            <a:off x="4830112" y="2847600"/>
             <a:ext cx="1073068" cy="826507"/>
           </a:xfrm>
           <a:prstGeom prst="rect">
@@ -6482,13 +6579,15 @@
               </a:ext>
             </a:extLst>
           </p:cNvPr>
-          <p:cNvCxnSpPr/>
+          <p:cNvCxnSpPr>
+            <a:cxnSpLocks/>
+          </p:cNvCxnSpPr>
           <p:nvPr/>
         </p:nvCxnSpPr>
         <p:spPr>
           <a:xfrm>
-            <a:off x="492012" y="3856540"/>
-            <a:ext cx="0" cy="1371600"/>
+            <a:off x="652330" y="3856540"/>
+            <a:ext cx="0" cy="1142946"/>
           </a:xfrm>
           <a:prstGeom prst="line">
             <a:avLst/>
@@ -6518,13 +6617,15 @@
               </a:ext>
             </a:extLst>
           </p:cNvPr>
-          <p:cNvCxnSpPr/>
+          <p:cNvCxnSpPr>
+            <a:cxnSpLocks/>
+          </p:cNvCxnSpPr>
           <p:nvPr/>
         </p:nvCxnSpPr>
         <p:spPr>
           <a:xfrm>
-            <a:off x="2293337" y="3856540"/>
-            <a:ext cx="0" cy="1371600"/>
+            <a:off x="2453655" y="3856540"/>
+            <a:ext cx="0" cy="1142946"/>
           </a:xfrm>
           <a:prstGeom prst="line">
             <a:avLst/>
@@ -6554,13 +6655,15 @@
               </a:ext>
             </a:extLst>
           </p:cNvPr>
-          <p:cNvCxnSpPr/>
+          <p:cNvCxnSpPr>
+            <a:cxnSpLocks/>
+          </p:cNvCxnSpPr>
           <p:nvPr/>
         </p:nvCxnSpPr>
         <p:spPr>
           <a:xfrm>
-            <a:off x="2750537" y="3856540"/>
-            <a:ext cx="0" cy="1371600"/>
+            <a:off x="2910855" y="3856540"/>
+            <a:ext cx="0" cy="1142946"/>
           </a:xfrm>
           <a:prstGeom prst="line">
             <a:avLst/>
@@ -6590,13 +6693,15 @@
               </a:ext>
             </a:extLst>
           </p:cNvPr>
-          <p:cNvCxnSpPr/>
+          <p:cNvCxnSpPr>
+            <a:cxnSpLocks/>
+          </p:cNvCxnSpPr>
           <p:nvPr/>
         </p:nvCxnSpPr>
         <p:spPr>
           <a:xfrm>
-            <a:off x="4579337" y="3856540"/>
-            <a:ext cx="0" cy="1371600"/>
+            <a:off x="4739655" y="3856540"/>
+            <a:ext cx="0" cy="854584"/>
           </a:xfrm>
           <a:prstGeom prst="line">
             <a:avLst/>
@@ -6626,13 +6731,15 @@
               </a:ext>
             </a:extLst>
           </p:cNvPr>
-          <p:cNvCxnSpPr/>
+          <p:cNvCxnSpPr>
+            <a:cxnSpLocks/>
+          </p:cNvCxnSpPr>
           <p:nvPr/>
         </p:nvCxnSpPr>
         <p:spPr>
           <a:xfrm>
-            <a:off x="6375479" y="3856540"/>
-            <a:ext cx="0" cy="1371600"/>
+            <a:off x="6535797" y="3856540"/>
+            <a:ext cx="0" cy="1142946"/>
           </a:xfrm>
           <a:prstGeom prst="line">
             <a:avLst/>
@@ -6662,13 +6769,15 @@
               </a:ext>
             </a:extLst>
           </p:cNvPr>
-          <p:cNvCxnSpPr/>
+          <p:cNvCxnSpPr>
+            <a:cxnSpLocks/>
+          </p:cNvCxnSpPr>
           <p:nvPr/>
         </p:nvCxnSpPr>
         <p:spPr>
           <a:xfrm>
-            <a:off x="6832679" y="3856540"/>
-            <a:ext cx="0" cy="1371600"/>
+            <a:off x="6992997" y="3856540"/>
+            <a:ext cx="0" cy="1142946"/>
           </a:xfrm>
           <a:prstGeom prst="line">
             <a:avLst/>
@@ -6703,7 +6812,7 @@
         </p:nvCxnSpPr>
         <p:spPr>
           <a:xfrm>
-            <a:off x="12168857" y="3856540"/>
+            <a:off x="12329175" y="3856540"/>
             <a:ext cx="0" cy="1371600"/>
           </a:xfrm>
           <a:prstGeom prst="line">
@@ -6734,13 +6843,15 @@
               </a:ext>
             </a:extLst>
           </p:cNvPr>
-          <p:cNvCxnSpPr/>
+          <p:cNvCxnSpPr>
+            <a:cxnSpLocks/>
+          </p:cNvCxnSpPr>
           <p:nvPr/>
         </p:nvCxnSpPr>
         <p:spPr>
           <a:xfrm>
-            <a:off x="16094" y="3856540"/>
-            <a:ext cx="0" cy="1371600"/>
+            <a:off x="176412" y="3856540"/>
+            <a:ext cx="0" cy="1142946"/>
           </a:xfrm>
           <a:prstGeom prst="line">
             <a:avLst/>
@@ -6775,7 +6886,7 @@
         </p:nvSpPr>
         <p:spPr>
           <a:xfrm>
-            <a:off x="3499195" y="4219174"/>
+            <a:off x="3659513" y="4064794"/>
             <a:ext cx="788677" cy="646331"/>
           </a:xfrm>
           <a:prstGeom prst="rect">
@@ -6818,7 +6929,7 @@
         </p:nvSpPr>
         <p:spPr>
           <a:xfrm>
-            <a:off x="4870794" y="4219173"/>
+            <a:off x="5031112" y="4064793"/>
             <a:ext cx="788677" cy="646331"/>
           </a:xfrm>
           <a:prstGeom prst="rect">
@@ -6861,7 +6972,7 @@
         </p:nvSpPr>
         <p:spPr>
           <a:xfrm rot="5400000">
-            <a:off x="4386175" y="4074607"/>
+            <a:off x="4546493" y="3550972"/>
             <a:ext cx="386317" cy="2743194"/>
           </a:xfrm>
           <a:prstGeom prst="rightBrace">
@@ -6905,8 +7016,8 @@
         </p:nvSpPr>
         <p:spPr>
           <a:xfrm>
-            <a:off x="4050791" y="5613114"/>
-            <a:ext cx="1057084" cy="646331"/>
+            <a:off x="4036480" y="5046492"/>
+            <a:ext cx="1414170" cy="369332"/>
           </a:xfrm>
           <a:prstGeom prst="rect">
             <a:avLst/>
@@ -6922,14 +7033,7 @@
             <a:pPr algn="ctr"/>
             <a:r>
               <a:rPr lang="en-GB" dirty="0"/>
-              <a:t>travelled </a:t>
-            </a:r>
-          </a:p>
-          <a:p>
-            <a:pPr algn="ctr"/>
-            <a:r>
-              <a:rPr lang="en-GB" dirty="0"/>
-              <a:t>way</a:t>
+              <a:t>usable width</a:t>
             </a:r>
           </a:p>
         </p:txBody>
@@ -6948,7 +7052,7 @@
         </p:nvSpPr>
         <p:spPr>
           <a:xfrm rot="16200000">
-            <a:off x="2265622" y="4353507"/>
+            <a:off x="2425940" y="4353507"/>
             <a:ext cx="1422184" cy="369332"/>
           </a:xfrm>
           <a:prstGeom prst="rect">
@@ -6983,7 +7087,7 @@
         </p:nvSpPr>
         <p:spPr>
           <a:xfrm rot="16200000">
-            <a:off x="5628806" y="4389606"/>
+            <a:off x="5789124" y="4389606"/>
             <a:ext cx="1103444" cy="369332"/>
           </a:xfrm>
           <a:prstGeom prst="rect">
@@ -7018,7 +7122,7 @@
         </p:nvSpPr>
         <p:spPr>
           <a:xfrm rot="16200000">
-            <a:off x="3231223" y="-2897361"/>
+            <a:off x="3391541" y="-2897361"/>
             <a:ext cx="386317" cy="6816576"/>
           </a:xfrm>
           <a:prstGeom prst="rightBrace">
@@ -7062,7 +7166,7 @@
         </p:nvSpPr>
         <p:spPr>
           <a:xfrm>
-            <a:off x="2579280" y="15146"/>
+            <a:off x="2739598" y="15146"/>
             <a:ext cx="1731051" cy="369332"/>
           </a:xfrm>
           <a:prstGeom prst="rect">
@@ -7098,7 +7202,7 @@
         </p:nvSpPr>
         <p:spPr>
           <a:xfrm rot="16200000">
-            <a:off x="4590631" y="464077"/>
+            <a:off x="4750949" y="464077"/>
             <a:ext cx="386317" cy="3159261"/>
           </a:xfrm>
           <a:prstGeom prst="rightBrace">
@@ -7142,7 +7246,7 @@
         </p:nvSpPr>
         <p:spPr>
           <a:xfrm>
-            <a:off x="3838815" y="1518238"/>
+            <a:off x="3999133" y="1518238"/>
             <a:ext cx="1904047" cy="369332"/>
           </a:xfrm>
           <a:prstGeom prst="rect">
@@ -7177,7 +7281,7 @@
         </p:nvSpPr>
         <p:spPr>
           <a:xfrm rot="16200000">
-            <a:off x="6089131" y="4317183"/>
+            <a:off x="6249449" y="4317183"/>
             <a:ext cx="995273" cy="369332"/>
           </a:xfrm>
           <a:prstGeom prst="rect">
@@ -7213,7 +7317,7 @@
         </p:nvSpPr>
         <p:spPr>
           <a:xfrm>
-            <a:off x="1112487" y="1525084"/>
+            <a:off x="1272805" y="1525084"/>
             <a:ext cx="995273" cy="369332"/>
           </a:xfrm>
           <a:prstGeom prst="rect">
@@ -7249,7 +7353,7 @@
         </p:nvSpPr>
         <p:spPr>
           <a:xfrm rot="16200000" flipV="1">
-            <a:off x="1416966" y="449675"/>
+            <a:off x="1577284" y="449675"/>
             <a:ext cx="386317" cy="3188065"/>
           </a:xfrm>
           <a:prstGeom prst="rightBrace">
@@ -7293,8 +7397,8 @@
         </p:nvSpPr>
         <p:spPr>
           <a:xfrm rot="16200000">
-            <a:off x="251054" y="4381112"/>
-            <a:ext cx="943977" cy="369332"/>
+            <a:off x="-90912" y="4572589"/>
+            <a:ext cx="1948547" cy="369332"/>
           </a:xfrm>
           <a:prstGeom prst="rect">
             <a:avLst/>
@@ -7310,7 +7414,7 @@
             <a:pPr algn="ctr"/>
             <a:r>
               <a:rPr lang="en-GB" dirty="0"/>
-              <a:t>footway</a:t>
+              <a:t>footway / sidewalk</a:t>
             </a:r>
           </a:p>
         </p:txBody>
@@ -7329,7 +7433,7 @@
         </p:nvSpPr>
         <p:spPr>
           <a:xfrm>
-            <a:off x="2424377" y="5601792"/>
+            <a:off x="2549527" y="5379047"/>
             <a:ext cx="701539" cy="369332"/>
           </a:xfrm>
           <a:prstGeom prst="rect">
@@ -7365,7 +7469,7 @@
         </p:nvSpPr>
         <p:spPr>
           <a:xfrm>
-            <a:off x="2738503" y="3674107"/>
+            <a:off x="2898821" y="3674107"/>
             <a:ext cx="457200" cy="54971"/>
           </a:xfrm>
           <a:prstGeom prst="rect">
@@ -7429,7 +7533,7 @@
         </p:blipFill>
         <p:spPr>
           <a:xfrm>
-            <a:off x="16094" y="3421994"/>
+            <a:off x="176412" y="3421994"/>
             <a:ext cx="457197" cy="457200"/>
           </a:xfrm>
           <a:prstGeom prst="rect">
@@ -7451,7 +7555,7 @@
         </p:nvSpPr>
         <p:spPr>
           <a:xfrm>
-            <a:off x="1387125" y="3683358"/>
+            <a:off x="1547443" y="3683358"/>
             <a:ext cx="914400" cy="45720"/>
           </a:xfrm>
           <a:prstGeom prst="rect">
@@ -7510,7 +7614,7 @@
         </p:blipFill>
         <p:spPr>
           <a:xfrm>
-            <a:off x="929917" y="3420241"/>
+            <a:off x="1090235" y="3420241"/>
             <a:ext cx="457197" cy="457200"/>
           </a:xfrm>
           <a:prstGeom prst="rect">
@@ -7540,7 +7644,7 @@
         </p:blipFill>
         <p:spPr>
           <a:xfrm>
-            <a:off x="1996045" y="2634074"/>
+            <a:off x="2156363" y="2634074"/>
             <a:ext cx="379915" cy="1063762"/>
           </a:xfrm>
           <a:prstGeom prst="rect">
@@ -7557,13 +7661,15 @@
               </a:ext>
             </a:extLst>
           </p:cNvPr>
-          <p:cNvCxnSpPr/>
+          <p:cNvCxnSpPr>
+            <a:cxnSpLocks/>
+          </p:cNvCxnSpPr>
           <p:nvPr/>
         </p:nvCxnSpPr>
         <p:spPr>
           <a:xfrm>
-            <a:off x="929917" y="3856540"/>
-            <a:ext cx="0" cy="1371600"/>
+            <a:off x="1090235" y="3856540"/>
+            <a:ext cx="0" cy="1142946"/>
           </a:xfrm>
           <a:prstGeom prst="line">
             <a:avLst/>
@@ -7593,13 +7699,15 @@
               </a:ext>
             </a:extLst>
           </p:cNvPr>
-          <p:cNvCxnSpPr/>
+          <p:cNvCxnSpPr>
+            <a:cxnSpLocks/>
+          </p:cNvCxnSpPr>
           <p:nvPr/>
         </p:nvCxnSpPr>
         <p:spPr>
           <a:xfrm>
-            <a:off x="1387114" y="3856540"/>
-            <a:ext cx="0" cy="1371600"/>
+            <a:off x="1547432" y="3856540"/>
+            <a:ext cx="0" cy="1142946"/>
           </a:xfrm>
           <a:prstGeom prst="line">
             <a:avLst/>
@@ -7634,7 +7742,7 @@
         </p:nvSpPr>
         <p:spPr>
           <a:xfrm rot="16200000">
-            <a:off x="1531210" y="4393059"/>
+            <a:off x="1691528" y="4393059"/>
             <a:ext cx="1103444" cy="369332"/>
           </a:xfrm>
           <a:prstGeom prst="rect">
@@ -7675,7 +7783,7 @@
         </p:nvSpPr>
         <p:spPr>
           <a:xfrm rot="16200000">
-            <a:off x="1046625" y="4412143"/>
+            <a:off x="1206943" y="4412143"/>
             <a:ext cx="1103444" cy="369332"/>
           </a:xfrm>
           <a:prstGeom prst="rect">
@@ -7706,13 +7814,15 @@
               </a:ext>
             </a:extLst>
           </p:cNvPr>
-          <p:cNvCxnSpPr/>
+          <p:cNvCxnSpPr>
+            <a:cxnSpLocks/>
+          </p:cNvCxnSpPr>
           <p:nvPr/>
         </p:nvCxnSpPr>
         <p:spPr>
           <a:xfrm>
-            <a:off x="1853965" y="3856553"/>
-            <a:ext cx="0" cy="1371600"/>
+            <a:off x="2014283" y="3856553"/>
+            <a:ext cx="0" cy="1142933"/>
           </a:xfrm>
           <a:prstGeom prst="line">
             <a:avLst/>
@@ -7755,7 +7865,7 @@
         </p:blipFill>
         <p:spPr>
           <a:xfrm>
-            <a:off x="6029878" y="2614971"/>
+            <a:off x="6190196" y="2614971"/>
             <a:ext cx="379915" cy="1063762"/>
           </a:xfrm>
           <a:prstGeom prst="rect">
@@ -7778,7 +7888,7 @@
         </p:nvSpPr>
         <p:spPr>
           <a:xfrm rot="5400000">
-            <a:off x="1637321" y="5017840"/>
+            <a:off x="1797639" y="4799007"/>
             <a:ext cx="386317" cy="906881"/>
           </a:xfrm>
           <a:prstGeom prst="rightBrace">
@@ -7822,7 +7932,7 @@
         </p:nvSpPr>
         <p:spPr>
           <a:xfrm>
-            <a:off x="1306811" y="5610744"/>
+            <a:off x="1474945" y="5387999"/>
             <a:ext cx="1021690" cy="369332"/>
           </a:xfrm>
           <a:prstGeom prst="rect">
@@ -7857,7 +7967,7 @@
         </p:nvSpPr>
         <p:spPr>
           <a:xfrm rot="5400000">
-            <a:off x="2555123" y="5003956"/>
+            <a:off x="2715441" y="4785123"/>
             <a:ext cx="386317" cy="906881"/>
           </a:xfrm>
           <a:prstGeom prst="rightBrace">
@@ -7901,7 +8011,7 @@
         </p:nvSpPr>
         <p:spPr>
           <a:xfrm>
-            <a:off x="6106431" y="1520644"/>
+            <a:off x="6266749" y="1520644"/>
             <a:ext cx="995273" cy="369332"/>
           </a:xfrm>
           <a:prstGeom prst="rect">
@@ -7937,7 +8047,7 @@
         </p:nvSpPr>
         <p:spPr>
           <a:xfrm rot="16200000" flipV="1">
-            <a:off x="6410910" y="1812516"/>
+            <a:off x="6571228" y="1812516"/>
             <a:ext cx="386317" cy="457198"/>
           </a:xfrm>
           <a:prstGeom prst="rightBrace">
@@ -7967,6 +8077,255 @@
           </a:p>
         </p:txBody>
       </p:sp>
+      <p:sp>
+        <p:nvSpPr>
+          <p:cNvPr id="51" name="TextBox 50">
+            <a:extLst>
+              <a:ext uri="{FF2B5EF4-FFF2-40B4-BE49-F238E27FC236}">
+                <a16:creationId xmlns:a16="http://schemas.microsoft.com/office/drawing/2014/main" id="{3DFCEB36-B308-DE47-BBC2-78A48D9C5ABB}"/>
+              </a:ext>
+            </a:extLst>
+          </p:cNvPr>
+          <p:cNvSpPr txBox="1"/>
+          <p:nvPr/>
+        </p:nvSpPr>
+        <p:spPr>
+          <a:xfrm>
+            <a:off x="2258640" y="6242958"/>
+            <a:ext cx="1535933" cy="646331"/>
+          </a:xfrm>
+          <a:prstGeom prst="rect">
+            <a:avLst/>
+          </a:prstGeom>
+          <a:noFill/>
+        </p:spPr>
+        <p:txBody>
+          <a:bodyPr wrap="none" rtlCol="0">
+            <a:spAutoFit/>
+          </a:bodyPr>
+          <a:lstStyle/>
+          <a:p>
+            <a:pPr algn="ctr"/>
+            <a:r>
+              <a:rPr lang="en-GB" dirty="0"/>
+              <a:t>travelled way </a:t>
+            </a:r>
+            <a:br>
+              <a:rPr lang="en-GB" dirty="0"/>
+            </a:br>
+            <a:r>
+              <a:rPr lang="en-GB" dirty="0"/>
+              <a:t>(jointly)</a:t>
+            </a:r>
+          </a:p>
+        </p:txBody>
+      </p:sp>
+      <p:cxnSp>
+        <p:nvCxnSpPr>
+          <p:cNvPr id="52" name="Curved Connector 51">
+            <a:extLst>
+              <a:ext uri="{FF2B5EF4-FFF2-40B4-BE49-F238E27FC236}">
+                <a16:creationId xmlns:a16="http://schemas.microsoft.com/office/drawing/2014/main" id="{AABC7874-E48A-6447-AABB-6615E4B4CC81}"/>
+              </a:ext>
+            </a:extLst>
+          </p:cNvPr>
+          <p:cNvCxnSpPr>
+            <a:cxnSpLocks/>
+            <a:stCxn id="51" idx="0"/>
+            <a:endCxn id="104" idx="1"/>
+          </p:cNvCxnSpPr>
+          <p:nvPr/>
+        </p:nvCxnSpPr>
+        <p:spPr>
+          <a:xfrm rot="16200000" flipV="1">
+            <a:off x="1699271" y="4915621"/>
+            <a:ext cx="511429" cy="2143245"/>
+          </a:xfrm>
+          <a:prstGeom prst="curvedConnector3">
+            <a:avLst>
+              <a:gd name="adj1" fmla="val 50000"/>
+            </a:avLst>
+          </a:prstGeom>
+        </p:spPr>
+        <p:style>
+          <a:lnRef idx="1">
+            <a:schemeClr val="accent1"/>
+          </a:lnRef>
+          <a:fillRef idx="0">
+            <a:schemeClr val="accent1"/>
+          </a:fillRef>
+          <a:effectRef idx="0">
+            <a:schemeClr val="accent1"/>
+          </a:effectRef>
+          <a:fontRef idx="minor">
+            <a:schemeClr val="tx1"/>
+          </a:fontRef>
+        </p:style>
+      </p:cxnSp>
+      <p:cxnSp>
+        <p:nvCxnSpPr>
+          <p:cNvPr id="56" name="Curved Connector 55">
+            <a:extLst>
+              <a:ext uri="{FF2B5EF4-FFF2-40B4-BE49-F238E27FC236}">
+                <a16:creationId xmlns:a16="http://schemas.microsoft.com/office/drawing/2014/main" id="{F2679A63-A95C-B14A-B6E2-3DA685B86712}"/>
+              </a:ext>
+            </a:extLst>
+          </p:cNvPr>
+          <p:cNvCxnSpPr>
+            <a:cxnSpLocks/>
+            <a:stCxn id="16" idx="2"/>
+            <a:endCxn id="51" idx="0"/>
+          </p:cNvCxnSpPr>
+          <p:nvPr/>
+        </p:nvCxnSpPr>
+        <p:spPr>
+          <a:xfrm rot="16200000" flipH="1">
+            <a:off x="2263385" y="5479735"/>
+            <a:ext cx="485627" cy="1040817"/>
+          </a:xfrm>
+          <a:prstGeom prst="curvedConnector3">
+            <a:avLst>
+              <a:gd name="adj1" fmla="val 50000"/>
+            </a:avLst>
+          </a:prstGeom>
+        </p:spPr>
+        <p:style>
+          <a:lnRef idx="1">
+            <a:schemeClr val="accent1"/>
+          </a:lnRef>
+          <a:fillRef idx="0">
+            <a:schemeClr val="accent1"/>
+          </a:fillRef>
+          <a:effectRef idx="0">
+            <a:schemeClr val="accent1"/>
+          </a:effectRef>
+          <a:fontRef idx="minor">
+            <a:schemeClr val="tx1"/>
+          </a:fontRef>
+        </p:style>
+      </p:cxnSp>
+      <p:sp>
+        <p:nvSpPr>
+          <p:cNvPr id="84" name="Right Brace 83">
+            <a:extLst>
+              <a:ext uri="{FF2B5EF4-FFF2-40B4-BE49-F238E27FC236}">
+                <a16:creationId xmlns:a16="http://schemas.microsoft.com/office/drawing/2014/main" id="{F684EBDF-24F7-3D4E-87EA-A626AFA74B4D}"/>
+              </a:ext>
+            </a:extLst>
+          </p:cNvPr>
+          <p:cNvSpPr/>
+          <p:nvPr/>
+        </p:nvSpPr>
+        <p:spPr>
+          <a:xfrm rot="5400000">
+            <a:off x="4757466" y="3864848"/>
+            <a:ext cx="386317" cy="3170322"/>
+          </a:xfrm>
+          <a:prstGeom prst="rightBrace">
+            <a:avLst/>
+          </a:prstGeom>
+        </p:spPr>
+        <p:style>
+          <a:lnRef idx="1">
+            <a:schemeClr val="accent1"/>
+          </a:lnRef>
+          <a:fillRef idx="0">
+            <a:schemeClr val="accent1"/>
+          </a:fillRef>
+          <a:effectRef idx="0">
+            <a:schemeClr val="accent1"/>
+          </a:effectRef>
+          <a:fontRef idx="minor">
+            <a:schemeClr val="tx1"/>
+          </a:fontRef>
+        </p:style>
+        <p:txBody>
+          <a:bodyPr rtlCol="0" anchor="ctr"/>
+          <a:lstStyle/>
+          <a:p>
+            <a:pPr algn="ctr"/>
+            <a:endParaRPr lang="en-GB"/>
+          </a:p>
+        </p:txBody>
+      </p:sp>
+      <p:sp>
+        <p:nvSpPr>
+          <p:cNvPr id="85" name="TextBox 84">
+            <a:extLst>
+              <a:ext uri="{FF2B5EF4-FFF2-40B4-BE49-F238E27FC236}">
+                <a16:creationId xmlns:a16="http://schemas.microsoft.com/office/drawing/2014/main" id="{B8ED7FC2-E22E-0E4C-86C5-727759128E1F}"/>
+              </a:ext>
+            </a:extLst>
+          </p:cNvPr>
+          <p:cNvSpPr txBox="1"/>
+          <p:nvPr/>
+        </p:nvSpPr>
+        <p:spPr>
+          <a:xfrm>
+            <a:off x="4453808" y="5593339"/>
+            <a:ext cx="988412" cy="369332"/>
+          </a:xfrm>
+          <a:prstGeom prst="rect">
+            <a:avLst/>
+          </a:prstGeom>
+          <a:noFill/>
+        </p:spPr>
+        <p:txBody>
+          <a:bodyPr wrap="none" rtlCol="0">
+            <a:spAutoFit/>
+          </a:bodyPr>
+          <a:lstStyle/>
+          <a:p>
+            <a:pPr algn="ctr"/>
+            <a:r>
+              <a:rPr lang="en-GB" dirty="0"/>
+              <a:t>roadway</a:t>
+            </a:r>
+          </a:p>
+        </p:txBody>
+      </p:sp>
+      <p:cxnSp>
+        <p:nvCxnSpPr>
+          <p:cNvPr id="86" name="Curved Connector 85">
+            <a:extLst>
+              <a:ext uri="{FF2B5EF4-FFF2-40B4-BE49-F238E27FC236}">
+                <a16:creationId xmlns:a16="http://schemas.microsoft.com/office/drawing/2014/main" id="{AE44181E-4BDE-3F48-9F21-B8D5626E7A3F}"/>
+              </a:ext>
+            </a:extLst>
+          </p:cNvPr>
+          <p:cNvCxnSpPr>
+            <a:cxnSpLocks/>
+            <a:stCxn id="85" idx="2"/>
+            <a:endCxn id="51" idx="0"/>
+          </p:cNvCxnSpPr>
+          <p:nvPr/>
+        </p:nvCxnSpPr>
+        <p:spPr>
+          <a:xfrm rot="5400000">
+            <a:off x="3847168" y="5142111"/>
+            <a:ext cx="280287" cy="1921407"/>
+          </a:xfrm>
+          <a:prstGeom prst="curvedConnector3">
+            <a:avLst>
+              <a:gd name="adj1" fmla="val 50000"/>
+            </a:avLst>
+          </a:prstGeom>
+        </p:spPr>
+        <p:style>
+          <a:lnRef idx="1">
+            <a:schemeClr val="accent1"/>
+          </a:lnRef>
+          <a:fillRef idx="0">
+            <a:schemeClr val="accent1"/>
+          </a:fillRef>
+          <a:effectRef idx="0">
+            <a:schemeClr val="accent1"/>
+          </a:effectRef>
+          <a:fontRef idx="minor">
+            <a:schemeClr val="tx1"/>
+          </a:fontRef>
+        </p:style>
+      </p:cxnSp>
     </p:spTree>
     <p:extLst>
       <p:ext uri="{BB962C8B-B14F-4D97-AF65-F5344CB8AC3E}">

</xml_diff>